<commit_message>
Finished the key visuals. Not all supporting images; the ones that are content - except for the accountability & ownership cycles.
</commit_message>
<xml_diff>
--- a/leading technical debt/gogo keynote - data-driven leadership to solve technical debt.pptx
+++ b/leading technical debt/gogo keynote - data-driven leadership to solve technical debt.pptx
@@ -286,7 +286,7 @@
           <a:p>
             <a:fld id="{9145D725-E27F-4BDC-952B-6F12C3FAB913}" type="datetimeFigureOut">
               <a:rPr lang="en-US" smtClean="0"/>
-              <a:t>08-Apr-19</a:t>
+              <a:t>09-Apr-19</a:t>
             </a:fld>
             <a:endParaRPr lang="en-US"/>
           </a:p>
@@ -4039,7 +4039,7 @@
           <a:p>
             <a:fld id="{EBAA21FC-F3CB-41C2-AF46-91977F01228E}" type="datetimeFigureOut">
               <a:rPr lang="en-US" smtClean="0"/>
-              <a:t>08-Apr-19</a:t>
+              <a:t>09-Apr-19</a:t>
             </a:fld>
             <a:endParaRPr lang="en-US"/>
           </a:p>
@@ -4237,7 +4237,7 @@
           <a:p>
             <a:fld id="{EBAA21FC-F3CB-41C2-AF46-91977F01228E}" type="datetimeFigureOut">
               <a:rPr lang="en-US" smtClean="0"/>
-              <a:t>08-Apr-19</a:t>
+              <a:t>09-Apr-19</a:t>
             </a:fld>
             <a:endParaRPr lang="en-US"/>
           </a:p>
@@ -4445,7 +4445,7 @@
           <a:p>
             <a:fld id="{EBAA21FC-F3CB-41C2-AF46-91977F01228E}" type="datetimeFigureOut">
               <a:rPr lang="en-US" smtClean="0"/>
-              <a:t>08-Apr-19</a:t>
+              <a:t>09-Apr-19</a:t>
             </a:fld>
             <a:endParaRPr lang="en-US"/>
           </a:p>
@@ -4643,7 +4643,7 @@
           <a:p>
             <a:fld id="{EBAA21FC-F3CB-41C2-AF46-91977F01228E}" type="datetimeFigureOut">
               <a:rPr lang="en-US" smtClean="0"/>
-              <a:t>08-Apr-19</a:t>
+              <a:t>09-Apr-19</a:t>
             </a:fld>
             <a:endParaRPr lang="en-US"/>
           </a:p>
@@ -4918,7 +4918,7 @@
           <a:p>
             <a:fld id="{EBAA21FC-F3CB-41C2-AF46-91977F01228E}" type="datetimeFigureOut">
               <a:rPr lang="en-US" smtClean="0"/>
-              <a:t>08-Apr-19</a:t>
+              <a:t>09-Apr-19</a:t>
             </a:fld>
             <a:endParaRPr lang="en-US"/>
           </a:p>
@@ -5183,7 +5183,7 @@
           <a:p>
             <a:fld id="{EBAA21FC-F3CB-41C2-AF46-91977F01228E}" type="datetimeFigureOut">
               <a:rPr lang="en-US" smtClean="0"/>
-              <a:t>08-Apr-19</a:t>
+              <a:t>09-Apr-19</a:t>
             </a:fld>
             <a:endParaRPr lang="en-US"/>
           </a:p>
@@ -5595,7 +5595,7 @@
           <a:p>
             <a:fld id="{EBAA21FC-F3CB-41C2-AF46-91977F01228E}" type="datetimeFigureOut">
               <a:rPr lang="en-US" smtClean="0"/>
-              <a:t>08-Apr-19</a:t>
+              <a:t>09-Apr-19</a:t>
             </a:fld>
             <a:endParaRPr lang="en-US"/>
           </a:p>
@@ -5736,7 +5736,7 @@
           <a:p>
             <a:fld id="{EBAA21FC-F3CB-41C2-AF46-91977F01228E}" type="datetimeFigureOut">
               <a:rPr lang="en-US" smtClean="0"/>
-              <a:t>08-Apr-19</a:t>
+              <a:t>09-Apr-19</a:t>
             </a:fld>
             <a:endParaRPr lang="en-US"/>
           </a:p>
@@ -5849,7 +5849,7 @@
           <a:p>
             <a:fld id="{EBAA21FC-F3CB-41C2-AF46-91977F01228E}" type="datetimeFigureOut">
               <a:rPr lang="en-US" smtClean="0"/>
-              <a:t>08-Apr-19</a:t>
+              <a:t>09-Apr-19</a:t>
             </a:fld>
             <a:endParaRPr lang="en-US"/>
           </a:p>
@@ -6160,7 +6160,7 @@
           <a:p>
             <a:fld id="{EBAA21FC-F3CB-41C2-AF46-91977F01228E}" type="datetimeFigureOut">
               <a:rPr lang="en-US" smtClean="0"/>
-              <a:t>08-Apr-19</a:t>
+              <a:t>09-Apr-19</a:t>
             </a:fld>
             <a:endParaRPr lang="en-US"/>
           </a:p>
@@ -6448,7 +6448,7 @@
           <a:p>
             <a:fld id="{EBAA21FC-F3CB-41C2-AF46-91977F01228E}" type="datetimeFigureOut">
               <a:rPr lang="en-US" smtClean="0"/>
-              <a:t>08-Apr-19</a:t>
+              <a:t>09-Apr-19</a:t>
             </a:fld>
             <a:endParaRPr lang="en-US"/>
           </a:p>
@@ -6689,7 +6689,7 @@
           <a:p>
             <a:fld id="{EBAA21FC-F3CB-41C2-AF46-91977F01228E}" type="datetimeFigureOut">
               <a:rPr lang="en-US" smtClean="0"/>
-              <a:t>08-Apr-19</a:t>
+              <a:t>09-Apr-19</a:t>
             </a:fld>
             <a:endParaRPr lang="en-US"/>
           </a:p>
@@ -9685,69 +9685,283 @@
           <a:p>
             <a:r>
               <a:rPr lang="en-US" dirty="0"/>
-              <a:t>Leadership stance – conceptual </a:t>
-            </a:r>
-          </a:p>
-        </p:txBody>
-      </p:sp>
-      <p:sp>
-        <p:nvSpPr>
-          <p:cNvPr id="3" name="Content Placeholder 2">
-            <a:extLst>
-              <a:ext uri="{FF2B5EF4-FFF2-40B4-BE49-F238E27FC236}">
-                <a16:creationId xmlns:a16="http://schemas.microsoft.com/office/drawing/2014/main" id="{16C7E745-13A2-4F9F-BF27-DAE4DDDFF7CE}"/>
-              </a:ext>
-            </a:extLst>
-          </p:cNvPr>
-          <p:cNvSpPr>
-            <a:spLocks noGrp="1"/>
-          </p:cNvSpPr>
-          <p:nvPr>
-            <p:ph idx="1"/>
-          </p:nvPr>
-        </p:nvSpPr>
-        <p:spPr/>
-        <p:txBody>
-          <a:bodyPr/>
-          <a:lstStyle/>
-          <a:p>
-            <a:r>
-              <a:rPr lang="en-US" dirty="0"/>
-              <a:t>Yes: mentor</a:t>
-            </a:r>
-          </a:p>
-          <a:p>
-            <a:r>
-              <a:rPr lang="en-US" dirty="0"/>
-              <a:t>Yes: challenge</a:t>
-            </a:r>
-          </a:p>
-          <a:p>
-            <a:endParaRPr lang="en-US" dirty="0"/>
-          </a:p>
-          <a:p>
-            <a:r>
-              <a:rPr lang="en-US" dirty="0"/>
-              <a:t>No: strategize</a:t>
-            </a:r>
-          </a:p>
-          <a:p>
-            <a:r>
-              <a:rPr lang="en-US" dirty="0"/>
-              <a:t>No: assess their strategy</a:t>
-            </a:r>
-          </a:p>
-          <a:p>
-            <a:r>
-              <a:rPr lang="en-US" b="1" dirty="0"/>
-              <a:t>Yes: assess their ability to strategize</a:t>
-            </a:r>
-          </a:p>
-          <a:p>
-            <a:pPr marL="0" indent="0">
-              <a:buNone/>
-            </a:pPr>
-            <a:endParaRPr lang="en-US" dirty="0"/>
+              <a:t>Leadership Stance</a:t>
+            </a:r>
+          </a:p>
+        </p:txBody>
+      </p:sp>
+      <p:pic>
+        <p:nvPicPr>
+          <p:cNvPr id="7" name="Picture 6">
+            <a:extLst>
+              <a:ext uri="{FF2B5EF4-FFF2-40B4-BE49-F238E27FC236}">
+                <a16:creationId xmlns:a16="http://schemas.microsoft.com/office/drawing/2014/main" id="{6D8D2AE9-C065-4517-B7E1-B566142D5353}"/>
+              </a:ext>
+            </a:extLst>
+          </p:cNvPr>
+          <p:cNvPicPr>
+            <a:picLocks noChangeAspect="1"/>
+          </p:cNvPicPr>
+          <p:nvPr/>
+        </p:nvPicPr>
+        <p:blipFill>
+          <a:blip r:embed="rId3">
+            <a:extLst>
+              <a:ext uri="{28A0092B-C50C-407E-A947-70E740481C1C}">
+                <a14:useLocalDpi xmlns:a14="http://schemas.microsoft.com/office/drawing/2010/main" val="0"/>
+              </a:ext>
+            </a:extLst>
+          </a:blip>
+          <a:stretch>
+            <a:fillRect/>
+          </a:stretch>
+        </p:blipFill>
+        <p:spPr>
+          <a:xfrm>
+            <a:off x="8840711" y="1972899"/>
+            <a:ext cx="2440500" cy="3301852"/>
+          </a:xfrm>
+          <a:prstGeom prst="rect">
+            <a:avLst/>
+          </a:prstGeom>
+        </p:spPr>
+      </p:pic>
+      <p:pic>
+        <p:nvPicPr>
+          <p:cNvPr id="9" name="Picture 8">
+            <a:extLst>
+              <a:ext uri="{FF2B5EF4-FFF2-40B4-BE49-F238E27FC236}">
+                <a16:creationId xmlns:a16="http://schemas.microsoft.com/office/drawing/2014/main" id="{3476D2E6-48CD-4707-9808-D3C361689772}"/>
+              </a:ext>
+            </a:extLst>
+          </p:cNvPr>
+          <p:cNvPicPr>
+            <a:picLocks noChangeAspect="1"/>
+          </p:cNvPicPr>
+          <p:nvPr/>
+        </p:nvPicPr>
+        <p:blipFill>
+          <a:blip r:embed="rId4">
+            <a:extLst>
+              <a:ext uri="{28A0092B-C50C-407E-A947-70E740481C1C}">
+                <a14:useLocalDpi xmlns:a14="http://schemas.microsoft.com/office/drawing/2010/main" val="0"/>
+              </a:ext>
+            </a:extLst>
+          </a:blip>
+          <a:stretch>
+            <a:fillRect/>
+          </a:stretch>
+        </p:blipFill>
+        <p:spPr>
+          <a:xfrm>
+            <a:off x="4878233" y="1993400"/>
+            <a:ext cx="2459548" cy="3352452"/>
+          </a:xfrm>
+          <a:prstGeom prst="rect">
+            <a:avLst/>
+          </a:prstGeom>
+        </p:spPr>
+      </p:pic>
+      <p:pic>
+        <p:nvPicPr>
+          <p:cNvPr id="11" name="Picture 10">
+            <a:extLst>
+              <a:ext uri="{FF2B5EF4-FFF2-40B4-BE49-F238E27FC236}">
+                <a16:creationId xmlns:a16="http://schemas.microsoft.com/office/drawing/2014/main" id="{CB9596B8-2088-45F3-BB99-BCD4D767C8C5}"/>
+              </a:ext>
+            </a:extLst>
+          </p:cNvPr>
+          <p:cNvPicPr>
+            <a:picLocks noChangeAspect="1"/>
+          </p:cNvPicPr>
+          <p:nvPr/>
+        </p:nvPicPr>
+        <p:blipFill>
+          <a:blip r:embed="rId5">
+            <a:extLst>
+              <a:ext uri="{28A0092B-C50C-407E-A947-70E740481C1C}">
+                <a14:useLocalDpi xmlns:a14="http://schemas.microsoft.com/office/drawing/2010/main" val="0"/>
+              </a:ext>
+            </a:extLst>
+          </a:blip>
+          <a:stretch>
+            <a:fillRect/>
+          </a:stretch>
+        </p:blipFill>
+        <p:spPr>
+          <a:xfrm>
+            <a:off x="866775" y="1876441"/>
+            <a:ext cx="2438143" cy="3338503"/>
+          </a:xfrm>
+          <a:prstGeom prst="rect">
+            <a:avLst/>
+          </a:prstGeom>
+        </p:spPr>
+      </p:pic>
+      <p:sp>
+        <p:nvSpPr>
+          <p:cNvPr id="12" name="&quot;Not Allowed&quot; Symbol 11">
+            <a:extLst>
+              <a:ext uri="{FF2B5EF4-FFF2-40B4-BE49-F238E27FC236}">
+                <a16:creationId xmlns:a16="http://schemas.microsoft.com/office/drawing/2014/main" id="{65E2C8F9-C001-4D1E-B795-7674F081B2F1}"/>
+              </a:ext>
+            </a:extLst>
+          </p:cNvPr>
+          <p:cNvSpPr/>
+          <p:nvPr/>
+        </p:nvSpPr>
+        <p:spPr>
+          <a:xfrm>
+            <a:off x="237912" y="1643056"/>
+            <a:ext cx="3829263" cy="3871919"/>
+          </a:xfrm>
+          <a:prstGeom prst="noSmoking">
+            <a:avLst>
+              <a:gd name="adj" fmla="val 5435"/>
+            </a:avLst>
+          </a:prstGeom>
+          <a:solidFill>
+            <a:srgbClr val="C00000"/>
+          </a:solidFill>
+          <a:ln w="6350"/>
+        </p:spPr>
+        <p:style>
+          <a:lnRef idx="2">
+            <a:schemeClr val="accent1">
+              <a:shade val="50000"/>
+            </a:schemeClr>
+          </a:lnRef>
+          <a:fillRef idx="1">
+            <a:schemeClr val="accent1"/>
+          </a:fillRef>
+          <a:effectRef idx="0">
+            <a:schemeClr val="accent1"/>
+          </a:effectRef>
+          <a:fontRef idx="minor">
+            <a:schemeClr val="lt1"/>
+          </a:fontRef>
+        </p:style>
+        <p:txBody>
+          <a:bodyPr rtlCol="0" anchor="ctr"/>
+          <a:lstStyle/>
+          <a:p>
+            <a:pPr algn="ctr"/>
+            <a:endParaRPr lang="en-US">
+              <a:solidFill>
+                <a:schemeClr val="tx1"/>
+              </a:solidFill>
+            </a:endParaRPr>
+          </a:p>
+        </p:txBody>
+      </p:sp>
+      <p:sp>
+        <p:nvSpPr>
+          <p:cNvPr id="13" name="&quot;Not Allowed&quot; Symbol 12">
+            <a:extLst>
+              <a:ext uri="{FF2B5EF4-FFF2-40B4-BE49-F238E27FC236}">
+                <a16:creationId xmlns:a16="http://schemas.microsoft.com/office/drawing/2014/main" id="{EAE083D9-33A4-47FA-AF40-940F20BF3BD4}"/>
+              </a:ext>
+            </a:extLst>
+          </p:cNvPr>
+          <p:cNvSpPr/>
+          <p:nvPr/>
+        </p:nvSpPr>
+        <p:spPr>
+          <a:xfrm>
+            <a:off x="4128886" y="1597288"/>
+            <a:ext cx="3829263" cy="3991532"/>
+          </a:xfrm>
+          <a:prstGeom prst="noSmoking">
+            <a:avLst>
+              <a:gd name="adj" fmla="val 5435"/>
+            </a:avLst>
+          </a:prstGeom>
+          <a:solidFill>
+            <a:srgbClr val="C00000"/>
+          </a:solidFill>
+          <a:ln w="6350"/>
+        </p:spPr>
+        <p:style>
+          <a:lnRef idx="2">
+            <a:schemeClr val="accent1">
+              <a:shade val="50000"/>
+            </a:schemeClr>
+          </a:lnRef>
+          <a:fillRef idx="1">
+            <a:schemeClr val="accent1"/>
+          </a:fillRef>
+          <a:effectRef idx="0">
+            <a:schemeClr val="accent1"/>
+          </a:effectRef>
+          <a:fontRef idx="minor">
+            <a:schemeClr val="lt1"/>
+          </a:fontRef>
+        </p:style>
+        <p:txBody>
+          <a:bodyPr rtlCol="0" anchor="ctr"/>
+          <a:lstStyle/>
+          <a:p>
+            <a:pPr algn="ctr"/>
+            <a:endParaRPr lang="en-US">
+              <a:solidFill>
+                <a:schemeClr val="tx1"/>
+              </a:solidFill>
+            </a:endParaRPr>
+          </a:p>
+        </p:txBody>
+      </p:sp>
+      <p:sp>
+        <p:nvSpPr>
+          <p:cNvPr id="15" name="Circle: Hollow 14">
+            <a:extLst>
+              <a:ext uri="{FF2B5EF4-FFF2-40B4-BE49-F238E27FC236}">
+                <a16:creationId xmlns:a16="http://schemas.microsoft.com/office/drawing/2014/main" id="{5710972A-11B6-4613-87D7-7CC86C000514}"/>
+              </a:ext>
+            </a:extLst>
+          </p:cNvPr>
+          <p:cNvSpPr/>
+          <p:nvPr/>
+        </p:nvSpPr>
+        <p:spPr>
+          <a:xfrm>
+            <a:off x="8080811" y="1583249"/>
+            <a:ext cx="3829263" cy="3991532"/>
+          </a:xfrm>
+          <a:prstGeom prst="donut">
+            <a:avLst>
+              <a:gd name="adj" fmla="val 4996"/>
+            </a:avLst>
+          </a:prstGeom>
+          <a:solidFill>
+            <a:schemeClr val="accent6"/>
+          </a:solidFill>
+        </p:spPr>
+        <p:style>
+          <a:lnRef idx="2">
+            <a:schemeClr val="accent1">
+              <a:shade val="50000"/>
+            </a:schemeClr>
+          </a:lnRef>
+          <a:fillRef idx="1">
+            <a:schemeClr val="accent1"/>
+          </a:fillRef>
+          <a:effectRef idx="0">
+            <a:schemeClr val="accent1"/>
+          </a:effectRef>
+          <a:fontRef idx="minor">
+            <a:schemeClr val="lt1"/>
+          </a:fontRef>
+        </p:style>
+        <p:txBody>
+          <a:bodyPr rtlCol="0" anchor="ctr"/>
+          <a:lstStyle/>
+          <a:p>
+            <a:pPr algn="ctr"/>
+            <a:endParaRPr lang="en-US">
+              <a:solidFill>
+                <a:schemeClr val="tx1"/>
+              </a:solidFill>
+            </a:endParaRPr>
           </a:p>
         </p:txBody>
       </p:sp>
@@ -9761,6 +9975,311 @@
   <p:clrMapOvr>
     <a:masterClrMapping/>
   </p:clrMapOvr>
+  <p:timing>
+    <p:tnLst>
+      <p:par>
+        <p:cTn id="1" dur="indefinite" restart="never" nodeType="tmRoot">
+          <p:childTnLst>
+            <p:seq concurrent="1" nextAc="seek">
+              <p:cTn id="2" dur="indefinite" nodeType="mainSeq">
+                <p:childTnLst>
+                  <p:par>
+                    <p:cTn id="3" fill="hold">
+                      <p:stCondLst>
+                        <p:cond delay="indefinite"/>
+                      </p:stCondLst>
+                      <p:childTnLst>
+                        <p:par>
+                          <p:cTn id="4" fill="hold">
+                            <p:stCondLst>
+                              <p:cond delay="0"/>
+                            </p:stCondLst>
+                            <p:childTnLst>
+                              <p:par>
+                                <p:cTn id="5" presetID="1" presetClass="entr" presetSubtype="0" fill="hold" nodeType="clickEffect">
+                                  <p:stCondLst>
+                                    <p:cond delay="0"/>
+                                  </p:stCondLst>
+                                  <p:childTnLst>
+                                    <p:set>
+                                      <p:cBhvr>
+                                        <p:cTn id="6" dur="1" fill="hold">
+                                          <p:stCondLst>
+                                            <p:cond delay="0"/>
+                                          </p:stCondLst>
+                                        </p:cTn>
+                                        <p:tgtEl>
+                                          <p:spTgt spid="11"/>
+                                        </p:tgtEl>
+                                        <p:attrNameLst>
+                                          <p:attrName>style.visibility</p:attrName>
+                                        </p:attrNameLst>
+                                      </p:cBhvr>
+                                      <p:to>
+                                        <p:strVal val="visible"/>
+                                      </p:to>
+                                    </p:set>
+                                  </p:childTnLst>
+                                </p:cTn>
+                              </p:par>
+                            </p:childTnLst>
+                          </p:cTn>
+                        </p:par>
+                      </p:childTnLst>
+                    </p:cTn>
+                  </p:par>
+                  <p:par>
+                    <p:cTn id="7" fill="hold">
+                      <p:stCondLst>
+                        <p:cond delay="indefinite"/>
+                      </p:stCondLst>
+                      <p:childTnLst>
+                        <p:par>
+                          <p:cTn id="8" fill="hold">
+                            <p:stCondLst>
+                              <p:cond delay="0"/>
+                            </p:stCondLst>
+                            <p:childTnLst>
+                              <p:par>
+                                <p:cTn id="9" presetID="1" presetClass="entr" presetSubtype="0" fill="hold" grpId="0" nodeType="clickEffect">
+                                  <p:stCondLst>
+                                    <p:cond delay="0"/>
+                                  </p:stCondLst>
+                                  <p:childTnLst>
+                                    <p:set>
+                                      <p:cBhvr>
+                                        <p:cTn id="10" dur="1" fill="hold">
+                                          <p:stCondLst>
+                                            <p:cond delay="0"/>
+                                          </p:stCondLst>
+                                        </p:cTn>
+                                        <p:tgtEl>
+                                          <p:spTgt spid="12"/>
+                                        </p:tgtEl>
+                                        <p:attrNameLst>
+                                          <p:attrName>style.visibility</p:attrName>
+                                        </p:attrNameLst>
+                                      </p:cBhvr>
+                                      <p:to>
+                                        <p:strVal val="visible"/>
+                                      </p:to>
+                                    </p:set>
+                                  </p:childTnLst>
+                                </p:cTn>
+                              </p:par>
+                            </p:childTnLst>
+                          </p:cTn>
+                        </p:par>
+                      </p:childTnLst>
+                    </p:cTn>
+                  </p:par>
+                  <p:par>
+                    <p:cTn id="11" fill="hold">
+                      <p:stCondLst>
+                        <p:cond delay="indefinite"/>
+                      </p:stCondLst>
+                      <p:childTnLst>
+                        <p:par>
+                          <p:cTn id="12" fill="hold">
+                            <p:stCondLst>
+                              <p:cond delay="0"/>
+                            </p:stCondLst>
+                            <p:childTnLst>
+                              <p:par>
+                                <p:cTn id="13" presetID="1" presetClass="entr" presetSubtype="0" fill="hold" nodeType="clickEffect">
+                                  <p:stCondLst>
+                                    <p:cond delay="0"/>
+                                  </p:stCondLst>
+                                  <p:childTnLst>
+                                    <p:set>
+                                      <p:cBhvr>
+                                        <p:cTn id="14" dur="1" fill="hold">
+                                          <p:stCondLst>
+                                            <p:cond delay="0"/>
+                                          </p:stCondLst>
+                                        </p:cTn>
+                                        <p:tgtEl>
+                                          <p:spTgt spid="9"/>
+                                        </p:tgtEl>
+                                        <p:attrNameLst>
+                                          <p:attrName>style.visibility</p:attrName>
+                                        </p:attrNameLst>
+                                      </p:cBhvr>
+                                      <p:to>
+                                        <p:strVal val="visible"/>
+                                      </p:to>
+                                    </p:set>
+                                  </p:childTnLst>
+                                </p:cTn>
+                              </p:par>
+                            </p:childTnLst>
+                          </p:cTn>
+                        </p:par>
+                      </p:childTnLst>
+                    </p:cTn>
+                  </p:par>
+                  <p:par>
+                    <p:cTn id="15" fill="hold">
+                      <p:stCondLst>
+                        <p:cond delay="indefinite"/>
+                      </p:stCondLst>
+                      <p:childTnLst>
+                        <p:par>
+                          <p:cTn id="16" fill="hold">
+                            <p:stCondLst>
+                              <p:cond delay="0"/>
+                            </p:stCondLst>
+                            <p:childTnLst>
+                              <p:par>
+                                <p:cTn id="17" presetID="1" presetClass="entr" presetSubtype="0" fill="hold" grpId="0" nodeType="clickEffect">
+                                  <p:stCondLst>
+                                    <p:cond delay="0"/>
+                                  </p:stCondLst>
+                                  <p:childTnLst>
+                                    <p:set>
+                                      <p:cBhvr>
+                                        <p:cTn id="18" dur="1" fill="hold">
+                                          <p:stCondLst>
+                                            <p:cond delay="0"/>
+                                          </p:stCondLst>
+                                        </p:cTn>
+                                        <p:tgtEl>
+                                          <p:spTgt spid="13"/>
+                                        </p:tgtEl>
+                                        <p:attrNameLst>
+                                          <p:attrName>style.visibility</p:attrName>
+                                        </p:attrNameLst>
+                                      </p:cBhvr>
+                                      <p:to>
+                                        <p:strVal val="visible"/>
+                                      </p:to>
+                                    </p:set>
+                                  </p:childTnLst>
+                                </p:cTn>
+                              </p:par>
+                            </p:childTnLst>
+                          </p:cTn>
+                        </p:par>
+                      </p:childTnLst>
+                    </p:cTn>
+                  </p:par>
+                  <p:par>
+                    <p:cTn id="19" fill="hold">
+                      <p:stCondLst>
+                        <p:cond delay="indefinite"/>
+                      </p:stCondLst>
+                      <p:childTnLst>
+                        <p:par>
+                          <p:cTn id="20" fill="hold">
+                            <p:stCondLst>
+                              <p:cond delay="0"/>
+                            </p:stCondLst>
+                            <p:childTnLst>
+                              <p:par>
+                                <p:cTn id="21" presetID="1" presetClass="entr" presetSubtype="0" fill="hold" nodeType="clickEffect">
+                                  <p:stCondLst>
+                                    <p:cond delay="0"/>
+                                  </p:stCondLst>
+                                  <p:childTnLst>
+                                    <p:set>
+                                      <p:cBhvr>
+                                        <p:cTn id="22" dur="1" fill="hold">
+                                          <p:stCondLst>
+                                            <p:cond delay="0"/>
+                                          </p:stCondLst>
+                                        </p:cTn>
+                                        <p:tgtEl>
+                                          <p:spTgt spid="7"/>
+                                        </p:tgtEl>
+                                        <p:attrNameLst>
+                                          <p:attrName>style.visibility</p:attrName>
+                                        </p:attrNameLst>
+                                      </p:cBhvr>
+                                      <p:to>
+                                        <p:strVal val="visible"/>
+                                      </p:to>
+                                    </p:set>
+                                  </p:childTnLst>
+                                </p:cTn>
+                              </p:par>
+                            </p:childTnLst>
+                          </p:cTn>
+                        </p:par>
+                      </p:childTnLst>
+                    </p:cTn>
+                  </p:par>
+                  <p:par>
+                    <p:cTn id="23" fill="hold">
+                      <p:stCondLst>
+                        <p:cond delay="indefinite"/>
+                      </p:stCondLst>
+                      <p:childTnLst>
+                        <p:par>
+                          <p:cTn id="24" fill="hold">
+                            <p:stCondLst>
+                              <p:cond delay="0"/>
+                            </p:stCondLst>
+                            <p:childTnLst>
+                              <p:par>
+                                <p:cTn id="25" presetID="1" presetClass="entr" presetSubtype="0" fill="hold" grpId="0" nodeType="clickEffect">
+                                  <p:stCondLst>
+                                    <p:cond delay="0"/>
+                                  </p:stCondLst>
+                                  <p:childTnLst>
+                                    <p:set>
+                                      <p:cBhvr>
+                                        <p:cTn id="26" dur="1" fill="hold">
+                                          <p:stCondLst>
+                                            <p:cond delay="0"/>
+                                          </p:stCondLst>
+                                        </p:cTn>
+                                        <p:tgtEl>
+                                          <p:spTgt spid="15"/>
+                                        </p:tgtEl>
+                                        <p:attrNameLst>
+                                          <p:attrName>style.visibility</p:attrName>
+                                        </p:attrNameLst>
+                                      </p:cBhvr>
+                                      <p:to>
+                                        <p:strVal val="visible"/>
+                                      </p:to>
+                                    </p:set>
+                                  </p:childTnLst>
+                                </p:cTn>
+                              </p:par>
+                            </p:childTnLst>
+                          </p:cTn>
+                        </p:par>
+                      </p:childTnLst>
+                    </p:cTn>
+                  </p:par>
+                </p:childTnLst>
+              </p:cTn>
+              <p:prevCondLst>
+                <p:cond evt="onPrev" delay="0">
+                  <p:tgtEl>
+                    <p:sldTgt/>
+                  </p:tgtEl>
+                </p:cond>
+              </p:prevCondLst>
+              <p:nextCondLst>
+                <p:cond evt="onNext" delay="0">
+                  <p:tgtEl>
+                    <p:sldTgt/>
+                  </p:tgtEl>
+                </p:cond>
+              </p:nextCondLst>
+            </p:seq>
+          </p:childTnLst>
+        </p:cTn>
+      </p:par>
+    </p:tnLst>
+    <p:bldLst>
+      <p:bldP spid="12" grpId="0" animBg="1"/>
+      <p:bldP spid="13" grpId="0" animBg="1"/>
+      <p:bldP spid="15" grpId="0" animBg="1"/>
+    </p:bldLst>
+  </p:timing>
 </p:sld>
 </file>
 
@@ -9797,78 +10316,467 @@
             <p:ph type="title"/>
           </p:nvPr>
         </p:nvSpPr>
-        <p:spPr/>
-        <p:txBody>
-          <a:bodyPr/>
-          <a:lstStyle/>
-          <a:p>
-            <a:r>
-              <a:rPr lang="en-US" dirty="0"/>
-              <a:t>Team stance - conceptual</a:t>
-            </a:r>
-          </a:p>
-        </p:txBody>
-      </p:sp>
-      <p:sp>
-        <p:nvSpPr>
-          <p:cNvPr id="3" name="Content Placeholder 2">
-            <a:extLst>
-              <a:ext uri="{FF2B5EF4-FFF2-40B4-BE49-F238E27FC236}">
-                <a16:creationId xmlns:a16="http://schemas.microsoft.com/office/drawing/2014/main" id="{16C7E745-13A2-4F9F-BF27-DAE4DDDFF7CE}"/>
-              </a:ext>
-            </a:extLst>
-          </p:cNvPr>
-          <p:cNvSpPr>
-            <a:spLocks noGrp="1"/>
-          </p:cNvSpPr>
-          <p:nvPr>
-            <p:ph idx="1"/>
-          </p:nvPr>
-        </p:nvSpPr>
-        <p:spPr/>
-        <p:txBody>
-          <a:bodyPr/>
-          <a:lstStyle/>
-          <a:p>
-            <a:r>
-              <a:rPr lang="en-US" dirty="0"/>
-              <a:t>Yes: present strategy &amp; delta from last time</a:t>
-            </a:r>
-          </a:p>
-          <a:p>
-            <a:r>
-              <a:rPr lang="en-US" dirty="0"/>
-              <a:t>Yes: present why made changes  / what you learned</a:t>
-            </a:r>
-          </a:p>
-          <a:p>
-            <a:r>
-              <a:rPr lang="en-US" dirty="0"/>
-              <a:t>Yes: ask for resources you need</a:t>
-            </a:r>
-          </a:p>
-          <a:p>
-            <a:r>
-              <a:rPr lang="en-US" dirty="0"/>
-              <a:t>No: ask leader what you should do</a:t>
-            </a:r>
-          </a:p>
-          <a:p>
-            <a:r>
-              <a:rPr lang="en-US" dirty="0"/>
-              <a:t>No: ask leader </a:t>
-            </a:r>
-            <a:r>
-              <a:rPr lang="en-US"/>
-              <a:t>for permission</a:t>
-            </a:r>
-            <a:endParaRPr lang="en-US" dirty="0"/>
-          </a:p>
-          <a:p>
-            <a:pPr marL="0" indent="0">
-              <a:buNone/>
-            </a:pPr>
-            <a:endParaRPr lang="en-US" dirty="0"/>
+        <p:spPr>
+          <a:xfrm>
+            <a:off x="838200" y="155575"/>
+            <a:ext cx="10515600" cy="1325563"/>
+          </a:xfrm>
+        </p:spPr>
+        <p:txBody>
+          <a:bodyPr/>
+          <a:lstStyle/>
+          <a:p>
+            <a:r>
+              <a:rPr lang="en-US" dirty="0"/>
+              <a:t>Team Stance</a:t>
+            </a:r>
+          </a:p>
+        </p:txBody>
+      </p:sp>
+      <p:pic>
+        <p:nvPicPr>
+          <p:cNvPr id="9" name="Picture 8">
+            <a:extLst>
+              <a:ext uri="{FF2B5EF4-FFF2-40B4-BE49-F238E27FC236}">
+                <a16:creationId xmlns:a16="http://schemas.microsoft.com/office/drawing/2014/main" id="{0A74B796-40E8-4864-AE09-215650904478}"/>
+              </a:ext>
+            </a:extLst>
+          </p:cNvPr>
+          <p:cNvPicPr>
+            <a:picLocks noChangeAspect="1"/>
+          </p:cNvPicPr>
+          <p:nvPr/>
+        </p:nvPicPr>
+        <p:blipFill>
+          <a:blip r:embed="rId3">
+            <a:extLst>
+              <a:ext uri="{28A0092B-C50C-407E-A947-70E740481C1C}">
+                <a14:useLocalDpi xmlns:a14="http://schemas.microsoft.com/office/drawing/2010/main" val="0"/>
+              </a:ext>
+            </a:extLst>
+          </a:blip>
+          <a:stretch>
+            <a:fillRect/>
+          </a:stretch>
+        </p:blipFill>
+        <p:spPr>
+          <a:xfrm>
+            <a:off x="366479" y="1614197"/>
+            <a:ext cx="2248214" cy="4201111"/>
+          </a:xfrm>
+          <a:prstGeom prst="rect">
+            <a:avLst/>
+          </a:prstGeom>
+        </p:spPr>
+      </p:pic>
+      <p:pic>
+        <p:nvPicPr>
+          <p:cNvPr id="11" name="Picture 10">
+            <a:extLst>
+              <a:ext uri="{FF2B5EF4-FFF2-40B4-BE49-F238E27FC236}">
+                <a16:creationId xmlns:a16="http://schemas.microsoft.com/office/drawing/2014/main" id="{59C2329E-9F3E-48FE-9139-96187C14489D}"/>
+              </a:ext>
+            </a:extLst>
+          </p:cNvPr>
+          <p:cNvPicPr>
+            <a:picLocks noChangeAspect="1"/>
+          </p:cNvPicPr>
+          <p:nvPr/>
+        </p:nvPicPr>
+        <p:blipFill>
+          <a:blip r:embed="rId4">
+            <a:extLst>
+              <a:ext uri="{28A0092B-C50C-407E-A947-70E740481C1C}">
+                <a14:useLocalDpi xmlns:a14="http://schemas.microsoft.com/office/drawing/2010/main" val="0"/>
+              </a:ext>
+            </a:extLst>
+          </a:blip>
+          <a:stretch>
+            <a:fillRect/>
+          </a:stretch>
+        </p:blipFill>
+        <p:spPr>
+          <a:xfrm>
+            <a:off x="2614693" y="1742800"/>
+            <a:ext cx="2286319" cy="4201111"/>
+          </a:xfrm>
+          <a:prstGeom prst="rect">
+            <a:avLst/>
+          </a:prstGeom>
+        </p:spPr>
+      </p:pic>
+      <p:pic>
+        <p:nvPicPr>
+          <p:cNvPr id="13" name="Picture 12">
+            <a:extLst>
+              <a:ext uri="{FF2B5EF4-FFF2-40B4-BE49-F238E27FC236}">
+                <a16:creationId xmlns:a16="http://schemas.microsoft.com/office/drawing/2014/main" id="{D4D88BEB-C79D-4FC9-BF7A-6C2DD9592D26}"/>
+              </a:ext>
+            </a:extLst>
+          </p:cNvPr>
+          <p:cNvPicPr>
+            <a:picLocks noChangeAspect="1"/>
+          </p:cNvPicPr>
+          <p:nvPr/>
+        </p:nvPicPr>
+        <p:blipFill>
+          <a:blip r:embed="rId5">
+            <a:extLst>
+              <a:ext uri="{28A0092B-C50C-407E-A947-70E740481C1C}">
+                <a14:useLocalDpi xmlns:a14="http://schemas.microsoft.com/office/drawing/2010/main" val="0"/>
+              </a:ext>
+            </a:extLst>
+          </a:blip>
+          <a:stretch>
+            <a:fillRect/>
+          </a:stretch>
+        </p:blipFill>
+        <p:spPr>
+          <a:xfrm>
+            <a:off x="9615882" y="1680881"/>
+            <a:ext cx="2267266" cy="4153480"/>
+          </a:xfrm>
+          <a:prstGeom prst="rect">
+            <a:avLst/>
+          </a:prstGeom>
+        </p:spPr>
+      </p:pic>
+      <p:pic>
+        <p:nvPicPr>
+          <p:cNvPr id="15" name="Picture 14">
+            <a:extLst>
+              <a:ext uri="{FF2B5EF4-FFF2-40B4-BE49-F238E27FC236}">
+                <a16:creationId xmlns:a16="http://schemas.microsoft.com/office/drawing/2014/main" id="{FB6789C7-E6A0-4204-BBEC-D533D7465861}"/>
+              </a:ext>
+            </a:extLst>
+          </p:cNvPr>
+          <p:cNvPicPr>
+            <a:picLocks noChangeAspect="1"/>
+          </p:cNvPicPr>
+          <p:nvPr/>
+        </p:nvPicPr>
+        <p:blipFill>
+          <a:blip r:embed="rId6">
+            <a:extLst>
+              <a:ext uri="{28A0092B-C50C-407E-A947-70E740481C1C}">
+                <a14:useLocalDpi xmlns:a14="http://schemas.microsoft.com/office/drawing/2010/main" val="0"/>
+              </a:ext>
+            </a:extLst>
+          </a:blip>
+          <a:stretch>
+            <a:fillRect/>
+          </a:stretch>
+        </p:blipFill>
+        <p:spPr>
+          <a:xfrm>
+            <a:off x="7312808" y="1742800"/>
+            <a:ext cx="2067213" cy="4182059"/>
+          </a:xfrm>
+          <a:prstGeom prst="rect">
+            <a:avLst/>
+          </a:prstGeom>
+        </p:spPr>
+      </p:pic>
+      <p:pic>
+        <p:nvPicPr>
+          <p:cNvPr id="17" name="Picture 16">
+            <a:extLst>
+              <a:ext uri="{FF2B5EF4-FFF2-40B4-BE49-F238E27FC236}">
+                <a16:creationId xmlns:a16="http://schemas.microsoft.com/office/drawing/2014/main" id="{B8F3706C-3E9D-42D3-8F09-76F67AFC894B}"/>
+              </a:ext>
+            </a:extLst>
+          </p:cNvPr>
+          <p:cNvPicPr>
+            <a:picLocks noChangeAspect="1"/>
+          </p:cNvPicPr>
+          <p:nvPr/>
+        </p:nvPicPr>
+        <p:blipFill>
+          <a:blip r:embed="rId7">
+            <a:extLst>
+              <a:ext uri="{28A0092B-C50C-407E-A947-70E740481C1C}">
+                <a14:useLocalDpi xmlns:a14="http://schemas.microsoft.com/office/drawing/2010/main" val="0"/>
+              </a:ext>
+            </a:extLst>
+          </a:blip>
+          <a:stretch>
+            <a:fillRect/>
+          </a:stretch>
+        </p:blipFill>
+        <p:spPr>
+          <a:xfrm>
+            <a:off x="4948644" y="1909634"/>
+            <a:ext cx="2200582" cy="3962953"/>
+          </a:xfrm>
+          <a:prstGeom prst="rect">
+            <a:avLst/>
+          </a:prstGeom>
+        </p:spPr>
+      </p:pic>
+      <p:sp>
+        <p:nvSpPr>
+          <p:cNvPr id="18" name="Multiplication Sign 17">
+            <a:extLst>
+              <a:ext uri="{FF2B5EF4-FFF2-40B4-BE49-F238E27FC236}">
+                <a16:creationId xmlns:a16="http://schemas.microsoft.com/office/drawing/2014/main" id="{C681D28A-A0A4-4BCA-837B-0ECBA46A77CE}"/>
+              </a:ext>
+            </a:extLst>
+          </p:cNvPr>
+          <p:cNvSpPr/>
+          <p:nvPr/>
+        </p:nvSpPr>
+        <p:spPr>
+          <a:xfrm>
+            <a:off x="-203489" y="685836"/>
+            <a:ext cx="3481621" cy="3571875"/>
+          </a:xfrm>
+          <a:prstGeom prst="mathMultiply">
+            <a:avLst>
+              <a:gd name="adj1" fmla="val 4917"/>
+            </a:avLst>
+          </a:prstGeom>
+          <a:solidFill>
+            <a:srgbClr val="C00000"/>
+          </a:solidFill>
+        </p:spPr>
+        <p:style>
+          <a:lnRef idx="2">
+            <a:schemeClr val="accent1">
+              <a:shade val="50000"/>
+            </a:schemeClr>
+          </a:lnRef>
+          <a:fillRef idx="1">
+            <a:schemeClr val="accent1"/>
+          </a:fillRef>
+          <a:effectRef idx="0">
+            <a:schemeClr val="accent1"/>
+          </a:effectRef>
+          <a:fontRef idx="minor">
+            <a:schemeClr val="lt1"/>
+          </a:fontRef>
+        </p:style>
+        <p:txBody>
+          <a:bodyPr rtlCol="0" anchor="ctr"/>
+          <a:lstStyle/>
+          <a:p>
+            <a:pPr algn="ctr"/>
+            <a:endParaRPr lang="en-US"/>
+          </a:p>
+        </p:txBody>
+      </p:sp>
+      <p:sp>
+        <p:nvSpPr>
+          <p:cNvPr id="19" name="Multiplication Sign 18">
+            <a:extLst>
+              <a:ext uri="{FF2B5EF4-FFF2-40B4-BE49-F238E27FC236}">
+                <a16:creationId xmlns:a16="http://schemas.microsoft.com/office/drawing/2014/main" id="{C37DB09C-10C1-4B25-BFF8-4D72501A74E9}"/>
+              </a:ext>
+            </a:extLst>
+          </p:cNvPr>
+          <p:cNvSpPr/>
+          <p:nvPr/>
+        </p:nvSpPr>
+        <p:spPr>
+          <a:xfrm>
+            <a:off x="2093534" y="750137"/>
+            <a:ext cx="3481621" cy="3571875"/>
+          </a:xfrm>
+          <a:prstGeom prst="mathMultiply">
+            <a:avLst>
+              <a:gd name="adj1" fmla="val 4917"/>
+            </a:avLst>
+          </a:prstGeom>
+          <a:solidFill>
+            <a:srgbClr val="C00000"/>
+          </a:solidFill>
+        </p:spPr>
+        <p:style>
+          <a:lnRef idx="2">
+            <a:schemeClr val="accent1">
+              <a:shade val="50000"/>
+            </a:schemeClr>
+          </a:lnRef>
+          <a:fillRef idx="1">
+            <a:schemeClr val="accent1"/>
+          </a:fillRef>
+          <a:effectRef idx="0">
+            <a:schemeClr val="accent1"/>
+          </a:effectRef>
+          <a:fontRef idx="minor">
+            <a:schemeClr val="lt1"/>
+          </a:fontRef>
+        </p:style>
+        <p:txBody>
+          <a:bodyPr rtlCol="0" anchor="ctr"/>
+          <a:lstStyle/>
+          <a:p>
+            <a:pPr algn="ctr"/>
+            <a:endParaRPr lang="en-US"/>
+          </a:p>
+        </p:txBody>
+      </p:sp>
+      <p:sp>
+        <p:nvSpPr>
+          <p:cNvPr id="20" name="Circle: Hollow 19">
+            <a:extLst>
+              <a:ext uri="{FF2B5EF4-FFF2-40B4-BE49-F238E27FC236}">
+                <a16:creationId xmlns:a16="http://schemas.microsoft.com/office/drawing/2014/main" id="{58A6968D-1EDA-4702-BBA1-6F5C497B183C}"/>
+              </a:ext>
+            </a:extLst>
+          </p:cNvPr>
+          <p:cNvSpPr/>
+          <p:nvPr/>
+        </p:nvSpPr>
+        <p:spPr>
+          <a:xfrm>
+            <a:off x="4779924" y="1479486"/>
+            <a:ext cx="2297023" cy="2211163"/>
+          </a:xfrm>
+          <a:prstGeom prst="donut">
+            <a:avLst>
+              <a:gd name="adj" fmla="val 4996"/>
+            </a:avLst>
+          </a:prstGeom>
+          <a:solidFill>
+            <a:schemeClr val="accent6"/>
+          </a:solidFill>
+        </p:spPr>
+        <p:style>
+          <a:lnRef idx="2">
+            <a:schemeClr val="accent1">
+              <a:shade val="50000"/>
+            </a:schemeClr>
+          </a:lnRef>
+          <a:fillRef idx="1">
+            <a:schemeClr val="accent1"/>
+          </a:fillRef>
+          <a:effectRef idx="0">
+            <a:schemeClr val="accent1"/>
+          </a:effectRef>
+          <a:fontRef idx="minor">
+            <a:schemeClr val="lt1"/>
+          </a:fontRef>
+        </p:style>
+        <p:txBody>
+          <a:bodyPr rtlCol="0" anchor="ctr"/>
+          <a:lstStyle/>
+          <a:p>
+            <a:pPr algn="ctr"/>
+            <a:endParaRPr lang="en-US">
+              <a:solidFill>
+                <a:schemeClr val="tx1"/>
+              </a:solidFill>
+            </a:endParaRPr>
+          </a:p>
+        </p:txBody>
+      </p:sp>
+      <p:sp>
+        <p:nvSpPr>
+          <p:cNvPr id="21" name="Circle: Hollow 20">
+            <a:extLst>
+              <a:ext uri="{FF2B5EF4-FFF2-40B4-BE49-F238E27FC236}">
+                <a16:creationId xmlns:a16="http://schemas.microsoft.com/office/drawing/2014/main" id="{AAF32C59-2CC6-4722-ACAA-A0E75751779D}"/>
+              </a:ext>
+            </a:extLst>
+          </p:cNvPr>
+          <p:cNvSpPr/>
+          <p:nvPr/>
+        </p:nvSpPr>
+        <p:spPr>
+          <a:xfrm>
+            <a:off x="7112755" y="1378195"/>
+            <a:ext cx="2267266" cy="2211163"/>
+          </a:xfrm>
+          <a:prstGeom prst="donut">
+            <a:avLst>
+              <a:gd name="adj" fmla="val 4996"/>
+            </a:avLst>
+          </a:prstGeom>
+          <a:solidFill>
+            <a:schemeClr val="accent6"/>
+          </a:solidFill>
+        </p:spPr>
+        <p:style>
+          <a:lnRef idx="2">
+            <a:schemeClr val="accent1">
+              <a:shade val="50000"/>
+            </a:schemeClr>
+          </a:lnRef>
+          <a:fillRef idx="1">
+            <a:schemeClr val="accent1"/>
+          </a:fillRef>
+          <a:effectRef idx="0">
+            <a:schemeClr val="accent1"/>
+          </a:effectRef>
+          <a:fontRef idx="minor">
+            <a:schemeClr val="lt1"/>
+          </a:fontRef>
+        </p:style>
+        <p:txBody>
+          <a:bodyPr rtlCol="0" anchor="ctr"/>
+          <a:lstStyle/>
+          <a:p>
+            <a:pPr algn="ctr"/>
+            <a:endParaRPr lang="en-US">
+              <a:solidFill>
+                <a:schemeClr val="tx1"/>
+              </a:solidFill>
+            </a:endParaRPr>
+          </a:p>
+        </p:txBody>
+      </p:sp>
+      <p:sp>
+        <p:nvSpPr>
+          <p:cNvPr id="23" name="Circle: Hollow 22">
+            <a:extLst>
+              <a:ext uri="{FF2B5EF4-FFF2-40B4-BE49-F238E27FC236}">
+                <a16:creationId xmlns:a16="http://schemas.microsoft.com/office/drawing/2014/main" id="{210AA1BA-AC7E-4690-99CA-FFD8D9EE7D8B}"/>
+              </a:ext>
+            </a:extLst>
+          </p:cNvPr>
+          <p:cNvSpPr/>
+          <p:nvPr/>
+        </p:nvSpPr>
+        <p:spPr>
+          <a:xfrm>
+            <a:off x="9488743" y="1400817"/>
+            <a:ext cx="2297023" cy="2211163"/>
+          </a:xfrm>
+          <a:prstGeom prst="donut">
+            <a:avLst>
+              <a:gd name="adj" fmla="val 4996"/>
+            </a:avLst>
+          </a:prstGeom>
+          <a:solidFill>
+            <a:schemeClr val="accent6"/>
+          </a:solidFill>
+        </p:spPr>
+        <p:style>
+          <a:lnRef idx="2">
+            <a:schemeClr val="accent1">
+              <a:shade val="50000"/>
+            </a:schemeClr>
+          </a:lnRef>
+          <a:fillRef idx="1">
+            <a:schemeClr val="accent1"/>
+          </a:fillRef>
+          <a:effectRef idx="0">
+            <a:schemeClr val="accent1"/>
+          </a:effectRef>
+          <a:fontRef idx="minor">
+            <a:schemeClr val="lt1"/>
+          </a:fontRef>
+        </p:style>
+        <p:txBody>
+          <a:bodyPr rtlCol="0" anchor="ctr"/>
+          <a:lstStyle/>
+          <a:p>
+            <a:pPr algn="ctr"/>
+            <a:endParaRPr lang="en-US">
+              <a:solidFill>
+                <a:schemeClr val="tx1"/>
+              </a:solidFill>
+            </a:endParaRPr>
           </a:p>
         </p:txBody>
       </p:sp>
@@ -9882,6 +10790,493 @@
   <p:clrMapOvr>
     <a:masterClrMapping/>
   </p:clrMapOvr>
+  <p:timing>
+    <p:tnLst>
+      <p:par>
+        <p:cTn id="1" dur="indefinite" restart="never" nodeType="tmRoot">
+          <p:childTnLst>
+            <p:seq concurrent="1" nextAc="seek">
+              <p:cTn id="2" dur="indefinite" nodeType="mainSeq">
+                <p:childTnLst>
+                  <p:par>
+                    <p:cTn id="3" fill="hold">
+                      <p:stCondLst>
+                        <p:cond delay="indefinite"/>
+                      </p:stCondLst>
+                      <p:childTnLst>
+                        <p:par>
+                          <p:cTn id="4" fill="hold">
+                            <p:stCondLst>
+                              <p:cond delay="0"/>
+                            </p:stCondLst>
+                            <p:childTnLst>
+                              <p:par>
+                                <p:cTn id="5" presetID="1" presetClass="entr" presetSubtype="0" fill="hold" nodeType="clickEffect">
+                                  <p:stCondLst>
+                                    <p:cond delay="0"/>
+                                  </p:stCondLst>
+                                  <p:childTnLst>
+                                    <p:set>
+                                      <p:cBhvr>
+                                        <p:cTn id="6" dur="1" fill="hold">
+                                          <p:stCondLst>
+                                            <p:cond delay="0"/>
+                                          </p:stCondLst>
+                                        </p:cTn>
+                                        <p:tgtEl>
+                                          <p:spTgt spid="9"/>
+                                        </p:tgtEl>
+                                        <p:attrNameLst>
+                                          <p:attrName>style.visibility</p:attrName>
+                                        </p:attrNameLst>
+                                      </p:cBhvr>
+                                      <p:to>
+                                        <p:strVal val="visible"/>
+                                      </p:to>
+                                    </p:set>
+                                  </p:childTnLst>
+                                </p:cTn>
+                              </p:par>
+                            </p:childTnLst>
+                          </p:cTn>
+                        </p:par>
+                      </p:childTnLst>
+                    </p:cTn>
+                  </p:par>
+                  <p:par>
+                    <p:cTn id="7" fill="hold">
+                      <p:stCondLst>
+                        <p:cond delay="indefinite"/>
+                      </p:stCondLst>
+                      <p:childTnLst>
+                        <p:par>
+                          <p:cTn id="8" fill="hold">
+                            <p:stCondLst>
+                              <p:cond delay="0"/>
+                            </p:stCondLst>
+                            <p:childTnLst>
+                              <p:par>
+                                <p:cTn id="9" presetID="1" presetClass="entr" presetSubtype="0" fill="hold" grpId="0" nodeType="clickEffect">
+                                  <p:stCondLst>
+                                    <p:cond delay="0"/>
+                                  </p:stCondLst>
+                                  <p:childTnLst>
+                                    <p:set>
+                                      <p:cBhvr>
+                                        <p:cTn id="10" dur="1" fill="hold">
+                                          <p:stCondLst>
+                                            <p:cond delay="0"/>
+                                          </p:stCondLst>
+                                        </p:cTn>
+                                        <p:tgtEl>
+                                          <p:spTgt spid="18"/>
+                                        </p:tgtEl>
+                                        <p:attrNameLst>
+                                          <p:attrName>style.visibility</p:attrName>
+                                        </p:attrNameLst>
+                                      </p:cBhvr>
+                                      <p:to>
+                                        <p:strVal val="visible"/>
+                                      </p:to>
+                                    </p:set>
+                                  </p:childTnLst>
+                                </p:cTn>
+                              </p:par>
+                            </p:childTnLst>
+                          </p:cTn>
+                        </p:par>
+                      </p:childTnLst>
+                    </p:cTn>
+                  </p:par>
+                  <p:par>
+                    <p:cTn id="11" fill="hold">
+                      <p:stCondLst>
+                        <p:cond delay="indefinite"/>
+                      </p:stCondLst>
+                      <p:childTnLst>
+                        <p:par>
+                          <p:cTn id="12" fill="hold">
+                            <p:stCondLst>
+                              <p:cond delay="0"/>
+                            </p:stCondLst>
+                            <p:childTnLst>
+                              <p:par>
+                                <p:cTn id="13" presetID="1" presetClass="entr" presetSubtype="0" fill="hold" nodeType="clickEffect">
+                                  <p:stCondLst>
+                                    <p:cond delay="0"/>
+                                  </p:stCondLst>
+                                  <p:childTnLst>
+                                    <p:set>
+                                      <p:cBhvr>
+                                        <p:cTn id="14" dur="1" fill="hold">
+                                          <p:stCondLst>
+                                            <p:cond delay="0"/>
+                                          </p:stCondLst>
+                                        </p:cTn>
+                                        <p:tgtEl>
+                                          <p:spTgt spid="11"/>
+                                        </p:tgtEl>
+                                        <p:attrNameLst>
+                                          <p:attrName>style.visibility</p:attrName>
+                                        </p:attrNameLst>
+                                      </p:cBhvr>
+                                      <p:to>
+                                        <p:strVal val="visible"/>
+                                      </p:to>
+                                    </p:set>
+                                  </p:childTnLst>
+                                </p:cTn>
+                              </p:par>
+                            </p:childTnLst>
+                          </p:cTn>
+                        </p:par>
+                      </p:childTnLst>
+                    </p:cTn>
+                  </p:par>
+                  <p:par>
+                    <p:cTn id="15" fill="hold">
+                      <p:stCondLst>
+                        <p:cond delay="indefinite"/>
+                      </p:stCondLst>
+                      <p:childTnLst>
+                        <p:par>
+                          <p:cTn id="16" fill="hold">
+                            <p:stCondLst>
+                              <p:cond delay="0"/>
+                            </p:stCondLst>
+                            <p:childTnLst>
+                              <p:par>
+                                <p:cTn id="17" presetID="1" presetClass="entr" presetSubtype="0" fill="hold" grpId="0" nodeType="clickEffect">
+                                  <p:stCondLst>
+                                    <p:cond delay="0"/>
+                                  </p:stCondLst>
+                                  <p:childTnLst>
+                                    <p:set>
+                                      <p:cBhvr>
+                                        <p:cTn id="18" dur="1" fill="hold">
+                                          <p:stCondLst>
+                                            <p:cond delay="0"/>
+                                          </p:stCondLst>
+                                        </p:cTn>
+                                        <p:tgtEl>
+                                          <p:spTgt spid="19"/>
+                                        </p:tgtEl>
+                                        <p:attrNameLst>
+                                          <p:attrName>style.visibility</p:attrName>
+                                        </p:attrNameLst>
+                                      </p:cBhvr>
+                                      <p:to>
+                                        <p:strVal val="visible"/>
+                                      </p:to>
+                                    </p:set>
+                                  </p:childTnLst>
+                                </p:cTn>
+                              </p:par>
+                            </p:childTnLst>
+                          </p:cTn>
+                        </p:par>
+                      </p:childTnLst>
+                    </p:cTn>
+                  </p:par>
+                  <p:par>
+                    <p:cTn id="19" fill="hold">
+                      <p:stCondLst>
+                        <p:cond delay="indefinite"/>
+                      </p:stCondLst>
+                      <p:childTnLst>
+                        <p:par>
+                          <p:cTn id="20" fill="hold">
+                            <p:stCondLst>
+                              <p:cond delay="0"/>
+                            </p:stCondLst>
+                            <p:childTnLst>
+                              <p:par>
+                                <p:cTn id="21" presetID="1" presetClass="entr" presetSubtype="0" fill="hold" nodeType="clickEffect">
+                                  <p:stCondLst>
+                                    <p:cond delay="0"/>
+                                  </p:stCondLst>
+                                  <p:childTnLst>
+                                    <p:set>
+                                      <p:cBhvr>
+                                        <p:cTn id="22" dur="1" fill="hold">
+                                          <p:stCondLst>
+                                            <p:cond delay="0"/>
+                                          </p:stCondLst>
+                                        </p:cTn>
+                                        <p:tgtEl>
+                                          <p:spTgt spid="17"/>
+                                        </p:tgtEl>
+                                        <p:attrNameLst>
+                                          <p:attrName>style.visibility</p:attrName>
+                                        </p:attrNameLst>
+                                      </p:cBhvr>
+                                      <p:to>
+                                        <p:strVal val="visible"/>
+                                      </p:to>
+                                    </p:set>
+                                  </p:childTnLst>
+                                </p:cTn>
+                              </p:par>
+                            </p:childTnLst>
+                          </p:cTn>
+                        </p:par>
+                      </p:childTnLst>
+                    </p:cTn>
+                  </p:par>
+                  <p:par>
+                    <p:cTn id="23" fill="hold">
+                      <p:stCondLst>
+                        <p:cond delay="indefinite"/>
+                      </p:stCondLst>
+                      <p:childTnLst>
+                        <p:par>
+                          <p:cTn id="24" fill="hold">
+                            <p:stCondLst>
+                              <p:cond delay="0"/>
+                            </p:stCondLst>
+                            <p:childTnLst>
+                              <p:par>
+                                <p:cTn id="25" presetID="1" presetClass="entr" presetSubtype="0" fill="hold" grpId="0" nodeType="clickEffect">
+                                  <p:stCondLst>
+                                    <p:cond delay="0"/>
+                                  </p:stCondLst>
+                                  <p:childTnLst>
+                                    <p:set>
+                                      <p:cBhvr>
+                                        <p:cTn id="26" dur="1" fill="hold">
+                                          <p:stCondLst>
+                                            <p:cond delay="0"/>
+                                          </p:stCondLst>
+                                        </p:cTn>
+                                        <p:tgtEl>
+                                          <p:spTgt spid="20"/>
+                                        </p:tgtEl>
+                                        <p:attrNameLst>
+                                          <p:attrName>style.visibility</p:attrName>
+                                        </p:attrNameLst>
+                                      </p:cBhvr>
+                                      <p:to>
+                                        <p:strVal val="visible"/>
+                                      </p:to>
+                                    </p:set>
+                                  </p:childTnLst>
+                                </p:cTn>
+                              </p:par>
+                            </p:childTnLst>
+                          </p:cTn>
+                        </p:par>
+                      </p:childTnLst>
+                    </p:cTn>
+                  </p:par>
+                  <p:par>
+                    <p:cTn id="27" fill="hold">
+                      <p:stCondLst>
+                        <p:cond delay="indefinite"/>
+                      </p:stCondLst>
+                      <p:childTnLst>
+                        <p:par>
+                          <p:cTn id="28" fill="hold">
+                            <p:stCondLst>
+                              <p:cond delay="0"/>
+                            </p:stCondLst>
+                            <p:childTnLst>
+                              <p:par>
+                                <p:cTn id="29" presetID="1" presetClass="entr" presetSubtype="0" fill="hold" nodeType="clickEffect">
+                                  <p:stCondLst>
+                                    <p:cond delay="0"/>
+                                  </p:stCondLst>
+                                  <p:childTnLst>
+                                    <p:set>
+                                      <p:cBhvr>
+                                        <p:cTn id="30" dur="1" fill="hold">
+                                          <p:stCondLst>
+                                            <p:cond delay="0"/>
+                                          </p:stCondLst>
+                                        </p:cTn>
+                                        <p:tgtEl>
+                                          <p:spTgt spid="15"/>
+                                        </p:tgtEl>
+                                        <p:attrNameLst>
+                                          <p:attrName>style.visibility</p:attrName>
+                                        </p:attrNameLst>
+                                      </p:cBhvr>
+                                      <p:to>
+                                        <p:strVal val="visible"/>
+                                      </p:to>
+                                    </p:set>
+                                  </p:childTnLst>
+                                </p:cTn>
+                              </p:par>
+                            </p:childTnLst>
+                          </p:cTn>
+                        </p:par>
+                      </p:childTnLst>
+                    </p:cTn>
+                  </p:par>
+                  <p:par>
+                    <p:cTn id="31" fill="hold">
+                      <p:stCondLst>
+                        <p:cond delay="indefinite"/>
+                      </p:stCondLst>
+                      <p:childTnLst>
+                        <p:par>
+                          <p:cTn id="32" fill="hold">
+                            <p:stCondLst>
+                              <p:cond delay="0"/>
+                            </p:stCondLst>
+                            <p:childTnLst>
+                              <p:par>
+                                <p:cTn id="33" presetID="1" presetClass="entr" presetSubtype="0" fill="hold" grpId="0" nodeType="clickEffect">
+                                  <p:stCondLst>
+                                    <p:cond delay="0"/>
+                                  </p:stCondLst>
+                                  <p:childTnLst>
+                                    <p:set>
+                                      <p:cBhvr>
+                                        <p:cTn id="34" dur="1" fill="hold">
+                                          <p:stCondLst>
+                                            <p:cond delay="0"/>
+                                          </p:stCondLst>
+                                        </p:cTn>
+                                        <p:tgtEl>
+                                          <p:spTgt spid="21"/>
+                                        </p:tgtEl>
+                                        <p:attrNameLst>
+                                          <p:attrName>style.visibility</p:attrName>
+                                        </p:attrNameLst>
+                                      </p:cBhvr>
+                                      <p:to>
+                                        <p:strVal val="visible"/>
+                                      </p:to>
+                                    </p:set>
+                                  </p:childTnLst>
+                                </p:cTn>
+                              </p:par>
+                            </p:childTnLst>
+                          </p:cTn>
+                        </p:par>
+                      </p:childTnLst>
+                    </p:cTn>
+                  </p:par>
+                  <p:par>
+                    <p:cTn id="35" fill="hold">
+                      <p:stCondLst>
+                        <p:cond delay="indefinite"/>
+                      </p:stCondLst>
+                      <p:childTnLst>
+                        <p:par>
+                          <p:cTn id="36" fill="hold">
+                            <p:stCondLst>
+                              <p:cond delay="0"/>
+                            </p:stCondLst>
+                            <p:childTnLst>
+                              <p:par>
+                                <p:cTn id="37" presetID="1" presetClass="entr" presetSubtype="0" fill="hold" nodeType="clickEffect">
+                                  <p:stCondLst>
+                                    <p:cond delay="0"/>
+                                  </p:stCondLst>
+                                  <p:childTnLst>
+                                    <p:set>
+                                      <p:cBhvr>
+                                        <p:cTn id="38" dur="1" fill="hold">
+                                          <p:stCondLst>
+                                            <p:cond delay="0"/>
+                                          </p:stCondLst>
+                                        </p:cTn>
+                                        <p:tgtEl>
+                                          <p:spTgt spid="13"/>
+                                        </p:tgtEl>
+                                        <p:attrNameLst>
+                                          <p:attrName>style.visibility</p:attrName>
+                                        </p:attrNameLst>
+                                      </p:cBhvr>
+                                      <p:to>
+                                        <p:strVal val="visible"/>
+                                      </p:to>
+                                    </p:set>
+                                  </p:childTnLst>
+                                </p:cTn>
+                              </p:par>
+                            </p:childTnLst>
+                          </p:cTn>
+                        </p:par>
+                      </p:childTnLst>
+                    </p:cTn>
+                  </p:par>
+                  <p:par>
+                    <p:cTn id="39" fill="hold">
+                      <p:stCondLst>
+                        <p:cond delay="indefinite"/>
+                      </p:stCondLst>
+                      <p:childTnLst>
+                        <p:par>
+                          <p:cTn id="40" fill="hold">
+                            <p:stCondLst>
+                              <p:cond delay="0"/>
+                            </p:stCondLst>
+                            <p:childTnLst>
+                              <p:par>
+                                <p:cTn id="41" presetID="1" presetClass="entr" presetSubtype="0" fill="hold" grpId="0" nodeType="clickEffect">
+                                  <p:stCondLst>
+                                    <p:cond delay="0"/>
+                                  </p:stCondLst>
+                                  <p:childTnLst>
+                                    <p:set>
+                                      <p:cBhvr>
+                                        <p:cTn id="42" dur="1" fill="hold">
+                                          <p:stCondLst>
+                                            <p:cond delay="0"/>
+                                          </p:stCondLst>
+                                        </p:cTn>
+                                        <p:tgtEl>
+                                          <p:spTgt spid="23"/>
+                                        </p:tgtEl>
+                                        <p:attrNameLst>
+                                          <p:attrName>style.visibility</p:attrName>
+                                        </p:attrNameLst>
+                                      </p:cBhvr>
+                                      <p:to>
+                                        <p:strVal val="visible"/>
+                                      </p:to>
+                                    </p:set>
+                                  </p:childTnLst>
+                                </p:cTn>
+                              </p:par>
+                            </p:childTnLst>
+                          </p:cTn>
+                        </p:par>
+                      </p:childTnLst>
+                    </p:cTn>
+                  </p:par>
+                </p:childTnLst>
+              </p:cTn>
+              <p:prevCondLst>
+                <p:cond evt="onPrev" delay="0">
+                  <p:tgtEl>
+                    <p:sldTgt/>
+                  </p:tgtEl>
+                </p:cond>
+              </p:prevCondLst>
+              <p:nextCondLst>
+                <p:cond evt="onNext" delay="0">
+                  <p:tgtEl>
+                    <p:sldTgt/>
+                  </p:tgtEl>
+                </p:cond>
+              </p:nextCondLst>
+            </p:seq>
+          </p:childTnLst>
+        </p:cTn>
+      </p:par>
+    </p:tnLst>
+    <p:bldLst>
+      <p:bldP spid="18" grpId="0" animBg="1"/>
+      <p:bldP spid="19" grpId="0" animBg="1"/>
+      <p:bldP spid="20" grpId="0" animBg="1"/>
+      <p:bldP spid="21" grpId="0" animBg="1"/>
+      <p:bldP spid="23" grpId="0" animBg="1"/>
+    </p:bldLst>
+  </p:timing>
 </p:sld>
 </file>
 

</xml_diff>

<commit_message>
Integrated ownership & accountability loops into the keynote.
</commit_message>
<xml_diff>
--- a/leading technical debt/gogo keynote - data-driven leadership to solve technical debt.pptx
+++ b/leading technical debt/gogo keynote - data-driven leadership to solve technical debt.pptx
@@ -13,10 +13,10 @@
     <p:sldId id="258" r:id="rId4"/>
     <p:sldId id="259" r:id="rId5"/>
     <p:sldId id="260" r:id="rId6"/>
-    <p:sldId id="262" r:id="rId7"/>
+    <p:sldId id="308" r:id="rId7"/>
     <p:sldId id="289" r:id="rId8"/>
-    <p:sldId id="263" r:id="rId9"/>
-    <p:sldId id="264" r:id="rId10"/>
+    <p:sldId id="309" r:id="rId9"/>
+    <p:sldId id="310" r:id="rId10"/>
     <p:sldId id="288" r:id="rId11"/>
     <p:sldId id="261" r:id="rId12"/>
     <p:sldId id="266" r:id="rId13"/>
@@ -155,10 +155,10 @@
             <p14:sldId id="258"/>
             <p14:sldId id="259"/>
             <p14:sldId id="260"/>
-            <p14:sldId id="262"/>
+            <p14:sldId id="308"/>
             <p14:sldId id="289"/>
-            <p14:sldId id="263"/>
-            <p14:sldId id="264"/>
+            <p14:sldId id="309"/>
+            <p14:sldId id="310"/>
             <p14:sldId id="288"/>
             <p14:sldId id="261"/>
             <p14:sldId id="266"/>
@@ -286,7 +286,7 @@
           <a:p>
             <a:fld id="{9145D725-E27F-4BDC-952B-6F12C3FAB913}" type="datetimeFigureOut">
               <a:rPr lang="en-US" smtClean="0"/>
-              <a:t>09-Apr-19</a:t>
+              <a:t>4/9/2019</a:t>
             </a:fld>
             <a:endParaRPr lang="en-US"/>
           </a:p>
@@ -686,7 +686,7 @@
           <a:p>
             <a:r>
               <a:rPr lang="en-US" dirty="0"/>
-              <a:t>.5m</a:t>
+              <a:t>.25m</a:t>
             </a:r>
           </a:p>
         </p:txBody>
@@ -708,7 +708,7 @@
           <a:p>
             <a:fld id="{9B7FE9FA-6C9D-4D34-A513-E1A47B0ABA56}" type="slidenum">
               <a:rPr lang="en-US" smtClean="0"/>
-              <a:t>11</a:t>
+              <a:t>14</a:t>
             </a:fld>
             <a:endParaRPr lang="en-US"/>
           </a:p>
@@ -717,7 +717,7 @@
     </p:spTree>
     <p:extLst>
       <p:ext uri="{BB962C8B-B14F-4D97-AF65-F5344CB8AC3E}">
-        <p14:creationId xmlns:p14="http://schemas.microsoft.com/office/powerpoint/2010/main" val="3418769574"/>
+        <p14:creationId xmlns:p14="http://schemas.microsoft.com/office/powerpoint/2010/main" val="1183912179"/>
       </p:ext>
     </p:extLst>
   </p:cSld>
@@ -773,7 +773,7 @@
           <a:p>
             <a:r>
               <a:rPr lang="en-US" dirty="0"/>
-              <a:t>1m</a:t>
+              <a:t>.25m</a:t>
             </a:r>
           </a:p>
         </p:txBody>
@@ -795,7 +795,7 @@
           <a:p>
             <a:fld id="{9B7FE9FA-6C9D-4D34-A513-E1A47B0ABA56}" type="slidenum">
               <a:rPr lang="en-US" smtClean="0"/>
-              <a:t>12</a:t>
+              <a:t>15</a:t>
             </a:fld>
             <a:endParaRPr lang="en-US"/>
           </a:p>
@@ -804,7 +804,7 @@
     </p:spTree>
     <p:extLst>
       <p:ext uri="{BB962C8B-B14F-4D97-AF65-F5344CB8AC3E}">
-        <p14:creationId xmlns:p14="http://schemas.microsoft.com/office/powerpoint/2010/main" val="1256956146"/>
+        <p14:creationId xmlns:p14="http://schemas.microsoft.com/office/powerpoint/2010/main" val="883075667"/>
       </p:ext>
     </p:extLst>
   </p:cSld>
@@ -860,7 +860,7 @@
           <a:p>
             <a:r>
               <a:rPr lang="en-US" dirty="0"/>
-              <a:t>.5m</a:t>
+              <a:t>1m</a:t>
             </a:r>
           </a:p>
         </p:txBody>
@@ -882,7 +882,7 @@
           <a:p>
             <a:fld id="{9B7FE9FA-6C9D-4D34-A513-E1A47B0ABA56}" type="slidenum">
               <a:rPr lang="en-US" smtClean="0"/>
-              <a:t>13</a:t>
+              <a:t>16</a:t>
             </a:fld>
             <a:endParaRPr lang="en-US"/>
           </a:p>
@@ -891,7 +891,7 @@
     </p:spTree>
     <p:extLst>
       <p:ext uri="{BB962C8B-B14F-4D97-AF65-F5344CB8AC3E}">
-        <p14:creationId xmlns:p14="http://schemas.microsoft.com/office/powerpoint/2010/main" val="2730729831"/>
+        <p14:creationId xmlns:p14="http://schemas.microsoft.com/office/powerpoint/2010/main" val="630035552"/>
       </p:ext>
     </p:extLst>
   </p:cSld>
@@ -947,7 +947,7 @@
           <a:p>
             <a:r>
               <a:rPr lang="en-US" dirty="0"/>
-              <a:t>.25m</a:t>
+              <a:t>.5m</a:t>
             </a:r>
           </a:p>
         </p:txBody>
@@ -969,7 +969,7 @@
           <a:p>
             <a:fld id="{9B7FE9FA-6C9D-4D34-A513-E1A47B0ABA56}" type="slidenum">
               <a:rPr lang="en-US" smtClean="0"/>
-              <a:t>14</a:t>
+              <a:t>17</a:t>
             </a:fld>
             <a:endParaRPr lang="en-US"/>
           </a:p>
@@ -978,7 +978,7 @@
     </p:spTree>
     <p:extLst>
       <p:ext uri="{BB962C8B-B14F-4D97-AF65-F5344CB8AC3E}">
-        <p14:creationId xmlns:p14="http://schemas.microsoft.com/office/powerpoint/2010/main" val="1183912179"/>
+        <p14:creationId xmlns:p14="http://schemas.microsoft.com/office/powerpoint/2010/main" val="1577749723"/>
       </p:ext>
     </p:extLst>
   </p:cSld>
@@ -1056,7 +1056,7 @@
           <a:p>
             <a:fld id="{9B7FE9FA-6C9D-4D34-A513-E1A47B0ABA56}" type="slidenum">
               <a:rPr lang="en-US" smtClean="0"/>
-              <a:t>15</a:t>
+              <a:t>18</a:t>
             </a:fld>
             <a:endParaRPr lang="en-US"/>
           </a:p>
@@ -1065,7 +1065,7 @@
     </p:spTree>
     <p:extLst>
       <p:ext uri="{BB962C8B-B14F-4D97-AF65-F5344CB8AC3E}">
-        <p14:creationId xmlns:p14="http://schemas.microsoft.com/office/powerpoint/2010/main" val="883075667"/>
+        <p14:creationId xmlns:p14="http://schemas.microsoft.com/office/powerpoint/2010/main" val="293447769"/>
       </p:ext>
     </p:extLst>
   </p:cSld>
@@ -1121,7 +1121,7 @@
           <a:p>
             <a:r>
               <a:rPr lang="en-US" dirty="0"/>
-              <a:t>1m</a:t>
+              <a:t>.5m</a:t>
             </a:r>
           </a:p>
         </p:txBody>
@@ -1143,7 +1143,7 @@
           <a:p>
             <a:fld id="{9B7FE9FA-6C9D-4D34-A513-E1A47B0ABA56}" type="slidenum">
               <a:rPr lang="en-US" smtClean="0"/>
-              <a:t>16</a:t>
+              <a:t>19</a:t>
             </a:fld>
             <a:endParaRPr lang="en-US"/>
           </a:p>
@@ -1152,7 +1152,7 @@
     </p:spTree>
     <p:extLst>
       <p:ext uri="{BB962C8B-B14F-4D97-AF65-F5344CB8AC3E}">
-        <p14:creationId xmlns:p14="http://schemas.microsoft.com/office/powerpoint/2010/main" val="630035552"/>
+        <p14:creationId xmlns:p14="http://schemas.microsoft.com/office/powerpoint/2010/main" val="478470969"/>
       </p:ext>
     </p:extLst>
   </p:cSld>
@@ -1208,7 +1208,7 @@
           <a:p>
             <a:r>
               <a:rPr lang="en-US" dirty="0"/>
-              <a:t>.5m</a:t>
+              <a:t>.25m</a:t>
             </a:r>
           </a:p>
         </p:txBody>
@@ -1230,7 +1230,7 @@
           <a:p>
             <a:fld id="{9B7FE9FA-6C9D-4D34-A513-E1A47B0ABA56}" type="slidenum">
               <a:rPr lang="en-US" smtClean="0"/>
-              <a:t>17</a:t>
+              <a:t>20</a:t>
             </a:fld>
             <a:endParaRPr lang="en-US"/>
           </a:p>
@@ -1239,7 +1239,7 @@
     </p:spTree>
     <p:extLst>
       <p:ext uri="{BB962C8B-B14F-4D97-AF65-F5344CB8AC3E}">
-        <p14:creationId xmlns:p14="http://schemas.microsoft.com/office/powerpoint/2010/main" val="1577749723"/>
+        <p14:creationId xmlns:p14="http://schemas.microsoft.com/office/powerpoint/2010/main" val="3160666122"/>
       </p:ext>
     </p:extLst>
   </p:cSld>
@@ -1295,7 +1295,7 @@
           <a:p>
             <a:r>
               <a:rPr lang="en-US" dirty="0"/>
-              <a:t>.25m</a:t>
+              <a:t>.5m</a:t>
             </a:r>
           </a:p>
         </p:txBody>
@@ -1317,7 +1317,7 @@
           <a:p>
             <a:fld id="{9B7FE9FA-6C9D-4D34-A513-E1A47B0ABA56}" type="slidenum">
               <a:rPr lang="en-US" smtClean="0"/>
-              <a:t>18</a:t>
+              <a:t>21</a:t>
             </a:fld>
             <a:endParaRPr lang="en-US"/>
           </a:p>
@@ -1326,7 +1326,7 @@
     </p:spTree>
     <p:extLst>
       <p:ext uri="{BB962C8B-B14F-4D97-AF65-F5344CB8AC3E}">
-        <p14:creationId xmlns:p14="http://schemas.microsoft.com/office/powerpoint/2010/main" val="293447769"/>
+        <p14:creationId xmlns:p14="http://schemas.microsoft.com/office/powerpoint/2010/main" val="3640467335"/>
       </p:ext>
     </p:extLst>
   </p:cSld>
@@ -1382,7 +1382,7 @@
           <a:p>
             <a:r>
               <a:rPr lang="en-US" dirty="0"/>
-              <a:t>.5m</a:t>
+              <a:t>.25m</a:t>
             </a:r>
           </a:p>
         </p:txBody>
@@ -1404,7 +1404,7 @@
           <a:p>
             <a:fld id="{9B7FE9FA-6C9D-4D34-A513-E1A47B0ABA56}" type="slidenum">
               <a:rPr lang="en-US" smtClean="0"/>
-              <a:t>19</a:t>
+              <a:t>22</a:t>
             </a:fld>
             <a:endParaRPr lang="en-US"/>
           </a:p>
@@ -1413,7 +1413,7 @@
     </p:spTree>
     <p:extLst>
       <p:ext uri="{BB962C8B-B14F-4D97-AF65-F5344CB8AC3E}">
-        <p14:creationId xmlns:p14="http://schemas.microsoft.com/office/powerpoint/2010/main" val="478470969"/>
+        <p14:creationId xmlns:p14="http://schemas.microsoft.com/office/powerpoint/2010/main" val="1415270206"/>
       </p:ext>
     </p:extLst>
   </p:cSld>
@@ -1469,8 +1469,69 @@
           <a:p>
             <a:r>
               <a:rPr lang="en-US" dirty="0"/>
-              <a:t>.25m</a:t>
-            </a:r>
+              <a:t>2m</a:t>
+            </a:r>
+          </a:p>
+          <a:p>
+            <a:endParaRPr lang="en-US" dirty="0"/>
+          </a:p>
+          <a:p>
+            <a:pPr marL="0" indent="0">
+              <a:buNone/>
+            </a:pPr>
+            <a:r>
+              <a:rPr lang="en-US" dirty="0"/>
+              <a:t>Experiment vs improvement</a:t>
+            </a:r>
+          </a:p>
+          <a:p>
+            <a:pPr marL="0" indent="0">
+              <a:buNone/>
+            </a:pPr>
+            <a:endParaRPr lang="en-US" dirty="0"/>
+          </a:p>
+          <a:p>
+            <a:r>
+              <a:rPr lang="en-US" dirty="0"/>
+              <a:t>The purpose of an </a:t>
+            </a:r>
+            <a:r>
+              <a:rPr lang="en-US" b="1" dirty="0"/>
+              <a:t>improvement</a:t>
+            </a:r>
+            <a:r>
+              <a:rPr lang="en-US" dirty="0"/>
+              <a:t> is to directly reduce debt – you know your ROI</a:t>
+            </a:r>
+          </a:p>
+          <a:p>
+            <a:endParaRPr lang="en-US" dirty="0"/>
+          </a:p>
+          <a:p>
+            <a:r>
+              <a:rPr lang="en-US" dirty="0"/>
+              <a:t>The purpose of an </a:t>
+            </a:r>
+            <a:r>
+              <a:rPr lang="en-US" b="1" dirty="0"/>
+              <a:t>experiment</a:t>
+            </a:r>
+            <a:r>
+              <a:rPr lang="en-US" dirty="0"/>
+              <a:t> is to learn what improvements should be done later – you’re finding the ROI</a:t>
+            </a:r>
+          </a:p>
+          <a:p>
+            <a:endParaRPr lang="en-US" dirty="0"/>
+          </a:p>
+          <a:p>
+            <a:r>
+              <a:rPr lang="en-US" dirty="0"/>
+              <a:t>Understanding the proper ratio between experiments and improvements</a:t>
+            </a:r>
+          </a:p>
+          <a:p>
+            <a:endParaRPr lang="en-US" dirty="0"/>
           </a:p>
         </p:txBody>
       </p:sp>
@@ -1491,7 +1552,7 @@
           <a:p>
             <a:fld id="{9B7FE9FA-6C9D-4D34-A513-E1A47B0ABA56}" type="slidenum">
               <a:rPr lang="en-US" smtClean="0"/>
-              <a:t>20</a:t>
+              <a:t>23</a:t>
             </a:fld>
             <a:endParaRPr lang="en-US"/>
           </a:p>
@@ -1500,7 +1561,7 @@
     </p:spTree>
     <p:extLst>
       <p:ext uri="{BB962C8B-B14F-4D97-AF65-F5344CB8AC3E}">
-        <p14:creationId xmlns:p14="http://schemas.microsoft.com/office/powerpoint/2010/main" val="3160666122"/>
+        <p14:creationId xmlns:p14="http://schemas.microsoft.com/office/powerpoint/2010/main" val="1476661288"/>
       </p:ext>
     </p:extLst>
   </p:cSld>
@@ -1643,8 +1704,53 @@
           <a:p>
             <a:r>
               <a:rPr lang="en-US" dirty="0"/>
-              <a:t>.5m</a:t>
-            </a:r>
+              <a:t>2m</a:t>
+            </a:r>
+          </a:p>
+          <a:p>
+            <a:endParaRPr lang="en-US" dirty="0"/>
+          </a:p>
+          <a:p>
+            <a:pPr marL="0" indent="0">
+              <a:buNone/>
+            </a:pPr>
+            <a:r>
+              <a:rPr lang="en-US" dirty="0"/>
+              <a:t>Shifting from task to mindset – ACTUALLY trusting the teams to run your business. How many dollars do you lose by letting teams screw up versus how many dollars do you lose by NOT letting teams innovate?</a:t>
+            </a:r>
+          </a:p>
+          <a:p>
+            <a:pPr marL="0" indent="0">
+              <a:buNone/>
+            </a:pPr>
+            <a:endParaRPr lang="en-US" dirty="0"/>
+          </a:p>
+          <a:p>
+            <a:pPr marL="0" indent="0">
+              <a:buNone/>
+            </a:pPr>
+            <a:r>
+              <a:rPr lang="en-US" dirty="0"/>
+              <a:t>And yes, there is a way to do this without leaders losing their jobs!</a:t>
+            </a:r>
+          </a:p>
+          <a:p>
+            <a:pPr marL="0" indent="0">
+              <a:buNone/>
+            </a:pPr>
+            <a:endParaRPr lang="en-US" dirty="0"/>
+          </a:p>
+          <a:p>
+            <a:pPr marL="0" indent="0">
+              <a:buNone/>
+            </a:pPr>
+            <a:r>
+              <a:rPr lang="en-US" dirty="0"/>
+              <a:t>Tableau story</a:t>
+            </a:r>
+          </a:p>
+          <a:p>
+            <a:endParaRPr lang="en-US" dirty="0"/>
           </a:p>
         </p:txBody>
       </p:sp>
@@ -1665,7 +1771,7 @@
           <a:p>
             <a:fld id="{9B7FE9FA-6C9D-4D34-A513-E1A47B0ABA56}" type="slidenum">
               <a:rPr lang="en-US" smtClean="0"/>
-              <a:t>21</a:t>
+              <a:t>24</a:t>
             </a:fld>
             <a:endParaRPr lang="en-US"/>
           </a:p>
@@ -1674,7 +1780,7 @@
     </p:spTree>
     <p:extLst>
       <p:ext uri="{BB962C8B-B14F-4D97-AF65-F5344CB8AC3E}">
-        <p14:creationId xmlns:p14="http://schemas.microsoft.com/office/powerpoint/2010/main" val="3640467335"/>
+        <p14:creationId xmlns:p14="http://schemas.microsoft.com/office/powerpoint/2010/main" val="4265355941"/>
       </p:ext>
     </p:extLst>
   </p:cSld>
@@ -1730,7 +1836,7 @@
           <a:p>
             <a:r>
               <a:rPr lang="en-US" dirty="0"/>
-              <a:t>.25m</a:t>
+              <a:t>1m</a:t>
             </a:r>
           </a:p>
         </p:txBody>
@@ -1752,7 +1858,7 @@
           <a:p>
             <a:fld id="{9B7FE9FA-6C9D-4D34-A513-E1A47B0ABA56}" type="slidenum">
               <a:rPr lang="en-US" smtClean="0"/>
-              <a:t>22</a:t>
+              <a:t>25</a:t>
             </a:fld>
             <a:endParaRPr lang="en-US"/>
           </a:p>
@@ -1761,7 +1867,7 @@
     </p:spTree>
     <p:extLst>
       <p:ext uri="{BB962C8B-B14F-4D97-AF65-F5344CB8AC3E}">
-        <p14:creationId xmlns:p14="http://schemas.microsoft.com/office/powerpoint/2010/main" val="1415270206"/>
+        <p14:creationId xmlns:p14="http://schemas.microsoft.com/office/powerpoint/2010/main" val="1062284097"/>
       </p:ext>
     </p:extLst>
   </p:cSld>
@@ -1817,69 +1923,8 @@
           <a:p>
             <a:r>
               <a:rPr lang="en-US" dirty="0"/>
-              <a:t>2m</a:t>
-            </a:r>
-          </a:p>
-          <a:p>
-            <a:endParaRPr lang="en-US" dirty="0"/>
-          </a:p>
-          <a:p>
-            <a:pPr marL="0" indent="0">
-              <a:buNone/>
-            </a:pPr>
-            <a:r>
-              <a:rPr lang="en-US" dirty="0"/>
-              <a:t>Experiment vs improvement</a:t>
-            </a:r>
-          </a:p>
-          <a:p>
-            <a:pPr marL="0" indent="0">
-              <a:buNone/>
-            </a:pPr>
-            <a:endParaRPr lang="en-US" dirty="0"/>
-          </a:p>
-          <a:p>
-            <a:r>
-              <a:rPr lang="en-US" dirty="0"/>
-              <a:t>The purpose of an </a:t>
-            </a:r>
-            <a:r>
-              <a:rPr lang="en-US" b="1" dirty="0"/>
-              <a:t>improvement</a:t>
-            </a:r>
-            <a:r>
-              <a:rPr lang="en-US" dirty="0"/>
-              <a:t> is to directly reduce debt – you know your ROI</a:t>
-            </a:r>
-          </a:p>
-          <a:p>
-            <a:endParaRPr lang="en-US" dirty="0"/>
-          </a:p>
-          <a:p>
-            <a:r>
-              <a:rPr lang="en-US" dirty="0"/>
-              <a:t>The purpose of an </a:t>
-            </a:r>
-            <a:r>
-              <a:rPr lang="en-US" b="1" dirty="0"/>
-              <a:t>experiment</a:t>
-            </a:r>
-            <a:r>
-              <a:rPr lang="en-US" dirty="0"/>
-              <a:t> is to learn what improvements should be done later – you’re finding the ROI</a:t>
-            </a:r>
-          </a:p>
-          <a:p>
-            <a:endParaRPr lang="en-US" dirty="0"/>
-          </a:p>
-          <a:p>
-            <a:r>
-              <a:rPr lang="en-US" dirty="0"/>
-              <a:t>Understanding the proper ratio between experiments and improvements</a:t>
-            </a:r>
-          </a:p>
-          <a:p>
-            <a:endParaRPr lang="en-US" dirty="0"/>
+              <a:t>1m</a:t>
+            </a:r>
           </a:p>
         </p:txBody>
       </p:sp>
@@ -1900,7 +1945,7 @@
           <a:p>
             <a:fld id="{9B7FE9FA-6C9D-4D34-A513-E1A47B0ABA56}" type="slidenum">
               <a:rPr lang="en-US" smtClean="0"/>
-              <a:t>23</a:t>
+              <a:t>26</a:t>
             </a:fld>
             <a:endParaRPr lang="en-US"/>
           </a:p>
@@ -1909,7 +1954,7 @@
     </p:spTree>
     <p:extLst>
       <p:ext uri="{BB962C8B-B14F-4D97-AF65-F5344CB8AC3E}">
-        <p14:creationId xmlns:p14="http://schemas.microsoft.com/office/powerpoint/2010/main" val="1476661288"/>
+        <p14:creationId xmlns:p14="http://schemas.microsoft.com/office/powerpoint/2010/main" val="1062549338"/>
       </p:ext>
     </p:extLst>
   </p:cSld>
@@ -1965,53 +2010,8 @@
           <a:p>
             <a:r>
               <a:rPr lang="en-US" dirty="0"/>
-              <a:t>2m</a:t>
-            </a:r>
-          </a:p>
-          <a:p>
-            <a:endParaRPr lang="en-US" dirty="0"/>
-          </a:p>
-          <a:p>
-            <a:pPr marL="0" indent="0">
-              <a:buNone/>
-            </a:pPr>
-            <a:r>
-              <a:rPr lang="en-US" dirty="0"/>
-              <a:t>Shifting from task to mindset – ACTUALLY trusting the teams to run your business. How many dollars do you lose by letting teams screw up versus how many dollars do you lose by NOT letting teams innovate?</a:t>
-            </a:r>
-          </a:p>
-          <a:p>
-            <a:pPr marL="0" indent="0">
-              <a:buNone/>
-            </a:pPr>
-            <a:endParaRPr lang="en-US" dirty="0"/>
-          </a:p>
-          <a:p>
-            <a:pPr marL="0" indent="0">
-              <a:buNone/>
-            </a:pPr>
-            <a:r>
-              <a:rPr lang="en-US" dirty="0"/>
-              <a:t>And yes, there is a way to do this without leaders losing their jobs!</a:t>
-            </a:r>
-          </a:p>
-          <a:p>
-            <a:pPr marL="0" indent="0">
-              <a:buNone/>
-            </a:pPr>
-            <a:endParaRPr lang="en-US" dirty="0"/>
-          </a:p>
-          <a:p>
-            <a:pPr marL="0" indent="0">
-              <a:buNone/>
-            </a:pPr>
-            <a:r>
-              <a:rPr lang="en-US" dirty="0"/>
-              <a:t>Tableau story</a:t>
-            </a:r>
-          </a:p>
-          <a:p>
-            <a:endParaRPr lang="en-US" dirty="0"/>
+              <a:t>10m</a:t>
+            </a:r>
           </a:p>
         </p:txBody>
       </p:sp>
@@ -2032,7 +2032,7 @@
           <a:p>
             <a:fld id="{9B7FE9FA-6C9D-4D34-A513-E1A47B0ABA56}" type="slidenum">
               <a:rPr lang="en-US" smtClean="0"/>
-              <a:t>24</a:t>
+              <a:t>27</a:t>
             </a:fld>
             <a:endParaRPr lang="en-US"/>
           </a:p>
@@ -2041,7 +2041,7 @@
     </p:spTree>
     <p:extLst>
       <p:ext uri="{BB962C8B-B14F-4D97-AF65-F5344CB8AC3E}">
-        <p14:creationId xmlns:p14="http://schemas.microsoft.com/office/powerpoint/2010/main" val="4265355941"/>
+        <p14:creationId xmlns:p14="http://schemas.microsoft.com/office/powerpoint/2010/main" val="3995473330"/>
       </p:ext>
     </p:extLst>
   </p:cSld>
@@ -2097,7 +2097,7 @@
           <a:p>
             <a:r>
               <a:rPr lang="en-US" dirty="0"/>
-              <a:t>1m</a:t>
+              <a:t>.5m</a:t>
             </a:r>
           </a:p>
         </p:txBody>
@@ -2119,7 +2119,7 @@
           <a:p>
             <a:fld id="{9B7FE9FA-6C9D-4D34-A513-E1A47B0ABA56}" type="slidenum">
               <a:rPr lang="en-US" smtClean="0"/>
-              <a:t>25</a:t>
+              <a:t>28</a:t>
             </a:fld>
             <a:endParaRPr lang="en-US"/>
           </a:p>
@@ -2128,7 +2128,7 @@
     </p:spTree>
     <p:extLst>
       <p:ext uri="{BB962C8B-B14F-4D97-AF65-F5344CB8AC3E}">
-        <p14:creationId xmlns:p14="http://schemas.microsoft.com/office/powerpoint/2010/main" val="1062284097"/>
+        <p14:creationId xmlns:p14="http://schemas.microsoft.com/office/powerpoint/2010/main" val="709674624"/>
       </p:ext>
     </p:extLst>
   </p:cSld>
@@ -2206,7 +2206,7 @@
           <a:p>
             <a:fld id="{9B7FE9FA-6C9D-4D34-A513-E1A47B0ABA56}" type="slidenum">
               <a:rPr lang="en-US" smtClean="0"/>
-              <a:t>26</a:t>
+              <a:t>29</a:t>
             </a:fld>
             <a:endParaRPr lang="en-US"/>
           </a:p>
@@ -2215,7 +2215,7 @@
     </p:spTree>
     <p:extLst>
       <p:ext uri="{BB962C8B-B14F-4D97-AF65-F5344CB8AC3E}">
-        <p14:creationId xmlns:p14="http://schemas.microsoft.com/office/powerpoint/2010/main" val="1062549338"/>
+        <p14:creationId xmlns:p14="http://schemas.microsoft.com/office/powerpoint/2010/main" val="4139163054"/>
       </p:ext>
     </p:extLst>
   </p:cSld>
@@ -2271,7 +2271,7 @@
           <a:p>
             <a:r>
               <a:rPr lang="en-US" dirty="0"/>
-              <a:t>10m</a:t>
+              <a:t>.5m</a:t>
             </a:r>
           </a:p>
         </p:txBody>
@@ -2293,7 +2293,7 @@
           <a:p>
             <a:fld id="{9B7FE9FA-6C9D-4D34-A513-E1A47B0ABA56}" type="slidenum">
               <a:rPr lang="en-US" smtClean="0"/>
-              <a:t>27</a:t>
+              <a:t>30</a:t>
             </a:fld>
             <a:endParaRPr lang="en-US"/>
           </a:p>
@@ -2302,7 +2302,7 @@
     </p:spTree>
     <p:extLst>
       <p:ext uri="{BB962C8B-B14F-4D97-AF65-F5344CB8AC3E}">
-        <p14:creationId xmlns:p14="http://schemas.microsoft.com/office/powerpoint/2010/main" val="3995473330"/>
+        <p14:creationId xmlns:p14="http://schemas.microsoft.com/office/powerpoint/2010/main" val="2912420269"/>
       </p:ext>
     </p:extLst>
   </p:cSld>
@@ -2358,7 +2358,7 @@
           <a:p>
             <a:r>
               <a:rPr lang="en-US" dirty="0"/>
-              <a:t>.5m</a:t>
+              <a:t>.25m</a:t>
             </a:r>
           </a:p>
         </p:txBody>
@@ -2380,7 +2380,7 @@
           <a:p>
             <a:fld id="{9B7FE9FA-6C9D-4D34-A513-E1A47B0ABA56}" type="slidenum">
               <a:rPr lang="en-US" smtClean="0"/>
-              <a:t>28</a:t>
+              <a:t>31</a:t>
             </a:fld>
             <a:endParaRPr lang="en-US"/>
           </a:p>
@@ -2389,7 +2389,7 @@
     </p:spTree>
     <p:extLst>
       <p:ext uri="{BB962C8B-B14F-4D97-AF65-F5344CB8AC3E}">
-        <p14:creationId xmlns:p14="http://schemas.microsoft.com/office/powerpoint/2010/main" val="709674624"/>
+        <p14:creationId xmlns:p14="http://schemas.microsoft.com/office/powerpoint/2010/main" val="1518396784"/>
       </p:ext>
     </p:extLst>
   </p:cSld>
@@ -2467,7 +2467,7 @@
           <a:p>
             <a:fld id="{9B7FE9FA-6C9D-4D34-A513-E1A47B0ABA56}" type="slidenum">
               <a:rPr lang="en-US" smtClean="0"/>
-              <a:t>29</a:t>
+              <a:t>32</a:t>
             </a:fld>
             <a:endParaRPr lang="en-US"/>
           </a:p>
@@ -2476,7 +2476,7 @@
     </p:spTree>
     <p:extLst>
       <p:ext uri="{BB962C8B-B14F-4D97-AF65-F5344CB8AC3E}">
-        <p14:creationId xmlns:p14="http://schemas.microsoft.com/office/powerpoint/2010/main" val="4139163054"/>
+        <p14:creationId xmlns:p14="http://schemas.microsoft.com/office/powerpoint/2010/main" val="3470883838"/>
       </p:ext>
     </p:extLst>
   </p:cSld>
@@ -2532,7 +2532,7 @@
           <a:p>
             <a:r>
               <a:rPr lang="en-US" dirty="0"/>
-              <a:t>.5m</a:t>
+              <a:t>1m</a:t>
             </a:r>
           </a:p>
         </p:txBody>
@@ -2554,7 +2554,7 @@
           <a:p>
             <a:fld id="{9B7FE9FA-6C9D-4D34-A513-E1A47B0ABA56}" type="slidenum">
               <a:rPr lang="en-US" smtClean="0"/>
-              <a:t>30</a:t>
+              <a:t>33</a:t>
             </a:fld>
             <a:endParaRPr lang="en-US"/>
           </a:p>
@@ -2563,7 +2563,7 @@
     </p:spTree>
     <p:extLst>
       <p:ext uri="{BB962C8B-B14F-4D97-AF65-F5344CB8AC3E}">
-        <p14:creationId xmlns:p14="http://schemas.microsoft.com/office/powerpoint/2010/main" val="2912420269"/>
+        <p14:creationId xmlns:p14="http://schemas.microsoft.com/office/powerpoint/2010/main" val="129671068"/>
       </p:ext>
     </p:extLst>
   </p:cSld>
@@ -2706,7 +2706,7 @@
           <a:p>
             <a:r>
               <a:rPr lang="en-US" dirty="0"/>
-              <a:t>.25m</a:t>
+              <a:t>1m</a:t>
             </a:r>
           </a:p>
         </p:txBody>
@@ -2728,7 +2728,7 @@
           <a:p>
             <a:fld id="{9B7FE9FA-6C9D-4D34-A513-E1A47B0ABA56}" type="slidenum">
               <a:rPr lang="en-US" smtClean="0"/>
-              <a:t>31</a:t>
+              <a:t>34</a:t>
             </a:fld>
             <a:endParaRPr lang="en-US"/>
           </a:p>
@@ -2737,7 +2737,7 @@
     </p:spTree>
     <p:extLst>
       <p:ext uri="{BB962C8B-B14F-4D97-AF65-F5344CB8AC3E}">
-        <p14:creationId xmlns:p14="http://schemas.microsoft.com/office/powerpoint/2010/main" val="1518396784"/>
+        <p14:creationId xmlns:p14="http://schemas.microsoft.com/office/powerpoint/2010/main" val="2732371465"/>
       </p:ext>
     </p:extLst>
   </p:cSld>
@@ -2815,7 +2815,7 @@
           <a:p>
             <a:fld id="{9B7FE9FA-6C9D-4D34-A513-E1A47B0ABA56}" type="slidenum">
               <a:rPr lang="en-US" smtClean="0"/>
-              <a:t>32</a:t>
+              <a:t>35</a:t>
             </a:fld>
             <a:endParaRPr lang="en-US"/>
           </a:p>
@@ -2824,7 +2824,7 @@
     </p:spTree>
     <p:extLst>
       <p:ext uri="{BB962C8B-B14F-4D97-AF65-F5344CB8AC3E}">
-        <p14:creationId xmlns:p14="http://schemas.microsoft.com/office/powerpoint/2010/main" val="3470883838"/>
+        <p14:creationId xmlns:p14="http://schemas.microsoft.com/office/powerpoint/2010/main" val="2896193473"/>
       </p:ext>
     </p:extLst>
   </p:cSld>
@@ -2902,7 +2902,7 @@
           <a:p>
             <a:fld id="{9B7FE9FA-6C9D-4D34-A513-E1A47B0ABA56}" type="slidenum">
               <a:rPr lang="en-US" smtClean="0"/>
-              <a:t>33</a:t>
+              <a:t>36</a:t>
             </a:fld>
             <a:endParaRPr lang="en-US"/>
           </a:p>
@@ -2911,7 +2911,7 @@
     </p:spTree>
     <p:extLst>
       <p:ext uri="{BB962C8B-B14F-4D97-AF65-F5344CB8AC3E}">
-        <p14:creationId xmlns:p14="http://schemas.microsoft.com/office/powerpoint/2010/main" val="129671068"/>
+        <p14:creationId xmlns:p14="http://schemas.microsoft.com/office/powerpoint/2010/main" val="165378956"/>
       </p:ext>
     </p:extLst>
   </p:cSld>
@@ -2965,267 +2965,6 @@
           <a:bodyPr/>
           <a:lstStyle/>
           <a:p>
-            <a:r>
-              <a:rPr lang="en-US" dirty="0"/>
-              <a:t>1m</a:t>
-            </a:r>
-          </a:p>
-        </p:txBody>
-      </p:sp>
-      <p:sp>
-        <p:nvSpPr>
-          <p:cNvPr id="4" name="Slide Number Placeholder 3"/>
-          <p:cNvSpPr>
-            <a:spLocks noGrp="1"/>
-          </p:cNvSpPr>
-          <p:nvPr>
-            <p:ph type="sldNum" sz="quarter" idx="5"/>
-          </p:nvPr>
-        </p:nvSpPr>
-        <p:spPr/>
-        <p:txBody>
-          <a:bodyPr/>
-          <a:lstStyle/>
-          <a:p>
-            <a:fld id="{9B7FE9FA-6C9D-4D34-A513-E1A47B0ABA56}" type="slidenum">
-              <a:rPr lang="en-US" smtClean="0"/>
-              <a:t>34</a:t>
-            </a:fld>
-            <a:endParaRPr lang="en-US"/>
-          </a:p>
-        </p:txBody>
-      </p:sp>
-    </p:spTree>
-    <p:extLst>
-      <p:ext uri="{BB962C8B-B14F-4D97-AF65-F5344CB8AC3E}">
-        <p14:creationId xmlns:p14="http://schemas.microsoft.com/office/powerpoint/2010/main" val="2732371465"/>
-      </p:ext>
-    </p:extLst>
-  </p:cSld>
-  <p:clrMapOvr>
-    <a:masterClrMapping/>
-  </p:clrMapOvr>
-</p:notes>
-</file>
-
-<file path=ppt/notesSlides/notesSlide34.xml><?xml version="1.0" encoding="utf-8"?>
-<p:notes xmlns:a="http://schemas.openxmlformats.org/drawingml/2006/main" xmlns:r="http://schemas.openxmlformats.org/officeDocument/2006/relationships" xmlns:p="http://schemas.openxmlformats.org/presentationml/2006/main">
-  <p:cSld>
-    <p:spTree>
-      <p:nvGrpSpPr>
-        <p:cNvPr id="1" name=""/>
-        <p:cNvGrpSpPr/>
-        <p:nvPr/>
-      </p:nvGrpSpPr>
-      <p:grpSpPr>
-        <a:xfrm>
-          <a:off x="0" y="0"/>
-          <a:ext cx="0" cy="0"/>
-          <a:chOff x="0" y="0"/>
-          <a:chExt cx="0" cy="0"/>
-        </a:xfrm>
-      </p:grpSpPr>
-      <p:sp>
-        <p:nvSpPr>
-          <p:cNvPr id="2" name="Slide Image Placeholder 1"/>
-          <p:cNvSpPr>
-            <a:spLocks noGrp="1" noRot="1" noChangeAspect="1"/>
-          </p:cNvSpPr>
-          <p:nvPr>
-            <p:ph type="sldImg"/>
-          </p:nvPr>
-        </p:nvSpPr>
-        <p:spPr/>
-      </p:sp>
-      <p:sp>
-        <p:nvSpPr>
-          <p:cNvPr id="3" name="Notes Placeholder 2"/>
-          <p:cNvSpPr>
-            <a:spLocks noGrp="1"/>
-          </p:cNvSpPr>
-          <p:nvPr>
-            <p:ph type="body" idx="1"/>
-          </p:nvPr>
-        </p:nvSpPr>
-        <p:spPr/>
-        <p:txBody>
-          <a:bodyPr/>
-          <a:lstStyle/>
-          <a:p>
-            <a:r>
-              <a:rPr lang="en-US" dirty="0"/>
-              <a:t>1m</a:t>
-            </a:r>
-          </a:p>
-        </p:txBody>
-      </p:sp>
-      <p:sp>
-        <p:nvSpPr>
-          <p:cNvPr id="4" name="Slide Number Placeholder 3"/>
-          <p:cNvSpPr>
-            <a:spLocks noGrp="1"/>
-          </p:cNvSpPr>
-          <p:nvPr>
-            <p:ph type="sldNum" sz="quarter" idx="5"/>
-          </p:nvPr>
-        </p:nvSpPr>
-        <p:spPr/>
-        <p:txBody>
-          <a:bodyPr/>
-          <a:lstStyle/>
-          <a:p>
-            <a:fld id="{9B7FE9FA-6C9D-4D34-A513-E1A47B0ABA56}" type="slidenum">
-              <a:rPr lang="en-US" smtClean="0"/>
-              <a:t>35</a:t>
-            </a:fld>
-            <a:endParaRPr lang="en-US"/>
-          </a:p>
-        </p:txBody>
-      </p:sp>
-    </p:spTree>
-    <p:extLst>
-      <p:ext uri="{BB962C8B-B14F-4D97-AF65-F5344CB8AC3E}">
-        <p14:creationId xmlns:p14="http://schemas.microsoft.com/office/powerpoint/2010/main" val="2896193473"/>
-      </p:ext>
-    </p:extLst>
-  </p:cSld>
-  <p:clrMapOvr>
-    <a:masterClrMapping/>
-  </p:clrMapOvr>
-</p:notes>
-</file>
-
-<file path=ppt/notesSlides/notesSlide35.xml><?xml version="1.0" encoding="utf-8"?>
-<p:notes xmlns:a="http://schemas.openxmlformats.org/drawingml/2006/main" xmlns:r="http://schemas.openxmlformats.org/officeDocument/2006/relationships" xmlns:p="http://schemas.openxmlformats.org/presentationml/2006/main">
-  <p:cSld>
-    <p:spTree>
-      <p:nvGrpSpPr>
-        <p:cNvPr id="1" name=""/>
-        <p:cNvGrpSpPr/>
-        <p:nvPr/>
-      </p:nvGrpSpPr>
-      <p:grpSpPr>
-        <a:xfrm>
-          <a:off x="0" y="0"/>
-          <a:ext cx="0" cy="0"/>
-          <a:chOff x="0" y="0"/>
-          <a:chExt cx="0" cy="0"/>
-        </a:xfrm>
-      </p:grpSpPr>
-      <p:sp>
-        <p:nvSpPr>
-          <p:cNvPr id="2" name="Slide Image Placeholder 1"/>
-          <p:cNvSpPr>
-            <a:spLocks noGrp="1" noRot="1" noChangeAspect="1"/>
-          </p:cNvSpPr>
-          <p:nvPr>
-            <p:ph type="sldImg"/>
-          </p:nvPr>
-        </p:nvSpPr>
-        <p:spPr/>
-      </p:sp>
-      <p:sp>
-        <p:nvSpPr>
-          <p:cNvPr id="3" name="Notes Placeholder 2"/>
-          <p:cNvSpPr>
-            <a:spLocks noGrp="1"/>
-          </p:cNvSpPr>
-          <p:nvPr>
-            <p:ph type="body" idx="1"/>
-          </p:nvPr>
-        </p:nvSpPr>
-        <p:spPr/>
-        <p:txBody>
-          <a:bodyPr/>
-          <a:lstStyle/>
-          <a:p>
-            <a:r>
-              <a:rPr lang="en-US" dirty="0"/>
-              <a:t>1m</a:t>
-            </a:r>
-          </a:p>
-        </p:txBody>
-      </p:sp>
-      <p:sp>
-        <p:nvSpPr>
-          <p:cNvPr id="4" name="Slide Number Placeholder 3"/>
-          <p:cNvSpPr>
-            <a:spLocks noGrp="1"/>
-          </p:cNvSpPr>
-          <p:nvPr>
-            <p:ph type="sldNum" sz="quarter" idx="5"/>
-          </p:nvPr>
-        </p:nvSpPr>
-        <p:spPr/>
-        <p:txBody>
-          <a:bodyPr/>
-          <a:lstStyle/>
-          <a:p>
-            <a:fld id="{9B7FE9FA-6C9D-4D34-A513-E1A47B0ABA56}" type="slidenum">
-              <a:rPr lang="en-US" smtClean="0"/>
-              <a:t>36</a:t>
-            </a:fld>
-            <a:endParaRPr lang="en-US"/>
-          </a:p>
-        </p:txBody>
-      </p:sp>
-    </p:spTree>
-    <p:extLst>
-      <p:ext uri="{BB962C8B-B14F-4D97-AF65-F5344CB8AC3E}">
-        <p14:creationId xmlns:p14="http://schemas.microsoft.com/office/powerpoint/2010/main" val="165378956"/>
-      </p:ext>
-    </p:extLst>
-  </p:cSld>
-  <p:clrMapOvr>
-    <a:masterClrMapping/>
-  </p:clrMapOvr>
-</p:notes>
-</file>
-
-<file path=ppt/notesSlides/notesSlide36.xml><?xml version="1.0" encoding="utf-8"?>
-<p:notes xmlns:a="http://schemas.openxmlformats.org/drawingml/2006/main" xmlns:r="http://schemas.openxmlformats.org/officeDocument/2006/relationships" xmlns:p="http://schemas.openxmlformats.org/presentationml/2006/main">
-  <p:cSld>
-    <p:spTree>
-      <p:nvGrpSpPr>
-        <p:cNvPr id="1" name=""/>
-        <p:cNvGrpSpPr/>
-        <p:nvPr/>
-      </p:nvGrpSpPr>
-      <p:grpSpPr>
-        <a:xfrm>
-          <a:off x="0" y="0"/>
-          <a:ext cx="0" cy="0"/>
-          <a:chOff x="0" y="0"/>
-          <a:chExt cx="0" cy="0"/>
-        </a:xfrm>
-      </p:grpSpPr>
-      <p:sp>
-        <p:nvSpPr>
-          <p:cNvPr id="2" name="Slide Image Placeholder 1"/>
-          <p:cNvSpPr>
-            <a:spLocks noGrp="1" noRot="1" noChangeAspect="1"/>
-          </p:cNvSpPr>
-          <p:nvPr>
-            <p:ph type="sldImg"/>
-          </p:nvPr>
-        </p:nvSpPr>
-        <p:spPr/>
-      </p:sp>
-      <p:sp>
-        <p:nvSpPr>
-          <p:cNvPr id="3" name="Notes Placeholder 2"/>
-          <p:cNvSpPr>
-            <a:spLocks noGrp="1"/>
-          </p:cNvSpPr>
-          <p:nvPr>
-            <p:ph type="body" idx="1"/>
-          </p:nvPr>
-        </p:nvSpPr>
-        <p:spPr/>
-        <p:txBody>
-          <a:bodyPr/>
-          <a:lstStyle/>
-          <a:p>
             <a:endParaRPr lang="en-US" dirty="0"/>
           </a:p>
         </p:txBody>
@@ -3266,7 +3005,7 @@
 </p:notes>
 </file>
 
-<file path=ppt/notesSlides/notesSlide37.xml><?xml version="1.0" encoding="utf-8"?>
+<file path=ppt/notesSlides/notesSlide34.xml><?xml version="1.0" encoding="utf-8"?>
 <p:notes xmlns:a="http://schemas.openxmlformats.org/drawingml/2006/main" xmlns:r="http://schemas.openxmlformats.org/officeDocument/2006/relationships" xmlns:p="http://schemas.openxmlformats.org/presentationml/2006/main">
   <p:cSld>
     <p:spTree>
@@ -3486,7 +3225,7 @@
           <a:p>
             <a:r>
               <a:rPr lang="en-US" dirty="0"/>
-              <a:t>4m</a:t>
+              <a:t>1m</a:t>
             </a:r>
           </a:p>
         </p:txBody>
@@ -3508,7 +3247,7 @@
           <a:p>
             <a:fld id="{9B7FE9FA-6C9D-4D34-A513-E1A47B0ABA56}" type="slidenum">
               <a:rPr lang="en-US" smtClean="0"/>
-              <a:t>6</a:t>
+              <a:t>7</a:t>
             </a:fld>
             <a:endParaRPr lang="en-US"/>
           </a:p>
@@ -3517,7 +3256,7 @@
     </p:spTree>
     <p:extLst>
       <p:ext uri="{BB962C8B-B14F-4D97-AF65-F5344CB8AC3E}">
-        <p14:creationId xmlns:p14="http://schemas.microsoft.com/office/powerpoint/2010/main" val="2340551342"/>
+        <p14:creationId xmlns:p14="http://schemas.microsoft.com/office/powerpoint/2010/main" val="111148801"/>
       </p:ext>
     </p:extLst>
   </p:cSld>
@@ -3573,7 +3312,7 @@
           <a:p>
             <a:r>
               <a:rPr lang="en-US" dirty="0"/>
-              <a:t>1m</a:t>
+              <a:t>2m</a:t>
             </a:r>
           </a:p>
         </p:txBody>
@@ -3595,7 +3334,7 @@
           <a:p>
             <a:fld id="{9B7FE9FA-6C9D-4D34-A513-E1A47B0ABA56}" type="slidenum">
               <a:rPr lang="en-US" smtClean="0"/>
-              <a:t>7</a:t>
+              <a:t>10</a:t>
             </a:fld>
             <a:endParaRPr lang="en-US"/>
           </a:p>
@@ -3604,7 +3343,7 @@
     </p:spTree>
     <p:extLst>
       <p:ext uri="{BB962C8B-B14F-4D97-AF65-F5344CB8AC3E}">
-        <p14:creationId xmlns:p14="http://schemas.microsoft.com/office/powerpoint/2010/main" val="111148801"/>
+        <p14:creationId xmlns:p14="http://schemas.microsoft.com/office/powerpoint/2010/main" val="1998859779"/>
       </p:ext>
     </p:extLst>
   </p:cSld>
@@ -3660,7 +3399,7 @@
           <a:p>
             <a:r>
               <a:rPr lang="en-US" dirty="0"/>
-              <a:t>1.5m</a:t>
+              <a:t>.5m</a:t>
             </a:r>
           </a:p>
         </p:txBody>
@@ -3682,7 +3421,7 @@
           <a:p>
             <a:fld id="{9B7FE9FA-6C9D-4D34-A513-E1A47B0ABA56}" type="slidenum">
               <a:rPr lang="en-US" smtClean="0"/>
-              <a:t>8</a:t>
+              <a:t>11</a:t>
             </a:fld>
             <a:endParaRPr lang="en-US"/>
           </a:p>
@@ -3691,7 +3430,7 @@
     </p:spTree>
     <p:extLst>
       <p:ext uri="{BB962C8B-B14F-4D97-AF65-F5344CB8AC3E}">
-        <p14:creationId xmlns:p14="http://schemas.microsoft.com/office/powerpoint/2010/main" val="3228017919"/>
+        <p14:creationId xmlns:p14="http://schemas.microsoft.com/office/powerpoint/2010/main" val="3418769574"/>
       </p:ext>
     </p:extLst>
   </p:cSld>
@@ -3745,26 +3484,9 @@
           <a:bodyPr/>
           <a:lstStyle/>
           <a:p>
-            <a:pPr marL="0" marR="0" lvl="0" indent="0" algn="l" defTabSz="914400" rtl="0" eaLnBrk="1" fontAlgn="auto" latinLnBrk="0" hangingPunct="1">
-              <a:lnSpc>
-                <a:spcPct val="100000"/>
-              </a:lnSpc>
-              <a:spcBef>
-                <a:spcPts val="0"/>
-              </a:spcBef>
-              <a:spcAft>
-                <a:spcPts val="0"/>
-              </a:spcAft>
-              <a:buClrTx/>
-              <a:buSzTx/>
-              <a:buFontTx/>
-              <a:buNone/>
-              <a:tabLst/>
-              <a:defRPr/>
-            </a:pPr>
-            <a:r>
-              <a:rPr lang="en-US" dirty="0"/>
-              <a:t>.5m</a:t>
+            <a:r>
+              <a:rPr lang="en-US" dirty="0"/>
+              <a:t>1m</a:t>
             </a:r>
           </a:p>
         </p:txBody>
@@ -3786,7 +3508,7 @@
           <a:p>
             <a:fld id="{9B7FE9FA-6C9D-4D34-A513-E1A47B0ABA56}" type="slidenum">
               <a:rPr lang="en-US" smtClean="0"/>
-              <a:t>9</a:t>
+              <a:t>12</a:t>
             </a:fld>
             <a:endParaRPr lang="en-US"/>
           </a:p>
@@ -3795,7 +3517,7 @@
     </p:spTree>
     <p:extLst>
       <p:ext uri="{BB962C8B-B14F-4D97-AF65-F5344CB8AC3E}">
-        <p14:creationId xmlns:p14="http://schemas.microsoft.com/office/powerpoint/2010/main" val="3796808295"/>
+        <p14:creationId xmlns:p14="http://schemas.microsoft.com/office/powerpoint/2010/main" val="1256956146"/>
       </p:ext>
     </p:extLst>
   </p:cSld>
@@ -3851,7 +3573,7 @@
           <a:p>
             <a:r>
               <a:rPr lang="en-US" dirty="0"/>
-              <a:t>2m</a:t>
+              <a:t>.5m</a:t>
             </a:r>
           </a:p>
         </p:txBody>
@@ -3873,7 +3595,7 @@
           <a:p>
             <a:fld id="{9B7FE9FA-6C9D-4D34-A513-E1A47B0ABA56}" type="slidenum">
               <a:rPr lang="en-US" smtClean="0"/>
-              <a:t>10</a:t>
+              <a:t>13</a:t>
             </a:fld>
             <a:endParaRPr lang="en-US"/>
           </a:p>
@@ -3882,7 +3604,7 @@
     </p:spTree>
     <p:extLst>
       <p:ext uri="{BB962C8B-B14F-4D97-AF65-F5344CB8AC3E}">
-        <p14:creationId xmlns:p14="http://schemas.microsoft.com/office/powerpoint/2010/main" val="1998859779"/>
+        <p14:creationId xmlns:p14="http://schemas.microsoft.com/office/powerpoint/2010/main" val="2730729831"/>
       </p:ext>
     </p:extLst>
   </p:cSld>
@@ -4039,7 +3761,7 @@
           <a:p>
             <a:fld id="{EBAA21FC-F3CB-41C2-AF46-91977F01228E}" type="datetimeFigureOut">
               <a:rPr lang="en-US" smtClean="0"/>
-              <a:t>09-Apr-19</a:t>
+              <a:t>4/9/2019</a:t>
             </a:fld>
             <a:endParaRPr lang="en-US"/>
           </a:p>
@@ -4237,7 +3959,7 @@
           <a:p>
             <a:fld id="{EBAA21FC-F3CB-41C2-AF46-91977F01228E}" type="datetimeFigureOut">
               <a:rPr lang="en-US" smtClean="0"/>
-              <a:t>09-Apr-19</a:t>
+              <a:t>4/9/2019</a:t>
             </a:fld>
             <a:endParaRPr lang="en-US"/>
           </a:p>
@@ -4445,7 +4167,7 @@
           <a:p>
             <a:fld id="{EBAA21FC-F3CB-41C2-AF46-91977F01228E}" type="datetimeFigureOut">
               <a:rPr lang="en-US" smtClean="0"/>
-              <a:t>09-Apr-19</a:t>
+              <a:t>4/9/2019</a:t>
             </a:fld>
             <a:endParaRPr lang="en-US"/>
           </a:p>
@@ -4643,7 +4365,7 @@
           <a:p>
             <a:fld id="{EBAA21FC-F3CB-41C2-AF46-91977F01228E}" type="datetimeFigureOut">
               <a:rPr lang="en-US" smtClean="0"/>
-              <a:t>09-Apr-19</a:t>
+              <a:t>4/9/2019</a:t>
             </a:fld>
             <a:endParaRPr lang="en-US"/>
           </a:p>
@@ -4918,7 +4640,7 @@
           <a:p>
             <a:fld id="{EBAA21FC-F3CB-41C2-AF46-91977F01228E}" type="datetimeFigureOut">
               <a:rPr lang="en-US" smtClean="0"/>
-              <a:t>09-Apr-19</a:t>
+              <a:t>4/9/2019</a:t>
             </a:fld>
             <a:endParaRPr lang="en-US"/>
           </a:p>
@@ -5183,7 +4905,7 @@
           <a:p>
             <a:fld id="{EBAA21FC-F3CB-41C2-AF46-91977F01228E}" type="datetimeFigureOut">
               <a:rPr lang="en-US" smtClean="0"/>
-              <a:t>09-Apr-19</a:t>
+              <a:t>4/9/2019</a:t>
             </a:fld>
             <a:endParaRPr lang="en-US"/>
           </a:p>
@@ -5595,7 +5317,7 @@
           <a:p>
             <a:fld id="{EBAA21FC-F3CB-41C2-AF46-91977F01228E}" type="datetimeFigureOut">
               <a:rPr lang="en-US" smtClean="0"/>
-              <a:t>09-Apr-19</a:t>
+              <a:t>4/9/2019</a:t>
             </a:fld>
             <a:endParaRPr lang="en-US"/>
           </a:p>
@@ -5736,7 +5458,7 @@
           <a:p>
             <a:fld id="{EBAA21FC-F3CB-41C2-AF46-91977F01228E}" type="datetimeFigureOut">
               <a:rPr lang="en-US" smtClean="0"/>
-              <a:t>09-Apr-19</a:t>
+              <a:t>4/9/2019</a:t>
             </a:fld>
             <a:endParaRPr lang="en-US"/>
           </a:p>
@@ -5849,7 +5571,7 @@
           <a:p>
             <a:fld id="{EBAA21FC-F3CB-41C2-AF46-91977F01228E}" type="datetimeFigureOut">
               <a:rPr lang="en-US" smtClean="0"/>
-              <a:t>09-Apr-19</a:t>
+              <a:t>4/9/2019</a:t>
             </a:fld>
             <a:endParaRPr lang="en-US"/>
           </a:p>
@@ -6160,7 +5882,7 @@
           <a:p>
             <a:fld id="{EBAA21FC-F3CB-41C2-AF46-91977F01228E}" type="datetimeFigureOut">
               <a:rPr lang="en-US" smtClean="0"/>
-              <a:t>09-Apr-19</a:t>
+              <a:t>4/9/2019</a:t>
             </a:fld>
             <a:endParaRPr lang="en-US"/>
           </a:p>
@@ -6448,7 +6170,7 @@
           <a:p>
             <a:fld id="{EBAA21FC-F3CB-41C2-AF46-91977F01228E}" type="datetimeFigureOut">
               <a:rPr lang="en-US" smtClean="0"/>
-              <a:t>09-Apr-19</a:t>
+              <a:t>4/9/2019</a:t>
             </a:fld>
             <a:endParaRPr lang="en-US"/>
           </a:p>
@@ -6689,7 +6411,7 @@
           <a:p>
             <a:fld id="{EBAA21FC-F3CB-41C2-AF46-91977F01228E}" type="datetimeFigureOut">
               <a:rPr lang="en-US" smtClean="0"/>
-              <a:t>09-Apr-19</a:t>
+              <a:t>4/9/2019</a:t>
             </a:fld>
             <a:endParaRPr lang="en-US"/>
           </a:p>
@@ -13028,56 +12750,705 @@
       </p:grpSpPr>
       <p:sp>
         <p:nvSpPr>
-          <p:cNvPr id="2" name="Title 1">
-            <a:extLst>
-              <a:ext uri="{FF2B5EF4-FFF2-40B4-BE49-F238E27FC236}">
-                <a16:creationId xmlns:a16="http://schemas.microsoft.com/office/drawing/2014/main" id="{29F164C2-E46B-48CF-9A14-A82459FCD930}"/>
-              </a:ext>
-            </a:extLst>
-          </p:cNvPr>
-          <p:cNvSpPr>
-            <a:spLocks noGrp="1"/>
-          </p:cNvSpPr>
-          <p:nvPr>
-            <p:ph type="title"/>
-          </p:nvPr>
-        </p:nvSpPr>
-        <p:spPr/>
-        <p:txBody>
-          <a:bodyPr/>
-          <a:lstStyle/>
-          <a:p>
-            <a:r>
-              <a:rPr lang="en-US" dirty="0"/>
-              <a:t>The Traditional Approach: Accountability</a:t>
-            </a:r>
-          </a:p>
-        </p:txBody>
-      </p:sp>
-      <p:sp>
-        <p:nvSpPr>
-          <p:cNvPr id="3" name="Content Placeholder 2">
-            <a:extLst>
-              <a:ext uri="{FF2B5EF4-FFF2-40B4-BE49-F238E27FC236}">
-                <a16:creationId xmlns:a16="http://schemas.microsoft.com/office/drawing/2014/main" id="{C61BC914-6122-43DD-BB43-E6016E43206B}"/>
-              </a:ext>
-            </a:extLst>
-          </p:cNvPr>
-          <p:cNvSpPr>
-            <a:spLocks noGrp="1"/>
-          </p:cNvSpPr>
-          <p:nvPr>
-            <p:ph idx="1"/>
-          </p:nvPr>
-        </p:nvSpPr>
-        <p:spPr/>
-        <p:txBody>
-          <a:bodyPr/>
-          <a:lstStyle/>
-          <a:p>
-            <a:r>
-              <a:rPr lang="en-US" dirty="0"/>
-              <a:t>Show Accountability Cycle &amp; Walk through it</a:t>
+          <p:cNvPr id="2" name="Oval 1">
+            <a:extLst>
+              <a:ext uri="{FF2B5EF4-FFF2-40B4-BE49-F238E27FC236}">
+                <a16:creationId xmlns:a16="http://schemas.microsoft.com/office/drawing/2014/main" id="{86199DA8-4C1B-4B86-9FC7-808E0206B990}"/>
+              </a:ext>
+            </a:extLst>
+          </p:cNvPr>
+          <p:cNvSpPr/>
+          <p:nvPr/>
+        </p:nvSpPr>
+        <p:spPr>
+          <a:xfrm>
+            <a:off x="5419344" y="4094726"/>
+            <a:ext cx="1645920" cy="731520"/>
+          </a:xfrm>
+          <a:prstGeom prst="ellipse">
+            <a:avLst/>
+          </a:prstGeom>
+          <a:solidFill>
+            <a:schemeClr val="accent1">
+              <a:lumMod val="20000"/>
+              <a:lumOff val="80000"/>
+            </a:schemeClr>
+          </a:solidFill>
+          <a:ln w="28575"/>
+        </p:spPr>
+        <p:style>
+          <a:lnRef idx="2">
+            <a:schemeClr val="accent1">
+              <a:shade val="50000"/>
+            </a:schemeClr>
+          </a:lnRef>
+          <a:fillRef idx="1">
+            <a:schemeClr val="accent1"/>
+          </a:fillRef>
+          <a:effectRef idx="0">
+            <a:schemeClr val="accent1"/>
+          </a:effectRef>
+          <a:fontRef idx="minor">
+            <a:schemeClr val="lt1"/>
+          </a:fontRef>
+        </p:style>
+        <p:txBody>
+          <a:bodyPr rtlCol="0" anchor="ctr"/>
+          <a:lstStyle/>
+          <a:p>
+            <a:pPr algn="ctr"/>
+            <a:r>
+              <a:rPr lang="en-US" dirty="0">
+                <a:solidFill>
+                  <a:schemeClr val="tx1"/>
+                </a:solidFill>
+              </a:rPr>
+              <a:t>Execute</a:t>
+            </a:r>
+          </a:p>
+        </p:txBody>
+      </p:sp>
+      <p:sp>
+        <p:nvSpPr>
+          <p:cNvPr id="4" name="Oval 3">
+            <a:extLst>
+              <a:ext uri="{FF2B5EF4-FFF2-40B4-BE49-F238E27FC236}">
+                <a16:creationId xmlns:a16="http://schemas.microsoft.com/office/drawing/2014/main" id="{054D106C-15BF-448E-9A60-38A5345EAD19}"/>
+              </a:ext>
+            </a:extLst>
+          </p:cNvPr>
+          <p:cNvSpPr/>
+          <p:nvPr/>
+        </p:nvSpPr>
+        <p:spPr>
+          <a:xfrm>
+            <a:off x="7438112" y="2268222"/>
+            <a:ext cx="2054352" cy="731520"/>
+          </a:xfrm>
+          <a:prstGeom prst="ellipse">
+            <a:avLst/>
+          </a:prstGeom>
+          <a:noFill/>
+          <a:ln w="28575"/>
+        </p:spPr>
+        <p:style>
+          <a:lnRef idx="2">
+            <a:schemeClr val="accent1">
+              <a:shade val="50000"/>
+            </a:schemeClr>
+          </a:lnRef>
+          <a:fillRef idx="1">
+            <a:schemeClr val="accent1"/>
+          </a:fillRef>
+          <a:effectRef idx="0">
+            <a:schemeClr val="accent1"/>
+          </a:effectRef>
+          <a:fontRef idx="minor">
+            <a:schemeClr val="lt1"/>
+          </a:fontRef>
+        </p:style>
+        <p:txBody>
+          <a:bodyPr rtlCol="0" anchor="ctr"/>
+          <a:lstStyle/>
+          <a:p>
+            <a:pPr algn="ctr"/>
+            <a:r>
+              <a:rPr lang="en-US" dirty="0">
+                <a:solidFill>
+                  <a:schemeClr val="tx1"/>
+                </a:solidFill>
+              </a:rPr>
+              <a:t>Commitment</a:t>
+            </a:r>
+          </a:p>
+        </p:txBody>
+      </p:sp>
+      <p:sp>
+        <p:nvSpPr>
+          <p:cNvPr id="5" name="Oval 4">
+            <a:extLst>
+              <a:ext uri="{FF2B5EF4-FFF2-40B4-BE49-F238E27FC236}">
+                <a16:creationId xmlns:a16="http://schemas.microsoft.com/office/drawing/2014/main" id="{B63B4930-7C2A-46CB-B169-397B0F16E318}"/>
+              </a:ext>
+            </a:extLst>
+          </p:cNvPr>
+          <p:cNvSpPr/>
+          <p:nvPr/>
+        </p:nvSpPr>
+        <p:spPr>
+          <a:xfrm>
+            <a:off x="7642328" y="4779931"/>
+            <a:ext cx="1645920" cy="731520"/>
+          </a:xfrm>
+          <a:prstGeom prst="ellipse">
+            <a:avLst/>
+          </a:prstGeom>
+          <a:noFill/>
+          <a:ln w="28575"/>
+        </p:spPr>
+        <p:style>
+          <a:lnRef idx="2">
+            <a:schemeClr val="accent1">
+              <a:shade val="50000"/>
+            </a:schemeClr>
+          </a:lnRef>
+          <a:fillRef idx="1">
+            <a:schemeClr val="accent1"/>
+          </a:fillRef>
+          <a:effectRef idx="0">
+            <a:schemeClr val="accent1"/>
+          </a:effectRef>
+          <a:fontRef idx="minor">
+            <a:schemeClr val="lt1"/>
+          </a:fontRef>
+        </p:style>
+        <p:txBody>
+          <a:bodyPr rtlCol="0" anchor="ctr"/>
+          <a:lstStyle/>
+          <a:p>
+            <a:pPr algn="ctr"/>
+            <a:r>
+              <a:rPr lang="en-US" dirty="0">
+                <a:solidFill>
+                  <a:schemeClr val="tx1"/>
+                </a:solidFill>
+              </a:rPr>
+              <a:t>Assess</a:t>
+            </a:r>
+          </a:p>
+        </p:txBody>
+      </p:sp>
+      <p:sp>
+        <p:nvSpPr>
+          <p:cNvPr id="6" name="Oval 5">
+            <a:extLst>
+              <a:ext uri="{FF2B5EF4-FFF2-40B4-BE49-F238E27FC236}">
+                <a16:creationId xmlns:a16="http://schemas.microsoft.com/office/drawing/2014/main" id="{04F590A8-7F59-4211-B3CE-7A74FEB3714E}"/>
+              </a:ext>
+            </a:extLst>
+          </p:cNvPr>
+          <p:cNvSpPr/>
+          <p:nvPr/>
+        </p:nvSpPr>
+        <p:spPr>
+          <a:xfrm>
+            <a:off x="9288248" y="4094726"/>
+            <a:ext cx="1645920" cy="731520"/>
+          </a:xfrm>
+          <a:prstGeom prst="ellipse">
+            <a:avLst/>
+          </a:prstGeom>
+          <a:solidFill>
+            <a:schemeClr val="accent2">
+              <a:lumMod val="40000"/>
+              <a:lumOff val="60000"/>
+            </a:schemeClr>
+          </a:solidFill>
+          <a:ln w="28575"/>
+        </p:spPr>
+        <p:style>
+          <a:lnRef idx="2">
+            <a:schemeClr val="accent1">
+              <a:shade val="50000"/>
+            </a:schemeClr>
+          </a:lnRef>
+          <a:fillRef idx="1">
+            <a:schemeClr val="accent1"/>
+          </a:fillRef>
+          <a:effectRef idx="0">
+            <a:schemeClr val="accent1"/>
+          </a:effectRef>
+          <a:fontRef idx="minor">
+            <a:schemeClr val="lt1"/>
+          </a:fontRef>
+        </p:style>
+        <p:txBody>
+          <a:bodyPr rtlCol="0" anchor="ctr"/>
+          <a:lstStyle/>
+          <a:p>
+            <a:pPr algn="ctr"/>
+            <a:r>
+              <a:rPr lang="en-US" dirty="0">
+                <a:solidFill>
+                  <a:schemeClr val="tx1"/>
+                </a:solidFill>
+              </a:rPr>
+              <a:t>Feedback</a:t>
+            </a:r>
+          </a:p>
+        </p:txBody>
+      </p:sp>
+      <p:sp>
+        <p:nvSpPr>
+          <p:cNvPr id="9" name="TextBox 8">
+            <a:extLst>
+              <a:ext uri="{FF2B5EF4-FFF2-40B4-BE49-F238E27FC236}">
+                <a16:creationId xmlns:a16="http://schemas.microsoft.com/office/drawing/2014/main" id="{3A496956-7CE1-4753-8FCA-247F6A957F97}"/>
+              </a:ext>
+            </a:extLst>
+          </p:cNvPr>
+          <p:cNvSpPr txBox="1"/>
+          <p:nvPr/>
+        </p:nvSpPr>
+        <p:spPr>
+          <a:xfrm>
+            <a:off x="10268691" y="3700377"/>
+            <a:ext cx="825867" cy="369332"/>
+          </a:xfrm>
+          <a:prstGeom prst="rect">
+            <a:avLst/>
+          </a:prstGeom>
+          <a:noFill/>
+        </p:spPr>
+        <p:txBody>
+          <a:bodyPr wrap="none" rtlCol="0">
+            <a:spAutoFit/>
+          </a:bodyPr>
+          <a:lstStyle/>
+          <a:p>
+            <a:r>
+              <a:rPr lang="en-US" dirty="0">
+                <a:solidFill>
+                  <a:srgbClr val="F09456"/>
+                </a:solidFill>
+              </a:rPr>
+              <a:t>Leader</a:t>
+            </a:r>
+          </a:p>
+        </p:txBody>
+      </p:sp>
+      <p:sp>
+        <p:nvSpPr>
+          <p:cNvPr id="10" name="TextBox 9">
+            <a:extLst>
+              <a:ext uri="{FF2B5EF4-FFF2-40B4-BE49-F238E27FC236}">
+                <a16:creationId xmlns:a16="http://schemas.microsoft.com/office/drawing/2014/main" id="{174A2CEC-EB6A-41A1-B458-E3858BC6759F}"/>
+              </a:ext>
+            </a:extLst>
+          </p:cNvPr>
+          <p:cNvSpPr txBox="1"/>
+          <p:nvPr/>
+        </p:nvSpPr>
+        <p:spPr>
+          <a:xfrm>
+            <a:off x="5443566" y="3755295"/>
+            <a:ext cx="686726" cy="369332"/>
+          </a:xfrm>
+          <a:prstGeom prst="rect">
+            <a:avLst/>
+          </a:prstGeom>
+          <a:noFill/>
+        </p:spPr>
+        <p:txBody>
+          <a:bodyPr wrap="none" rtlCol="0">
+            <a:spAutoFit/>
+          </a:bodyPr>
+          <a:lstStyle/>
+          <a:p>
+            <a:r>
+              <a:rPr lang="en-US" dirty="0">
+                <a:solidFill>
+                  <a:schemeClr val="accent1">
+                    <a:lumMod val="75000"/>
+                  </a:schemeClr>
+                </a:solidFill>
+              </a:rPr>
+              <a:t>Team</a:t>
+            </a:r>
+          </a:p>
+        </p:txBody>
+      </p:sp>
+      <p:cxnSp>
+        <p:nvCxnSpPr>
+          <p:cNvPr id="19" name="Connector: Curved 18">
+            <a:extLst>
+              <a:ext uri="{FF2B5EF4-FFF2-40B4-BE49-F238E27FC236}">
+                <a16:creationId xmlns:a16="http://schemas.microsoft.com/office/drawing/2014/main" id="{CE3921C5-1C91-4967-85A7-C67AB731B4AA}"/>
+              </a:ext>
+            </a:extLst>
+          </p:cNvPr>
+          <p:cNvCxnSpPr>
+            <a:stCxn id="5" idx="6"/>
+            <a:endCxn id="6" idx="4"/>
+          </p:cNvCxnSpPr>
+          <p:nvPr/>
+        </p:nvCxnSpPr>
+        <p:spPr>
+          <a:xfrm flipV="1">
+            <a:off x="9288248" y="4826246"/>
+            <a:ext cx="822960" cy="319445"/>
+          </a:xfrm>
+          <a:prstGeom prst="curvedConnector2">
+            <a:avLst/>
+          </a:prstGeom>
+          <a:ln w="38100">
+            <a:tailEnd type="triangle"/>
+          </a:ln>
+        </p:spPr>
+        <p:style>
+          <a:lnRef idx="1">
+            <a:schemeClr val="accent1"/>
+          </a:lnRef>
+          <a:fillRef idx="0">
+            <a:schemeClr val="accent1"/>
+          </a:fillRef>
+          <a:effectRef idx="0">
+            <a:schemeClr val="accent1"/>
+          </a:effectRef>
+          <a:fontRef idx="minor">
+            <a:schemeClr val="tx1"/>
+          </a:fontRef>
+        </p:style>
+      </p:cxnSp>
+      <p:cxnSp>
+        <p:nvCxnSpPr>
+          <p:cNvPr id="20" name="Connector: Curved 19">
+            <a:extLst>
+              <a:ext uri="{FF2B5EF4-FFF2-40B4-BE49-F238E27FC236}">
+                <a16:creationId xmlns:a16="http://schemas.microsoft.com/office/drawing/2014/main" id="{C609C0A7-2BD3-437B-A7F4-49CA496BFDCD}"/>
+              </a:ext>
+            </a:extLst>
+          </p:cNvPr>
+          <p:cNvCxnSpPr>
+            <a:cxnSpLocks/>
+            <a:stCxn id="4" idx="2"/>
+            <a:endCxn id="2" idx="7"/>
+          </p:cNvCxnSpPr>
+          <p:nvPr/>
+        </p:nvCxnSpPr>
+        <p:spPr>
+          <a:xfrm rot="10800000" flipV="1">
+            <a:off x="6824226" y="2633981"/>
+            <a:ext cx="613887" cy="1567873"/>
+          </a:xfrm>
+          <a:prstGeom prst="curvedConnector2">
+            <a:avLst/>
+          </a:prstGeom>
+          <a:ln w="38100">
+            <a:tailEnd type="triangle"/>
+          </a:ln>
+        </p:spPr>
+        <p:style>
+          <a:lnRef idx="1">
+            <a:schemeClr val="accent1"/>
+          </a:lnRef>
+          <a:fillRef idx="0">
+            <a:schemeClr val="accent1"/>
+          </a:fillRef>
+          <a:effectRef idx="0">
+            <a:schemeClr val="accent1"/>
+          </a:effectRef>
+          <a:fontRef idx="minor">
+            <a:schemeClr val="tx1"/>
+          </a:fontRef>
+        </p:style>
+      </p:cxnSp>
+      <p:cxnSp>
+        <p:nvCxnSpPr>
+          <p:cNvPr id="24" name="Connector: Curved 23">
+            <a:extLst>
+              <a:ext uri="{FF2B5EF4-FFF2-40B4-BE49-F238E27FC236}">
+                <a16:creationId xmlns:a16="http://schemas.microsoft.com/office/drawing/2014/main" id="{B1537C06-439B-4019-8281-B14E43DF6F53}"/>
+              </a:ext>
+            </a:extLst>
+          </p:cNvPr>
+          <p:cNvCxnSpPr>
+            <a:cxnSpLocks/>
+            <a:stCxn id="2" idx="5"/>
+            <a:endCxn id="5" idx="2"/>
+          </p:cNvCxnSpPr>
+          <p:nvPr/>
+        </p:nvCxnSpPr>
+        <p:spPr>
+          <a:xfrm rot="16200000" flipH="1">
+            <a:off x="7019989" y="4523352"/>
+            <a:ext cx="426574" cy="818103"/>
+          </a:xfrm>
+          <a:prstGeom prst="curvedConnector2">
+            <a:avLst/>
+          </a:prstGeom>
+          <a:ln w="38100">
+            <a:tailEnd type="triangle"/>
+          </a:ln>
+        </p:spPr>
+        <p:style>
+          <a:lnRef idx="1">
+            <a:schemeClr val="accent1"/>
+          </a:lnRef>
+          <a:fillRef idx="0">
+            <a:schemeClr val="accent1"/>
+          </a:fillRef>
+          <a:effectRef idx="0">
+            <a:schemeClr val="accent1"/>
+          </a:effectRef>
+          <a:fontRef idx="minor">
+            <a:schemeClr val="tx1"/>
+          </a:fontRef>
+        </p:style>
+      </p:cxnSp>
+      <p:cxnSp>
+        <p:nvCxnSpPr>
+          <p:cNvPr id="25" name="Connector: Curved 24">
+            <a:extLst>
+              <a:ext uri="{FF2B5EF4-FFF2-40B4-BE49-F238E27FC236}">
+                <a16:creationId xmlns:a16="http://schemas.microsoft.com/office/drawing/2014/main" id="{CA54429C-6FC4-4A94-8FE0-A0A5A292DC21}"/>
+              </a:ext>
+            </a:extLst>
+          </p:cNvPr>
+          <p:cNvCxnSpPr>
+            <a:cxnSpLocks/>
+            <a:stCxn id="6" idx="0"/>
+            <a:endCxn id="21" idx="4"/>
+          </p:cNvCxnSpPr>
+          <p:nvPr/>
+        </p:nvCxnSpPr>
+        <p:spPr>
+          <a:xfrm rot="5400000" flipH="1" flipV="1">
+            <a:off x="9914593" y="3898111"/>
+            <a:ext cx="393230" cy="12700"/>
+          </a:xfrm>
+          <a:prstGeom prst="curvedConnector3">
+            <a:avLst>
+              <a:gd name="adj1" fmla="val 50000"/>
+            </a:avLst>
+          </a:prstGeom>
+          <a:ln w="38100">
+            <a:tailEnd type="triangle"/>
+          </a:ln>
+        </p:spPr>
+        <p:style>
+          <a:lnRef idx="1">
+            <a:schemeClr val="accent1"/>
+          </a:lnRef>
+          <a:fillRef idx="0">
+            <a:schemeClr val="accent1"/>
+          </a:fillRef>
+          <a:effectRef idx="0">
+            <a:schemeClr val="accent1"/>
+          </a:effectRef>
+          <a:fontRef idx="minor">
+            <a:schemeClr val="tx1"/>
+          </a:fontRef>
+        </p:style>
+      </p:cxnSp>
+      <p:sp>
+        <p:nvSpPr>
+          <p:cNvPr id="75" name="Rectangle: Rounded Corners 74">
+            <a:extLst>
+              <a:ext uri="{FF2B5EF4-FFF2-40B4-BE49-F238E27FC236}">
+                <a16:creationId xmlns:a16="http://schemas.microsoft.com/office/drawing/2014/main" id="{AB4EDE0F-F597-4DD8-84B8-625A9F3FB2EA}"/>
+              </a:ext>
+            </a:extLst>
+          </p:cNvPr>
+          <p:cNvSpPr/>
+          <p:nvPr/>
+        </p:nvSpPr>
+        <p:spPr>
+          <a:xfrm>
+            <a:off x="5205984" y="2027208"/>
+            <a:ext cx="5864352" cy="3666456"/>
+          </a:xfrm>
+          <a:prstGeom prst="roundRect">
+            <a:avLst/>
+          </a:prstGeom>
+          <a:noFill/>
+          <a:ln w="57150">
+            <a:prstDash val="sysDot"/>
+          </a:ln>
+        </p:spPr>
+        <p:style>
+          <a:lnRef idx="2">
+            <a:schemeClr val="accent1">
+              <a:shade val="50000"/>
+            </a:schemeClr>
+          </a:lnRef>
+          <a:fillRef idx="1">
+            <a:schemeClr val="accent1"/>
+          </a:fillRef>
+          <a:effectRef idx="0">
+            <a:schemeClr val="accent1"/>
+          </a:effectRef>
+          <a:fontRef idx="minor">
+            <a:schemeClr val="lt1"/>
+          </a:fontRef>
+        </p:style>
+        <p:txBody>
+          <a:bodyPr rtlCol="0" anchor="ctr"/>
+          <a:lstStyle/>
+          <a:p>
+            <a:pPr algn="ctr"/>
+            <a:endParaRPr lang="en-US"/>
+          </a:p>
+        </p:txBody>
+      </p:sp>
+      <p:sp>
+        <p:nvSpPr>
+          <p:cNvPr id="85" name="TextBox 84">
+            <a:extLst>
+              <a:ext uri="{FF2B5EF4-FFF2-40B4-BE49-F238E27FC236}">
+                <a16:creationId xmlns:a16="http://schemas.microsoft.com/office/drawing/2014/main" id="{9F0113B2-CF18-4901-A202-2F7B28E71F9C}"/>
+              </a:ext>
+            </a:extLst>
+          </p:cNvPr>
+          <p:cNvSpPr txBox="1"/>
+          <p:nvPr/>
+        </p:nvSpPr>
+        <p:spPr>
+          <a:xfrm>
+            <a:off x="8978921" y="5691426"/>
+            <a:ext cx="1906804" cy="369332"/>
+          </a:xfrm>
+          <a:prstGeom prst="rect">
+            <a:avLst/>
+          </a:prstGeom>
+          <a:noFill/>
+        </p:spPr>
+        <p:txBody>
+          <a:bodyPr wrap="none" rtlCol="0">
+            <a:spAutoFit/>
+          </a:bodyPr>
+          <a:lstStyle/>
+          <a:p>
+            <a:r>
+              <a:rPr lang="en-US" dirty="0"/>
+              <a:t>What we do today</a:t>
+            </a:r>
+          </a:p>
+        </p:txBody>
+      </p:sp>
+      <p:sp>
+        <p:nvSpPr>
+          <p:cNvPr id="21" name="Oval 20">
+            <a:extLst>
+              <a:ext uri="{FF2B5EF4-FFF2-40B4-BE49-F238E27FC236}">
+                <a16:creationId xmlns:a16="http://schemas.microsoft.com/office/drawing/2014/main" id="{9D6D71A2-9BE7-4CA4-9966-5A1B756D7120}"/>
+              </a:ext>
+            </a:extLst>
+          </p:cNvPr>
+          <p:cNvSpPr/>
+          <p:nvPr/>
+        </p:nvSpPr>
+        <p:spPr>
+          <a:xfrm>
+            <a:off x="9288248" y="2969976"/>
+            <a:ext cx="1645920" cy="731520"/>
+          </a:xfrm>
+          <a:prstGeom prst="ellipse">
+            <a:avLst/>
+          </a:prstGeom>
+          <a:solidFill>
+            <a:schemeClr val="accent2">
+              <a:lumMod val="40000"/>
+              <a:lumOff val="60000"/>
+            </a:schemeClr>
+          </a:solidFill>
+          <a:ln w="28575"/>
+        </p:spPr>
+        <p:style>
+          <a:lnRef idx="2">
+            <a:schemeClr val="accent1">
+              <a:shade val="50000"/>
+            </a:schemeClr>
+          </a:lnRef>
+          <a:fillRef idx="1">
+            <a:schemeClr val="accent1"/>
+          </a:fillRef>
+          <a:effectRef idx="0">
+            <a:schemeClr val="accent1"/>
+          </a:effectRef>
+          <a:fontRef idx="minor">
+            <a:schemeClr val="lt1"/>
+          </a:fontRef>
+        </p:style>
+        <p:txBody>
+          <a:bodyPr rtlCol="0" anchor="ctr"/>
+          <a:lstStyle/>
+          <a:p>
+            <a:pPr algn="ctr"/>
+            <a:r>
+              <a:rPr lang="en-US" dirty="0">
+                <a:solidFill>
+                  <a:schemeClr val="tx1"/>
+                </a:solidFill>
+              </a:rPr>
+              <a:t>Direction</a:t>
+            </a:r>
+          </a:p>
+        </p:txBody>
+      </p:sp>
+      <p:cxnSp>
+        <p:nvCxnSpPr>
+          <p:cNvPr id="22" name="Connector: Curved 21">
+            <a:extLst>
+              <a:ext uri="{FF2B5EF4-FFF2-40B4-BE49-F238E27FC236}">
+                <a16:creationId xmlns:a16="http://schemas.microsoft.com/office/drawing/2014/main" id="{F1B44C3D-E3C8-45AD-9768-257517B3CE17}"/>
+              </a:ext>
+            </a:extLst>
+          </p:cNvPr>
+          <p:cNvCxnSpPr>
+            <a:stCxn id="21" idx="0"/>
+            <a:endCxn id="4" idx="6"/>
+          </p:cNvCxnSpPr>
+          <p:nvPr/>
+        </p:nvCxnSpPr>
+        <p:spPr>
+          <a:xfrm rot="16200000" flipV="1">
+            <a:off x="9633839" y="2492607"/>
+            <a:ext cx="335994" cy="618744"/>
+          </a:xfrm>
+          <a:prstGeom prst="curvedConnector2">
+            <a:avLst/>
+          </a:prstGeom>
+          <a:ln w="38100">
+            <a:tailEnd type="triangle"/>
+          </a:ln>
+        </p:spPr>
+        <p:style>
+          <a:lnRef idx="3">
+            <a:schemeClr val="accent1"/>
+          </a:lnRef>
+          <a:fillRef idx="0">
+            <a:schemeClr val="accent1"/>
+          </a:fillRef>
+          <a:effectRef idx="2">
+            <a:schemeClr val="accent1"/>
+          </a:effectRef>
+          <a:fontRef idx="minor">
+            <a:schemeClr val="tx1"/>
+          </a:fontRef>
+        </p:style>
+      </p:cxnSp>
+      <p:sp>
+        <p:nvSpPr>
+          <p:cNvPr id="29" name="TextBox 28">
+            <a:extLst>
+              <a:ext uri="{FF2B5EF4-FFF2-40B4-BE49-F238E27FC236}">
+                <a16:creationId xmlns:a16="http://schemas.microsoft.com/office/drawing/2014/main" id="{E075943F-1931-4150-8DE2-755A8F37CBC8}"/>
+              </a:ext>
+            </a:extLst>
+          </p:cNvPr>
+          <p:cNvSpPr txBox="1"/>
+          <p:nvPr/>
+        </p:nvSpPr>
+        <p:spPr>
+          <a:xfrm>
+            <a:off x="7642328" y="5705613"/>
+            <a:ext cx="2037289" cy="369332"/>
+          </a:xfrm>
+          <a:prstGeom prst="rect">
+            <a:avLst/>
+          </a:prstGeom>
+          <a:noFill/>
+        </p:spPr>
+        <p:txBody>
+          <a:bodyPr wrap="none" rtlCol="0">
+            <a:spAutoFit/>
+          </a:bodyPr>
+          <a:lstStyle/>
+          <a:p>
+            <a:r>
+              <a:rPr lang="en-US" dirty="0"/>
+              <a:t>Accountability Loop</a:t>
             </a:r>
           </a:p>
         </p:txBody>
@@ -13085,13 +13456,466 @@
     </p:spTree>
     <p:extLst>
       <p:ext uri="{BB962C8B-B14F-4D97-AF65-F5344CB8AC3E}">
-        <p14:creationId xmlns:p14="http://schemas.microsoft.com/office/powerpoint/2010/main" val="454566563"/>
+        <p14:creationId xmlns:p14="http://schemas.microsoft.com/office/powerpoint/2010/main" val="1245690177"/>
       </p:ext>
     </p:extLst>
   </p:cSld>
   <p:clrMapOvr>
     <a:masterClrMapping/>
   </p:clrMapOvr>
+  <p:timing>
+    <p:tnLst>
+      <p:par>
+        <p:cTn id="1" dur="indefinite" restart="never" nodeType="tmRoot">
+          <p:childTnLst>
+            <p:seq concurrent="1" nextAc="seek">
+              <p:cTn id="2" dur="indefinite" nodeType="mainSeq">
+                <p:childTnLst>
+                  <p:par>
+                    <p:cTn id="3" fill="hold">
+                      <p:stCondLst>
+                        <p:cond delay="indefinite"/>
+                      </p:stCondLst>
+                      <p:childTnLst>
+                        <p:par>
+                          <p:cTn id="4" fill="hold">
+                            <p:stCondLst>
+                              <p:cond delay="0"/>
+                            </p:stCondLst>
+                            <p:childTnLst>
+                              <p:par>
+                                <p:cTn id="5" presetID="1" presetClass="entr" presetSubtype="0" fill="hold" grpId="0" nodeType="clickEffect">
+                                  <p:stCondLst>
+                                    <p:cond delay="0"/>
+                                  </p:stCondLst>
+                                  <p:childTnLst>
+                                    <p:set>
+                                      <p:cBhvr>
+                                        <p:cTn id="6" dur="1" fill="hold">
+                                          <p:stCondLst>
+                                            <p:cond delay="0"/>
+                                          </p:stCondLst>
+                                        </p:cTn>
+                                        <p:tgtEl>
+                                          <p:spTgt spid="4"/>
+                                        </p:tgtEl>
+                                        <p:attrNameLst>
+                                          <p:attrName>style.visibility</p:attrName>
+                                        </p:attrNameLst>
+                                      </p:cBhvr>
+                                      <p:to>
+                                        <p:strVal val="visible"/>
+                                      </p:to>
+                                    </p:set>
+                                  </p:childTnLst>
+                                </p:cTn>
+                              </p:par>
+                              <p:par>
+                                <p:cTn id="7" presetID="1" presetClass="entr" presetSubtype="0" fill="hold" nodeType="withEffect">
+                                  <p:stCondLst>
+                                    <p:cond delay="0"/>
+                                  </p:stCondLst>
+                                  <p:childTnLst>
+                                    <p:set>
+                                      <p:cBhvr>
+                                        <p:cTn id="8" dur="1" fill="hold">
+                                          <p:stCondLst>
+                                            <p:cond delay="0"/>
+                                          </p:stCondLst>
+                                        </p:cTn>
+                                        <p:tgtEl>
+                                          <p:spTgt spid="22"/>
+                                        </p:tgtEl>
+                                        <p:attrNameLst>
+                                          <p:attrName>style.visibility</p:attrName>
+                                        </p:attrNameLst>
+                                      </p:cBhvr>
+                                      <p:to>
+                                        <p:strVal val="visible"/>
+                                      </p:to>
+                                    </p:set>
+                                  </p:childTnLst>
+                                </p:cTn>
+                              </p:par>
+                            </p:childTnLst>
+                          </p:cTn>
+                        </p:par>
+                      </p:childTnLst>
+                    </p:cTn>
+                  </p:par>
+                  <p:par>
+                    <p:cTn id="9" fill="hold">
+                      <p:stCondLst>
+                        <p:cond delay="indefinite"/>
+                      </p:stCondLst>
+                      <p:childTnLst>
+                        <p:par>
+                          <p:cTn id="10" fill="hold">
+                            <p:stCondLst>
+                              <p:cond delay="0"/>
+                            </p:stCondLst>
+                            <p:childTnLst>
+                              <p:par>
+                                <p:cTn id="11" presetID="1" presetClass="entr" presetSubtype="0" fill="hold" grpId="0" nodeType="clickEffect">
+                                  <p:stCondLst>
+                                    <p:cond delay="0"/>
+                                  </p:stCondLst>
+                                  <p:childTnLst>
+                                    <p:set>
+                                      <p:cBhvr>
+                                        <p:cTn id="12" dur="1" fill="hold">
+                                          <p:stCondLst>
+                                            <p:cond delay="0"/>
+                                          </p:stCondLst>
+                                        </p:cTn>
+                                        <p:tgtEl>
+                                          <p:spTgt spid="2"/>
+                                        </p:tgtEl>
+                                        <p:attrNameLst>
+                                          <p:attrName>style.visibility</p:attrName>
+                                        </p:attrNameLst>
+                                      </p:cBhvr>
+                                      <p:to>
+                                        <p:strVal val="visible"/>
+                                      </p:to>
+                                    </p:set>
+                                  </p:childTnLst>
+                                </p:cTn>
+                              </p:par>
+                              <p:par>
+                                <p:cTn id="13" presetID="1" presetClass="entr" presetSubtype="0" fill="hold" nodeType="withEffect">
+                                  <p:stCondLst>
+                                    <p:cond delay="0"/>
+                                  </p:stCondLst>
+                                  <p:childTnLst>
+                                    <p:set>
+                                      <p:cBhvr>
+                                        <p:cTn id="14" dur="1" fill="hold">
+                                          <p:stCondLst>
+                                            <p:cond delay="0"/>
+                                          </p:stCondLst>
+                                        </p:cTn>
+                                        <p:tgtEl>
+                                          <p:spTgt spid="20"/>
+                                        </p:tgtEl>
+                                        <p:attrNameLst>
+                                          <p:attrName>style.visibility</p:attrName>
+                                        </p:attrNameLst>
+                                      </p:cBhvr>
+                                      <p:to>
+                                        <p:strVal val="visible"/>
+                                      </p:to>
+                                    </p:set>
+                                  </p:childTnLst>
+                                </p:cTn>
+                              </p:par>
+                            </p:childTnLst>
+                          </p:cTn>
+                        </p:par>
+                      </p:childTnLst>
+                    </p:cTn>
+                  </p:par>
+                  <p:par>
+                    <p:cTn id="15" fill="hold">
+                      <p:stCondLst>
+                        <p:cond delay="indefinite"/>
+                      </p:stCondLst>
+                      <p:childTnLst>
+                        <p:par>
+                          <p:cTn id="16" fill="hold">
+                            <p:stCondLst>
+                              <p:cond delay="0"/>
+                            </p:stCondLst>
+                            <p:childTnLst>
+                              <p:par>
+                                <p:cTn id="17" presetID="1" presetClass="entr" presetSubtype="0" fill="hold" nodeType="clickEffect">
+                                  <p:stCondLst>
+                                    <p:cond delay="0"/>
+                                  </p:stCondLst>
+                                  <p:childTnLst>
+                                    <p:set>
+                                      <p:cBhvr>
+                                        <p:cTn id="18" dur="1" fill="hold">
+                                          <p:stCondLst>
+                                            <p:cond delay="0"/>
+                                          </p:stCondLst>
+                                        </p:cTn>
+                                        <p:tgtEl>
+                                          <p:spTgt spid="24"/>
+                                        </p:tgtEl>
+                                        <p:attrNameLst>
+                                          <p:attrName>style.visibility</p:attrName>
+                                        </p:attrNameLst>
+                                      </p:cBhvr>
+                                      <p:to>
+                                        <p:strVal val="visible"/>
+                                      </p:to>
+                                    </p:set>
+                                  </p:childTnLst>
+                                </p:cTn>
+                              </p:par>
+                              <p:par>
+                                <p:cTn id="19" presetID="1" presetClass="entr" presetSubtype="0" fill="hold" grpId="0" nodeType="withEffect">
+                                  <p:stCondLst>
+                                    <p:cond delay="0"/>
+                                  </p:stCondLst>
+                                  <p:childTnLst>
+                                    <p:set>
+                                      <p:cBhvr>
+                                        <p:cTn id="20" dur="1" fill="hold">
+                                          <p:stCondLst>
+                                            <p:cond delay="0"/>
+                                          </p:stCondLst>
+                                        </p:cTn>
+                                        <p:tgtEl>
+                                          <p:spTgt spid="5"/>
+                                        </p:tgtEl>
+                                        <p:attrNameLst>
+                                          <p:attrName>style.visibility</p:attrName>
+                                        </p:attrNameLst>
+                                      </p:cBhvr>
+                                      <p:to>
+                                        <p:strVal val="visible"/>
+                                      </p:to>
+                                    </p:set>
+                                  </p:childTnLst>
+                                </p:cTn>
+                              </p:par>
+                            </p:childTnLst>
+                          </p:cTn>
+                        </p:par>
+                      </p:childTnLst>
+                    </p:cTn>
+                  </p:par>
+                  <p:par>
+                    <p:cTn id="21" fill="hold">
+                      <p:stCondLst>
+                        <p:cond delay="indefinite"/>
+                      </p:stCondLst>
+                      <p:childTnLst>
+                        <p:par>
+                          <p:cTn id="22" fill="hold">
+                            <p:stCondLst>
+                              <p:cond delay="0"/>
+                            </p:stCondLst>
+                            <p:childTnLst>
+                              <p:par>
+                                <p:cTn id="23" presetID="1" presetClass="entr" presetSubtype="0" fill="hold" nodeType="clickEffect">
+                                  <p:stCondLst>
+                                    <p:cond delay="0"/>
+                                  </p:stCondLst>
+                                  <p:childTnLst>
+                                    <p:set>
+                                      <p:cBhvr>
+                                        <p:cTn id="24" dur="1" fill="hold">
+                                          <p:stCondLst>
+                                            <p:cond delay="0"/>
+                                          </p:stCondLst>
+                                        </p:cTn>
+                                        <p:tgtEl>
+                                          <p:spTgt spid="19"/>
+                                        </p:tgtEl>
+                                        <p:attrNameLst>
+                                          <p:attrName>style.visibility</p:attrName>
+                                        </p:attrNameLst>
+                                      </p:cBhvr>
+                                      <p:to>
+                                        <p:strVal val="visible"/>
+                                      </p:to>
+                                    </p:set>
+                                  </p:childTnLst>
+                                </p:cTn>
+                              </p:par>
+                              <p:par>
+                                <p:cTn id="25" presetID="1" presetClass="entr" presetSubtype="0" fill="hold" grpId="0" nodeType="withEffect">
+                                  <p:stCondLst>
+                                    <p:cond delay="0"/>
+                                  </p:stCondLst>
+                                  <p:childTnLst>
+                                    <p:set>
+                                      <p:cBhvr>
+                                        <p:cTn id="26" dur="1" fill="hold">
+                                          <p:stCondLst>
+                                            <p:cond delay="0"/>
+                                          </p:stCondLst>
+                                        </p:cTn>
+                                        <p:tgtEl>
+                                          <p:spTgt spid="6"/>
+                                        </p:tgtEl>
+                                        <p:attrNameLst>
+                                          <p:attrName>style.visibility</p:attrName>
+                                        </p:attrNameLst>
+                                      </p:cBhvr>
+                                      <p:to>
+                                        <p:strVal val="visible"/>
+                                      </p:to>
+                                    </p:set>
+                                  </p:childTnLst>
+                                </p:cTn>
+                              </p:par>
+                              <p:par>
+                                <p:cTn id="27" presetID="1" presetClass="entr" presetSubtype="0" fill="hold" nodeType="withEffect">
+                                  <p:stCondLst>
+                                    <p:cond delay="0"/>
+                                  </p:stCondLst>
+                                  <p:childTnLst>
+                                    <p:set>
+                                      <p:cBhvr>
+                                        <p:cTn id="28" dur="1" fill="hold">
+                                          <p:stCondLst>
+                                            <p:cond delay="0"/>
+                                          </p:stCondLst>
+                                        </p:cTn>
+                                        <p:tgtEl>
+                                          <p:spTgt spid="25"/>
+                                        </p:tgtEl>
+                                        <p:attrNameLst>
+                                          <p:attrName>style.visibility</p:attrName>
+                                        </p:attrNameLst>
+                                      </p:cBhvr>
+                                      <p:to>
+                                        <p:strVal val="visible"/>
+                                      </p:to>
+                                    </p:set>
+                                  </p:childTnLst>
+                                </p:cTn>
+                              </p:par>
+                            </p:childTnLst>
+                          </p:cTn>
+                        </p:par>
+                      </p:childTnLst>
+                    </p:cTn>
+                  </p:par>
+                  <p:par>
+                    <p:cTn id="29" fill="hold">
+                      <p:stCondLst>
+                        <p:cond delay="indefinite"/>
+                      </p:stCondLst>
+                      <p:childTnLst>
+                        <p:par>
+                          <p:cTn id="30" fill="hold">
+                            <p:stCondLst>
+                              <p:cond delay="0"/>
+                            </p:stCondLst>
+                            <p:childTnLst>
+                              <p:par>
+                                <p:cTn id="31" presetID="1" presetClass="entr" presetSubtype="0" fill="hold" grpId="0" nodeType="clickEffect">
+                                  <p:stCondLst>
+                                    <p:cond delay="0"/>
+                                  </p:stCondLst>
+                                  <p:childTnLst>
+                                    <p:set>
+                                      <p:cBhvr>
+                                        <p:cTn id="32" dur="1" fill="hold">
+                                          <p:stCondLst>
+                                            <p:cond delay="0"/>
+                                          </p:stCondLst>
+                                        </p:cTn>
+                                        <p:tgtEl>
+                                          <p:spTgt spid="29"/>
+                                        </p:tgtEl>
+                                        <p:attrNameLst>
+                                          <p:attrName>style.visibility</p:attrName>
+                                        </p:attrNameLst>
+                                      </p:cBhvr>
+                                      <p:to>
+                                        <p:strVal val="visible"/>
+                                      </p:to>
+                                    </p:set>
+                                  </p:childTnLst>
+                                </p:cTn>
+                              </p:par>
+                              <p:par>
+                                <p:cTn id="33" presetID="1" presetClass="entr" presetSubtype="0" fill="hold" grpId="0" nodeType="withEffect">
+                                  <p:stCondLst>
+                                    <p:cond delay="0"/>
+                                  </p:stCondLst>
+                                  <p:childTnLst>
+                                    <p:set>
+                                      <p:cBhvr>
+                                        <p:cTn id="34" dur="1" fill="hold">
+                                          <p:stCondLst>
+                                            <p:cond delay="0"/>
+                                          </p:stCondLst>
+                                        </p:cTn>
+                                        <p:tgtEl>
+                                          <p:spTgt spid="75"/>
+                                        </p:tgtEl>
+                                        <p:attrNameLst>
+                                          <p:attrName>style.visibility</p:attrName>
+                                        </p:attrNameLst>
+                                      </p:cBhvr>
+                                      <p:to>
+                                        <p:strVal val="visible"/>
+                                      </p:to>
+                                    </p:set>
+                                  </p:childTnLst>
+                                </p:cTn>
+                              </p:par>
+                              <p:par>
+                                <p:cTn id="35" presetID="1" presetClass="exit" presetSubtype="0" fill="hold" grpId="0" nodeType="withEffect">
+                                  <p:stCondLst>
+                                    <p:cond delay="0"/>
+                                  </p:stCondLst>
+                                  <p:childTnLst>
+                                    <p:set>
+                                      <p:cBhvr>
+                                        <p:cTn id="36" dur="1" fill="hold">
+                                          <p:stCondLst>
+                                            <p:cond delay="0"/>
+                                          </p:stCondLst>
+                                        </p:cTn>
+                                        <p:tgtEl>
+                                          <p:spTgt spid="85"/>
+                                        </p:tgtEl>
+                                        <p:attrNameLst>
+                                          <p:attrName>style.visibility</p:attrName>
+                                        </p:attrNameLst>
+                                      </p:cBhvr>
+                                      <p:to>
+                                        <p:strVal val="hidden"/>
+                                      </p:to>
+                                    </p:set>
+                                  </p:childTnLst>
+                                </p:cTn>
+                              </p:par>
+                            </p:childTnLst>
+                          </p:cTn>
+                        </p:par>
+                      </p:childTnLst>
+                    </p:cTn>
+                  </p:par>
+                </p:childTnLst>
+              </p:cTn>
+              <p:prevCondLst>
+                <p:cond evt="onPrev" delay="0">
+                  <p:tgtEl>
+                    <p:sldTgt/>
+                  </p:tgtEl>
+                </p:cond>
+              </p:prevCondLst>
+              <p:nextCondLst>
+                <p:cond evt="onNext" delay="0">
+                  <p:tgtEl>
+                    <p:sldTgt/>
+                  </p:tgtEl>
+                </p:cond>
+              </p:nextCondLst>
+            </p:seq>
+          </p:childTnLst>
+        </p:cTn>
+      </p:par>
+    </p:tnLst>
+    <p:bldLst>
+      <p:bldP spid="2" grpId="0" animBg="1"/>
+      <p:bldP spid="4" grpId="0" animBg="1"/>
+      <p:bldP spid="5" grpId="0" animBg="1"/>
+      <p:bldP spid="6" grpId="0" animBg="1"/>
+      <p:bldP spid="75" grpId="0" animBg="1"/>
+      <p:bldP spid="85" grpId="0"/>
+      <p:bldP spid="29" grpId="0"/>
+    </p:bldLst>
+  </p:timing>
 </p:sld>
 </file>
 
@@ -13206,56 +14030,1107 @@
       </p:grpSpPr>
       <p:sp>
         <p:nvSpPr>
-          <p:cNvPr id="2" name="Title 1">
-            <a:extLst>
-              <a:ext uri="{FF2B5EF4-FFF2-40B4-BE49-F238E27FC236}">
-                <a16:creationId xmlns:a16="http://schemas.microsoft.com/office/drawing/2014/main" id="{EE8FC66C-88D4-4A29-B1CD-6D3D926EFAFC}"/>
-              </a:ext>
-            </a:extLst>
-          </p:cNvPr>
-          <p:cNvSpPr>
-            <a:spLocks noGrp="1"/>
-          </p:cNvSpPr>
-          <p:nvPr>
-            <p:ph type="title"/>
-          </p:nvPr>
-        </p:nvSpPr>
-        <p:spPr/>
-        <p:txBody>
-          <a:bodyPr/>
-          <a:lstStyle/>
-          <a:p>
-            <a:r>
-              <a:rPr lang="en-US" dirty="0"/>
-              <a:t>The New Approach: Ownership</a:t>
-            </a:r>
-          </a:p>
-        </p:txBody>
-      </p:sp>
-      <p:sp>
-        <p:nvSpPr>
-          <p:cNvPr id="3" name="Content Placeholder 2">
-            <a:extLst>
-              <a:ext uri="{FF2B5EF4-FFF2-40B4-BE49-F238E27FC236}">
-                <a16:creationId xmlns:a16="http://schemas.microsoft.com/office/drawing/2014/main" id="{22EA194E-24CC-433C-919B-62E66185F808}"/>
-              </a:ext>
-            </a:extLst>
-          </p:cNvPr>
-          <p:cNvSpPr>
-            <a:spLocks noGrp="1"/>
-          </p:cNvSpPr>
-          <p:nvPr>
-            <p:ph idx="1"/>
-          </p:nvPr>
-        </p:nvSpPr>
-        <p:spPr/>
-        <p:txBody>
-          <a:bodyPr/>
-          <a:lstStyle/>
-          <a:p>
-            <a:r>
-              <a:rPr lang="en-US" dirty="0"/>
-              <a:t>Show Ownership + Accountability cycles (the extension version), and walk through the new parts.</a:t>
+          <p:cNvPr id="2" name="Oval 1">
+            <a:extLst>
+              <a:ext uri="{FF2B5EF4-FFF2-40B4-BE49-F238E27FC236}">
+                <a16:creationId xmlns:a16="http://schemas.microsoft.com/office/drawing/2014/main" id="{86199DA8-4C1B-4B86-9FC7-808E0206B990}"/>
+              </a:ext>
+            </a:extLst>
+          </p:cNvPr>
+          <p:cNvSpPr/>
+          <p:nvPr/>
+        </p:nvSpPr>
+        <p:spPr>
+          <a:xfrm>
+            <a:off x="5419344" y="4094726"/>
+            <a:ext cx="1645920" cy="731520"/>
+          </a:xfrm>
+          <a:prstGeom prst="ellipse">
+            <a:avLst/>
+          </a:prstGeom>
+          <a:solidFill>
+            <a:schemeClr val="accent1">
+              <a:lumMod val="20000"/>
+              <a:lumOff val="80000"/>
+            </a:schemeClr>
+          </a:solidFill>
+          <a:ln w="28575"/>
+        </p:spPr>
+        <p:style>
+          <a:lnRef idx="2">
+            <a:schemeClr val="accent1">
+              <a:shade val="50000"/>
+            </a:schemeClr>
+          </a:lnRef>
+          <a:fillRef idx="1">
+            <a:schemeClr val="accent1"/>
+          </a:fillRef>
+          <a:effectRef idx="0">
+            <a:schemeClr val="accent1"/>
+          </a:effectRef>
+          <a:fontRef idx="minor">
+            <a:schemeClr val="lt1"/>
+          </a:fontRef>
+        </p:style>
+        <p:txBody>
+          <a:bodyPr rtlCol="0" anchor="ctr"/>
+          <a:lstStyle/>
+          <a:p>
+            <a:pPr algn="ctr"/>
+            <a:r>
+              <a:rPr lang="en-US" dirty="0">
+                <a:solidFill>
+                  <a:schemeClr val="tx1"/>
+                </a:solidFill>
+              </a:rPr>
+              <a:t>Execute</a:t>
+            </a:r>
+          </a:p>
+        </p:txBody>
+      </p:sp>
+      <p:sp>
+        <p:nvSpPr>
+          <p:cNvPr id="4" name="Oval 3">
+            <a:extLst>
+              <a:ext uri="{FF2B5EF4-FFF2-40B4-BE49-F238E27FC236}">
+                <a16:creationId xmlns:a16="http://schemas.microsoft.com/office/drawing/2014/main" id="{054D106C-15BF-448E-9A60-38A5345EAD19}"/>
+              </a:ext>
+            </a:extLst>
+          </p:cNvPr>
+          <p:cNvSpPr/>
+          <p:nvPr/>
+        </p:nvSpPr>
+        <p:spPr>
+          <a:xfrm>
+            <a:off x="7438112" y="2268222"/>
+            <a:ext cx="2054352" cy="731520"/>
+          </a:xfrm>
+          <a:prstGeom prst="ellipse">
+            <a:avLst/>
+          </a:prstGeom>
+          <a:noFill/>
+          <a:ln w="28575"/>
+        </p:spPr>
+        <p:style>
+          <a:lnRef idx="2">
+            <a:schemeClr val="accent1">
+              <a:shade val="50000"/>
+            </a:schemeClr>
+          </a:lnRef>
+          <a:fillRef idx="1">
+            <a:schemeClr val="accent1"/>
+          </a:fillRef>
+          <a:effectRef idx="0">
+            <a:schemeClr val="accent1"/>
+          </a:effectRef>
+          <a:fontRef idx="minor">
+            <a:schemeClr val="lt1"/>
+          </a:fontRef>
+        </p:style>
+        <p:txBody>
+          <a:bodyPr rtlCol="0" anchor="ctr"/>
+          <a:lstStyle/>
+          <a:p>
+            <a:pPr algn="ctr"/>
+            <a:r>
+              <a:rPr lang="en-US" dirty="0">
+                <a:solidFill>
+                  <a:schemeClr val="tx1"/>
+                </a:solidFill>
+              </a:rPr>
+              <a:t>Commitment</a:t>
+            </a:r>
+          </a:p>
+        </p:txBody>
+      </p:sp>
+      <p:sp>
+        <p:nvSpPr>
+          <p:cNvPr id="5" name="Oval 4">
+            <a:extLst>
+              <a:ext uri="{FF2B5EF4-FFF2-40B4-BE49-F238E27FC236}">
+                <a16:creationId xmlns:a16="http://schemas.microsoft.com/office/drawing/2014/main" id="{B63B4930-7C2A-46CB-B169-397B0F16E318}"/>
+              </a:ext>
+            </a:extLst>
+          </p:cNvPr>
+          <p:cNvSpPr/>
+          <p:nvPr/>
+        </p:nvSpPr>
+        <p:spPr>
+          <a:xfrm>
+            <a:off x="7642328" y="4779931"/>
+            <a:ext cx="1645920" cy="731520"/>
+          </a:xfrm>
+          <a:prstGeom prst="ellipse">
+            <a:avLst/>
+          </a:prstGeom>
+          <a:noFill/>
+          <a:ln w="28575"/>
+        </p:spPr>
+        <p:style>
+          <a:lnRef idx="2">
+            <a:schemeClr val="accent1">
+              <a:shade val="50000"/>
+            </a:schemeClr>
+          </a:lnRef>
+          <a:fillRef idx="1">
+            <a:schemeClr val="accent1"/>
+          </a:fillRef>
+          <a:effectRef idx="0">
+            <a:schemeClr val="accent1"/>
+          </a:effectRef>
+          <a:fontRef idx="minor">
+            <a:schemeClr val="lt1"/>
+          </a:fontRef>
+        </p:style>
+        <p:txBody>
+          <a:bodyPr rtlCol="0" anchor="ctr"/>
+          <a:lstStyle/>
+          <a:p>
+            <a:pPr algn="ctr"/>
+            <a:r>
+              <a:rPr lang="en-US" dirty="0">
+                <a:solidFill>
+                  <a:schemeClr val="tx1"/>
+                </a:solidFill>
+              </a:rPr>
+              <a:t>Assess</a:t>
+            </a:r>
+          </a:p>
+        </p:txBody>
+      </p:sp>
+      <p:sp>
+        <p:nvSpPr>
+          <p:cNvPr id="6" name="Oval 5">
+            <a:extLst>
+              <a:ext uri="{FF2B5EF4-FFF2-40B4-BE49-F238E27FC236}">
+                <a16:creationId xmlns:a16="http://schemas.microsoft.com/office/drawing/2014/main" id="{04F590A8-7F59-4211-B3CE-7A74FEB3714E}"/>
+              </a:ext>
+            </a:extLst>
+          </p:cNvPr>
+          <p:cNvSpPr/>
+          <p:nvPr/>
+        </p:nvSpPr>
+        <p:spPr>
+          <a:xfrm>
+            <a:off x="9288248" y="4094726"/>
+            <a:ext cx="1645920" cy="731520"/>
+          </a:xfrm>
+          <a:prstGeom prst="ellipse">
+            <a:avLst/>
+          </a:prstGeom>
+          <a:solidFill>
+            <a:schemeClr val="accent2">
+              <a:lumMod val="40000"/>
+              <a:lumOff val="60000"/>
+            </a:schemeClr>
+          </a:solidFill>
+          <a:ln w="28575"/>
+        </p:spPr>
+        <p:style>
+          <a:lnRef idx="2">
+            <a:schemeClr val="accent1">
+              <a:shade val="50000"/>
+            </a:schemeClr>
+          </a:lnRef>
+          <a:fillRef idx="1">
+            <a:schemeClr val="accent1"/>
+          </a:fillRef>
+          <a:effectRef idx="0">
+            <a:schemeClr val="accent1"/>
+          </a:effectRef>
+          <a:fontRef idx="minor">
+            <a:schemeClr val="lt1"/>
+          </a:fontRef>
+        </p:style>
+        <p:txBody>
+          <a:bodyPr rtlCol="0" anchor="ctr"/>
+          <a:lstStyle/>
+          <a:p>
+            <a:pPr algn="ctr"/>
+            <a:r>
+              <a:rPr lang="en-US" dirty="0">
+                <a:solidFill>
+                  <a:schemeClr val="tx1"/>
+                </a:solidFill>
+              </a:rPr>
+              <a:t>Feedback</a:t>
+            </a:r>
+          </a:p>
+        </p:txBody>
+      </p:sp>
+      <p:sp>
+        <p:nvSpPr>
+          <p:cNvPr id="9" name="TextBox 8">
+            <a:extLst>
+              <a:ext uri="{FF2B5EF4-FFF2-40B4-BE49-F238E27FC236}">
+                <a16:creationId xmlns:a16="http://schemas.microsoft.com/office/drawing/2014/main" id="{3A496956-7CE1-4753-8FCA-247F6A957F97}"/>
+              </a:ext>
+            </a:extLst>
+          </p:cNvPr>
+          <p:cNvSpPr txBox="1"/>
+          <p:nvPr/>
+        </p:nvSpPr>
+        <p:spPr>
+          <a:xfrm>
+            <a:off x="10268691" y="3700377"/>
+            <a:ext cx="825867" cy="369332"/>
+          </a:xfrm>
+          <a:prstGeom prst="rect">
+            <a:avLst/>
+          </a:prstGeom>
+          <a:noFill/>
+        </p:spPr>
+        <p:txBody>
+          <a:bodyPr wrap="none" rtlCol="0">
+            <a:spAutoFit/>
+          </a:bodyPr>
+          <a:lstStyle/>
+          <a:p>
+            <a:r>
+              <a:rPr lang="en-US" dirty="0">
+                <a:solidFill>
+                  <a:srgbClr val="F09456"/>
+                </a:solidFill>
+              </a:rPr>
+              <a:t>Leader</a:t>
+            </a:r>
+          </a:p>
+        </p:txBody>
+      </p:sp>
+      <p:sp>
+        <p:nvSpPr>
+          <p:cNvPr id="10" name="TextBox 9">
+            <a:extLst>
+              <a:ext uri="{FF2B5EF4-FFF2-40B4-BE49-F238E27FC236}">
+                <a16:creationId xmlns:a16="http://schemas.microsoft.com/office/drawing/2014/main" id="{174A2CEC-EB6A-41A1-B458-E3858BC6759F}"/>
+              </a:ext>
+            </a:extLst>
+          </p:cNvPr>
+          <p:cNvSpPr txBox="1"/>
+          <p:nvPr/>
+        </p:nvSpPr>
+        <p:spPr>
+          <a:xfrm>
+            <a:off x="5443566" y="3755295"/>
+            <a:ext cx="686726" cy="369332"/>
+          </a:xfrm>
+          <a:prstGeom prst="rect">
+            <a:avLst/>
+          </a:prstGeom>
+          <a:noFill/>
+        </p:spPr>
+        <p:txBody>
+          <a:bodyPr wrap="none" rtlCol="0">
+            <a:spAutoFit/>
+          </a:bodyPr>
+          <a:lstStyle/>
+          <a:p>
+            <a:r>
+              <a:rPr lang="en-US" dirty="0">
+                <a:solidFill>
+                  <a:schemeClr val="accent1">
+                    <a:lumMod val="75000"/>
+                  </a:schemeClr>
+                </a:solidFill>
+              </a:rPr>
+              <a:t>Team</a:t>
+            </a:r>
+          </a:p>
+        </p:txBody>
+      </p:sp>
+      <p:cxnSp>
+        <p:nvCxnSpPr>
+          <p:cNvPr id="19" name="Connector: Curved 18">
+            <a:extLst>
+              <a:ext uri="{FF2B5EF4-FFF2-40B4-BE49-F238E27FC236}">
+                <a16:creationId xmlns:a16="http://schemas.microsoft.com/office/drawing/2014/main" id="{CE3921C5-1C91-4967-85A7-C67AB731B4AA}"/>
+              </a:ext>
+            </a:extLst>
+          </p:cNvPr>
+          <p:cNvCxnSpPr>
+            <a:stCxn id="5" idx="6"/>
+            <a:endCxn id="6" idx="4"/>
+          </p:cNvCxnSpPr>
+          <p:nvPr/>
+        </p:nvCxnSpPr>
+        <p:spPr>
+          <a:xfrm flipV="1">
+            <a:off x="9288248" y="4826246"/>
+            <a:ext cx="822960" cy="319445"/>
+          </a:xfrm>
+          <a:prstGeom prst="curvedConnector2">
+            <a:avLst/>
+          </a:prstGeom>
+          <a:ln w="38100">
+            <a:tailEnd type="triangle"/>
+          </a:ln>
+        </p:spPr>
+        <p:style>
+          <a:lnRef idx="1">
+            <a:schemeClr val="accent1"/>
+          </a:lnRef>
+          <a:fillRef idx="0">
+            <a:schemeClr val="accent1"/>
+          </a:fillRef>
+          <a:effectRef idx="0">
+            <a:schemeClr val="accent1"/>
+          </a:effectRef>
+          <a:fontRef idx="minor">
+            <a:schemeClr val="tx1"/>
+          </a:fontRef>
+        </p:style>
+      </p:cxnSp>
+      <p:cxnSp>
+        <p:nvCxnSpPr>
+          <p:cNvPr id="20" name="Connector: Curved 19">
+            <a:extLst>
+              <a:ext uri="{FF2B5EF4-FFF2-40B4-BE49-F238E27FC236}">
+                <a16:creationId xmlns:a16="http://schemas.microsoft.com/office/drawing/2014/main" id="{C609C0A7-2BD3-437B-A7F4-49CA496BFDCD}"/>
+              </a:ext>
+            </a:extLst>
+          </p:cNvPr>
+          <p:cNvCxnSpPr>
+            <a:cxnSpLocks/>
+            <a:stCxn id="4" idx="2"/>
+            <a:endCxn id="2" idx="7"/>
+          </p:cNvCxnSpPr>
+          <p:nvPr/>
+        </p:nvCxnSpPr>
+        <p:spPr>
+          <a:xfrm rot="10800000" flipV="1">
+            <a:off x="6824226" y="2633981"/>
+            <a:ext cx="613887" cy="1567873"/>
+          </a:xfrm>
+          <a:prstGeom prst="curvedConnector2">
+            <a:avLst/>
+          </a:prstGeom>
+          <a:ln w="38100">
+            <a:tailEnd type="triangle"/>
+          </a:ln>
+        </p:spPr>
+        <p:style>
+          <a:lnRef idx="1">
+            <a:schemeClr val="accent1"/>
+          </a:lnRef>
+          <a:fillRef idx="0">
+            <a:schemeClr val="accent1"/>
+          </a:fillRef>
+          <a:effectRef idx="0">
+            <a:schemeClr val="accent1"/>
+          </a:effectRef>
+          <a:fontRef idx="minor">
+            <a:schemeClr val="tx1"/>
+          </a:fontRef>
+        </p:style>
+      </p:cxnSp>
+      <p:cxnSp>
+        <p:nvCxnSpPr>
+          <p:cNvPr id="24" name="Connector: Curved 23">
+            <a:extLst>
+              <a:ext uri="{FF2B5EF4-FFF2-40B4-BE49-F238E27FC236}">
+                <a16:creationId xmlns:a16="http://schemas.microsoft.com/office/drawing/2014/main" id="{B1537C06-439B-4019-8281-B14E43DF6F53}"/>
+              </a:ext>
+            </a:extLst>
+          </p:cNvPr>
+          <p:cNvCxnSpPr>
+            <a:cxnSpLocks/>
+            <a:stCxn id="2" idx="5"/>
+            <a:endCxn id="5" idx="2"/>
+          </p:cNvCxnSpPr>
+          <p:nvPr/>
+        </p:nvCxnSpPr>
+        <p:spPr>
+          <a:xfrm rot="16200000" flipH="1">
+            <a:off x="7019989" y="4523352"/>
+            <a:ext cx="426574" cy="818103"/>
+          </a:xfrm>
+          <a:prstGeom prst="curvedConnector2">
+            <a:avLst/>
+          </a:prstGeom>
+          <a:ln w="38100">
+            <a:tailEnd type="triangle"/>
+          </a:ln>
+        </p:spPr>
+        <p:style>
+          <a:lnRef idx="1">
+            <a:schemeClr val="accent1"/>
+          </a:lnRef>
+          <a:fillRef idx="0">
+            <a:schemeClr val="accent1"/>
+          </a:fillRef>
+          <a:effectRef idx="0">
+            <a:schemeClr val="accent1"/>
+          </a:effectRef>
+          <a:fontRef idx="minor">
+            <a:schemeClr val="tx1"/>
+          </a:fontRef>
+        </p:style>
+      </p:cxnSp>
+      <p:cxnSp>
+        <p:nvCxnSpPr>
+          <p:cNvPr id="25" name="Connector: Curved 24">
+            <a:extLst>
+              <a:ext uri="{FF2B5EF4-FFF2-40B4-BE49-F238E27FC236}">
+                <a16:creationId xmlns:a16="http://schemas.microsoft.com/office/drawing/2014/main" id="{CA54429C-6FC4-4A94-8FE0-A0A5A292DC21}"/>
+              </a:ext>
+            </a:extLst>
+          </p:cNvPr>
+          <p:cNvCxnSpPr>
+            <a:cxnSpLocks/>
+            <a:stCxn id="6" idx="0"/>
+            <a:endCxn id="21" idx="4"/>
+          </p:cNvCxnSpPr>
+          <p:nvPr/>
+        </p:nvCxnSpPr>
+        <p:spPr>
+          <a:xfrm rot="5400000" flipH="1" flipV="1">
+            <a:off x="9914593" y="3898111"/>
+            <a:ext cx="393230" cy="12700"/>
+          </a:xfrm>
+          <a:prstGeom prst="curvedConnector3">
+            <a:avLst>
+              <a:gd name="adj1" fmla="val 50000"/>
+            </a:avLst>
+          </a:prstGeom>
+          <a:ln w="38100">
+            <a:tailEnd type="triangle"/>
+          </a:ln>
+        </p:spPr>
+        <p:style>
+          <a:lnRef idx="1">
+            <a:schemeClr val="accent1"/>
+          </a:lnRef>
+          <a:fillRef idx="0">
+            <a:schemeClr val="accent1"/>
+          </a:fillRef>
+          <a:effectRef idx="0">
+            <a:schemeClr val="accent1"/>
+          </a:effectRef>
+          <a:fontRef idx="minor">
+            <a:schemeClr val="tx1"/>
+          </a:fontRef>
+        </p:style>
+      </p:cxnSp>
+      <p:sp>
+        <p:nvSpPr>
+          <p:cNvPr id="21" name="Oval 20">
+            <a:extLst>
+              <a:ext uri="{FF2B5EF4-FFF2-40B4-BE49-F238E27FC236}">
+                <a16:creationId xmlns:a16="http://schemas.microsoft.com/office/drawing/2014/main" id="{9D6D71A2-9BE7-4CA4-9966-5A1B756D7120}"/>
+              </a:ext>
+            </a:extLst>
+          </p:cNvPr>
+          <p:cNvSpPr/>
+          <p:nvPr/>
+        </p:nvSpPr>
+        <p:spPr>
+          <a:xfrm>
+            <a:off x="9288248" y="2969976"/>
+            <a:ext cx="1645920" cy="731520"/>
+          </a:xfrm>
+          <a:prstGeom prst="ellipse">
+            <a:avLst/>
+          </a:prstGeom>
+          <a:solidFill>
+            <a:schemeClr val="accent2">
+              <a:lumMod val="40000"/>
+              <a:lumOff val="60000"/>
+            </a:schemeClr>
+          </a:solidFill>
+          <a:ln w="28575"/>
+        </p:spPr>
+        <p:style>
+          <a:lnRef idx="2">
+            <a:schemeClr val="accent1">
+              <a:shade val="50000"/>
+            </a:schemeClr>
+          </a:lnRef>
+          <a:fillRef idx="1">
+            <a:schemeClr val="accent1"/>
+          </a:fillRef>
+          <a:effectRef idx="0">
+            <a:schemeClr val="accent1"/>
+          </a:effectRef>
+          <a:fontRef idx="minor">
+            <a:schemeClr val="lt1"/>
+          </a:fontRef>
+        </p:style>
+        <p:txBody>
+          <a:bodyPr rtlCol="0" anchor="ctr"/>
+          <a:lstStyle/>
+          <a:p>
+            <a:pPr algn="ctr"/>
+            <a:r>
+              <a:rPr lang="en-US" dirty="0">
+                <a:solidFill>
+                  <a:schemeClr val="tx1"/>
+                </a:solidFill>
+              </a:rPr>
+              <a:t>Direction</a:t>
+            </a:r>
+          </a:p>
+        </p:txBody>
+      </p:sp>
+      <p:cxnSp>
+        <p:nvCxnSpPr>
+          <p:cNvPr id="22" name="Connector: Curved 21">
+            <a:extLst>
+              <a:ext uri="{FF2B5EF4-FFF2-40B4-BE49-F238E27FC236}">
+                <a16:creationId xmlns:a16="http://schemas.microsoft.com/office/drawing/2014/main" id="{F1B44C3D-E3C8-45AD-9768-257517B3CE17}"/>
+              </a:ext>
+            </a:extLst>
+          </p:cNvPr>
+          <p:cNvCxnSpPr>
+            <a:stCxn id="21" idx="0"/>
+            <a:endCxn id="4" idx="6"/>
+          </p:cNvCxnSpPr>
+          <p:nvPr/>
+        </p:nvCxnSpPr>
+        <p:spPr>
+          <a:xfrm rot="16200000" flipV="1">
+            <a:off x="9633839" y="2492607"/>
+            <a:ext cx="335994" cy="618744"/>
+          </a:xfrm>
+          <a:prstGeom prst="curvedConnector2">
+            <a:avLst/>
+          </a:prstGeom>
+          <a:ln w="38100">
+            <a:tailEnd type="triangle"/>
+          </a:ln>
+        </p:spPr>
+        <p:style>
+          <a:lnRef idx="3">
+            <a:schemeClr val="accent1"/>
+          </a:lnRef>
+          <a:fillRef idx="0">
+            <a:schemeClr val="accent1"/>
+          </a:fillRef>
+          <a:effectRef idx="2">
+            <a:schemeClr val="accent1"/>
+          </a:effectRef>
+          <a:fontRef idx="minor">
+            <a:schemeClr val="tx1"/>
+          </a:fontRef>
+        </p:style>
+      </p:cxnSp>
+      <p:sp>
+        <p:nvSpPr>
+          <p:cNvPr id="16" name="Oval 15">
+            <a:extLst>
+              <a:ext uri="{FF2B5EF4-FFF2-40B4-BE49-F238E27FC236}">
+                <a16:creationId xmlns:a16="http://schemas.microsoft.com/office/drawing/2014/main" id="{F5467CAE-C6F5-4457-A3F0-44045D635ACB}"/>
+              </a:ext>
+            </a:extLst>
+          </p:cNvPr>
+          <p:cNvSpPr/>
+          <p:nvPr/>
+        </p:nvSpPr>
+        <p:spPr>
+          <a:xfrm>
+            <a:off x="2707998" y="3129012"/>
+            <a:ext cx="1645920" cy="731520"/>
+          </a:xfrm>
+          <a:prstGeom prst="ellipse">
+            <a:avLst/>
+          </a:prstGeom>
+          <a:solidFill>
+            <a:schemeClr val="accent1">
+              <a:lumMod val="20000"/>
+              <a:lumOff val="80000"/>
+            </a:schemeClr>
+          </a:solidFill>
+          <a:ln w="28575"/>
+        </p:spPr>
+        <p:style>
+          <a:lnRef idx="2">
+            <a:schemeClr val="accent1">
+              <a:shade val="50000"/>
+            </a:schemeClr>
+          </a:lnRef>
+          <a:fillRef idx="1">
+            <a:schemeClr val="accent1"/>
+          </a:fillRef>
+          <a:effectRef idx="0">
+            <a:schemeClr val="accent1"/>
+          </a:effectRef>
+          <a:fontRef idx="minor">
+            <a:schemeClr val="lt1"/>
+          </a:fontRef>
+        </p:style>
+        <p:txBody>
+          <a:bodyPr rtlCol="0" anchor="ctr"/>
+          <a:lstStyle/>
+          <a:p>
+            <a:pPr algn="ctr"/>
+            <a:r>
+              <a:rPr lang="en-US" dirty="0">
+                <a:solidFill>
+                  <a:schemeClr val="tx1"/>
+                </a:solidFill>
+              </a:rPr>
+              <a:t>Direction</a:t>
+            </a:r>
+          </a:p>
+        </p:txBody>
+      </p:sp>
+      <p:sp>
+        <p:nvSpPr>
+          <p:cNvPr id="17" name="Oval 16">
+            <a:extLst>
+              <a:ext uri="{FF2B5EF4-FFF2-40B4-BE49-F238E27FC236}">
+                <a16:creationId xmlns:a16="http://schemas.microsoft.com/office/drawing/2014/main" id="{1A03C2EE-4E91-4E16-BC96-047376D7C7D7}"/>
+              </a:ext>
+            </a:extLst>
+          </p:cNvPr>
+          <p:cNvSpPr/>
+          <p:nvPr/>
+        </p:nvSpPr>
+        <p:spPr>
+          <a:xfrm>
+            <a:off x="3908470" y="1845172"/>
+            <a:ext cx="1645920" cy="731520"/>
+          </a:xfrm>
+          <a:prstGeom prst="ellipse">
+            <a:avLst/>
+          </a:prstGeom>
+          <a:solidFill>
+            <a:schemeClr val="accent1">
+              <a:lumMod val="20000"/>
+              <a:lumOff val="80000"/>
+            </a:schemeClr>
+          </a:solidFill>
+          <a:ln w="28575"/>
+        </p:spPr>
+        <p:style>
+          <a:lnRef idx="2">
+            <a:schemeClr val="accent1">
+              <a:shade val="50000"/>
+            </a:schemeClr>
+          </a:lnRef>
+          <a:fillRef idx="1">
+            <a:schemeClr val="accent1"/>
+          </a:fillRef>
+          <a:effectRef idx="0">
+            <a:schemeClr val="accent1"/>
+          </a:effectRef>
+          <a:fontRef idx="minor">
+            <a:schemeClr val="lt1"/>
+          </a:fontRef>
+        </p:style>
+        <p:txBody>
+          <a:bodyPr rtlCol="0" anchor="ctr"/>
+          <a:lstStyle/>
+          <a:p>
+            <a:pPr algn="ctr"/>
+            <a:r>
+              <a:rPr lang="en-US" dirty="0">
+                <a:solidFill>
+                  <a:schemeClr val="tx1"/>
+                </a:solidFill>
+              </a:rPr>
+              <a:t>Assess</a:t>
+            </a:r>
+          </a:p>
+        </p:txBody>
+      </p:sp>
+      <p:sp>
+        <p:nvSpPr>
+          <p:cNvPr id="18" name="Rectangle: Rounded Corners 17">
+            <a:extLst>
+              <a:ext uri="{FF2B5EF4-FFF2-40B4-BE49-F238E27FC236}">
+                <a16:creationId xmlns:a16="http://schemas.microsoft.com/office/drawing/2014/main" id="{70B13BEE-852E-4C1E-A7DC-593751946B9E}"/>
+              </a:ext>
+            </a:extLst>
+          </p:cNvPr>
+          <p:cNvSpPr/>
+          <p:nvPr/>
+        </p:nvSpPr>
+        <p:spPr>
+          <a:xfrm>
+            <a:off x="2477723" y="1414272"/>
+            <a:ext cx="4733844" cy="3627115"/>
+          </a:xfrm>
+          <a:prstGeom prst="roundRect">
+            <a:avLst/>
+          </a:prstGeom>
+          <a:noFill/>
+          <a:ln w="57150">
+            <a:prstDash val="sysDot"/>
+          </a:ln>
+        </p:spPr>
+        <p:style>
+          <a:lnRef idx="2">
+            <a:schemeClr val="accent1">
+              <a:shade val="50000"/>
+            </a:schemeClr>
+          </a:lnRef>
+          <a:fillRef idx="1">
+            <a:schemeClr val="accent1"/>
+          </a:fillRef>
+          <a:effectRef idx="0">
+            <a:schemeClr val="accent1"/>
+          </a:effectRef>
+          <a:fontRef idx="minor">
+            <a:schemeClr val="lt1"/>
+          </a:fontRef>
+        </p:style>
+        <p:txBody>
+          <a:bodyPr rtlCol="0" anchor="ctr"/>
+          <a:lstStyle/>
+          <a:p>
+            <a:pPr algn="ctr"/>
+            <a:endParaRPr lang="en-US"/>
+          </a:p>
+        </p:txBody>
+      </p:sp>
+      <p:cxnSp>
+        <p:nvCxnSpPr>
+          <p:cNvPr id="23" name="Connector: Curved 22">
+            <a:extLst>
+              <a:ext uri="{FF2B5EF4-FFF2-40B4-BE49-F238E27FC236}">
+                <a16:creationId xmlns:a16="http://schemas.microsoft.com/office/drawing/2014/main" id="{94F89EF5-34A3-40FC-B3B1-9CFBBD3299A1}"/>
+              </a:ext>
+            </a:extLst>
+          </p:cNvPr>
+          <p:cNvCxnSpPr>
+            <a:cxnSpLocks/>
+            <a:stCxn id="2" idx="0"/>
+            <a:endCxn id="17" idx="6"/>
+          </p:cNvCxnSpPr>
+          <p:nvPr/>
+        </p:nvCxnSpPr>
+        <p:spPr>
+          <a:xfrm rot="16200000" flipV="1">
+            <a:off x="4956450" y="2808872"/>
+            <a:ext cx="1883794" cy="687914"/>
+          </a:xfrm>
+          <a:prstGeom prst="curvedConnector2">
+            <a:avLst/>
+          </a:prstGeom>
+          <a:ln w="38100">
+            <a:tailEnd type="triangle"/>
+          </a:ln>
+        </p:spPr>
+        <p:style>
+          <a:lnRef idx="1">
+            <a:schemeClr val="accent1"/>
+          </a:lnRef>
+          <a:fillRef idx="0">
+            <a:schemeClr val="accent1"/>
+          </a:fillRef>
+          <a:effectRef idx="0">
+            <a:schemeClr val="accent1"/>
+          </a:effectRef>
+          <a:fontRef idx="minor">
+            <a:schemeClr val="tx1"/>
+          </a:fontRef>
+        </p:style>
+      </p:cxnSp>
+      <p:cxnSp>
+        <p:nvCxnSpPr>
+          <p:cNvPr id="26" name="Connector: Curved 25">
+            <a:extLst>
+              <a:ext uri="{FF2B5EF4-FFF2-40B4-BE49-F238E27FC236}">
+                <a16:creationId xmlns:a16="http://schemas.microsoft.com/office/drawing/2014/main" id="{77123615-CD96-4D7D-B5A7-C53BC52B6ACA}"/>
+              </a:ext>
+            </a:extLst>
+          </p:cNvPr>
+          <p:cNvCxnSpPr>
+            <a:cxnSpLocks/>
+            <a:stCxn id="16" idx="4"/>
+            <a:endCxn id="2" idx="2"/>
+          </p:cNvCxnSpPr>
+          <p:nvPr/>
+        </p:nvCxnSpPr>
+        <p:spPr>
+          <a:xfrm rot="16200000" flipH="1">
+            <a:off x="4175174" y="3216316"/>
+            <a:ext cx="599954" cy="1888386"/>
+          </a:xfrm>
+          <a:prstGeom prst="curvedConnector2">
+            <a:avLst/>
+          </a:prstGeom>
+          <a:ln w="38100">
+            <a:tailEnd type="triangle"/>
+          </a:ln>
+        </p:spPr>
+        <p:style>
+          <a:lnRef idx="1">
+            <a:schemeClr val="accent1"/>
+          </a:lnRef>
+          <a:fillRef idx="0">
+            <a:schemeClr val="accent1"/>
+          </a:fillRef>
+          <a:effectRef idx="0">
+            <a:schemeClr val="accent1"/>
+          </a:effectRef>
+          <a:fontRef idx="minor">
+            <a:schemeClr val="tx1"/>
+          </a:fontRef>
+        </p:style>
+      </p:cxnSp>
+      <p:cxnSp>
+        <p:nvCxnSpPr>
+          <p:cNvPr id="27" name="Connector: Curved 26">
+            <a:extLst>
+              <a:ext uri="{FF2B5EF4-FFF2-40B4-BE49-F238E27FC236}">
+                <a16:creationId xmlns:a16="http://schemas.microsoft.com/office/drawing/2014/main" id="{0CFBBDE4-12D9-42F2-94D7-AC8BE054F727}"/>
+              </a:ext>
+            </a:extLst>
+          </p:cNvPr>
+          <p:cNvCxnSpPr>
+            <a:cxnSpLocks/>
+            <a:stCxn id="17" idx="2"/>
+            <a:endCxn id="16" idx="0"/>
+          </p:cNvCxnSpPr>
+          <p:nvPr/>
+        </p:nvCxnSpPr>
+        <p:spPr>
+          <a:xfrm rot="10800000" flipV="1">
+            <a:off x="3530958" y="2210932"/>
+            <a:ext cx="377512" cy="918080"/>
+          </a:xfrm>
+          <a:prstGeom prst="curvedConnector2">
+            <a:avLst/>
+          </a:prstGeom>
+          <a:ln w="38100">
+            <a:tailEnd type="triangle"/>
+          </a:ln>
+        </p:spPr>
+        <p:style>
+          <a:lnRef idx="1">
+            <a:schemeClr val="accent1"/>
+          </a:lnRef>
+          <a:fillRef idx="0">
+            <a:schemeClr val="accent1"/>
+          </a:fillRef>
+          <a:effectRef idx="0">
+            <a:schemeClr val="accent1"/>
+          </a:effectRef>
+          <a:fontRef idx="minor">
+            <a:schemeClr val="tx1"/>
+          </a:fontRef>
+        </p:style>
+      </p:cxnSp>
+      <p:sp>
+        <p:nvSpPr>
+          <p:cNvPr id="28" name="TextBox 27">
+            <a:extLst>
+              <a:ext uri="{FF2B5EF4-FFF2-40B4-BE49-F238E27FC236}">
+                <a16:creationId xmlns:a16="http://schemas.microsoft.com/office/drawing/2014/main" id="{F188771D-A16E-4BC7-A3F1-39A2DC20921C}"/>
+              </a:ext>
+            </a:extLst>
+          </p:cNvPr>
+          <p:cNvSpPr txBox="1"/>
+          <p:nvPr/>
+        </p:nvSpPr>
+        <p:spPr>
+          <a:xfrm>
+            <a:off x="2757180" y="1030077"/>
+            <a:ext cx="1717971" cy="369332"/>
+          </a:xfrm>
+          <a:prstGeom prst="rect">
+            <a:avLst/>
+          </a:prstGeom>
+          <a:noFill/>
+        </p:spPr>
+        <p:txBody>
+          <a:bodyPr wrap="none" rtlCol="0">
+            <a:spAutoFit/>
+          </a:bodyPr>
+          <a:lstStyle/>
+          <a:p>
+            <a:r>
+              <a:rPr lang="en-US" dirty="0"/>
+              <a:t>Ownership Loop</a:t>
+            </a:r>
+          </a:p>
+        </p:txBody>
+      </p:sp>
+      <p:sp>
+        <p:nvSpPr>
+          <p:cNvPr id="8" name="Multiplication Sign 7">
+            <a:extLst>
+              <a:ext uri="{FF2B5EF4-FFF2-40B4-BE49-F238E27FC236}">
+                <a16:creationId xmlns:a16="http://schemas.microsoft.com/office/drawing/2014/main" id="{28AA992C-CF03-429C-B897-38C8A0A410D2}"/>
+              </a:ext>
+            </a:extLst>
+          </p:cNvPr>
+          <p:cNvSpPr/>
+          <p:nvPr/>
+        </p:nvSpPr>
+        <p:spPr>
+          <a:xfrm>
+            <a:off x="9372247" y="2532444"/>
+            <a:ext cx="1526551" cy="1708355"/>
+          </a:xfrm>
+          <a:prstGeom prst="mathMultiply">
+            <a:avLst>
+              <a:gd name="adj1" fmla="val 8197"/>
+            </a:avLst>
+          </a:prstGeom>
+          <a:solidFill>
+            <a:srgbClr val="FF0000"/>
+          </a:solidFill>
+        </p:spPr>
+        <p:style>
+          <a:lnRef idx="2">
+            <a:schemeClr val="accent1">
+              <a:shade val="50000"/>
+            </a:schemeClr>
+          </a:lnRef>
+          <a:fillRef idx="1">
+            <a:schemeClr val="accent1"/>
+          </a:fillRef>
+          <a:effectRef idx="0">
+            <a:schemeClr val="accent1"/>
+          </a:effectRef>
+          <a:fontRef idx="minor">
+            <a:schemeClr val="lt1"/>
+          </a:fontRef>
+        </p:style>
+        <p:txBody>
+          <a:bodyPr rtlCol="0" anchor="ctr"/>
+          <a:lstStyle/>
+          <a:p>
+            <a:pPr algn="ctr"/>
+            <a:endParaRPr lang="en-US"/>
+          </a:p>
+        </p:txBody>
+      </p:sp>
+      <p:sp>
+        <p:nvSpPr>
+          <p:cNvPr id="29" name="Multiplication Sign 28">
+            <a:extLst>
+              <a:ext uri="{FF2B5EF4-FFF2-40B4-BE49-F238E27FC236}">
+                <a16:creationId xmlns:a16="http://schemas.microsoft.com/office/drawing/2014/main" id="{FC2A96D0-C3CE-46E1-8E83-158DA1B843A6}"/>
+              </a:ext>
+            </a:extLst>
+          </p:cNvPr>
+          <p:cNvSpPr/>
+          <p:nvPr/>
+        </p:nvSpPr>
+        <p:spPr>
+          <a:xfrm>
+            <a:off x="7701588" y="1786681"/>
+            <a:ext cx="1526551" cy="1708355"/>
+          </a:xfrm>
+          <a:prstGeom prst="mathMultiply">
+            <a:avLst>
+              <a:gd name="adj1" fmla="val 8197"/>
+            </a:avLst>
+          </a:prstGeom>
+          <a:solidFill>
+            <a:srgbClr val="FF0000"/>
+          </a:solidFill>
+        </p:spPr>
+        <p:style>
+          <a:lnRef idx="2">
+            <a:schemeClr val="accent1">
+              <a:shade val="50000"/>
+            </a:schemeClr>
+          </a:lnRef>
+          <a:fillRef idx="1">
+            <a:schemeClr val="accent1"/>
+          </a:fillRef>
+          <a:effectRef idx="0">
+            <a:schemeClr val="accent1"/>
+          </a:effectRef>
+          <a:fontRef idx="minor">
+            <a:schemeClr val="lt1"/>
+          </a:fontRef>
+        </p:style>
+        <p:txBody>
+          <a:bodyPr rtlCol="0" anchor="ctr"/>
+          <a:lstStyle/>
+          <a:p>
+            <a:pPr algn="ctr"/>
+            <a:endParaRPr lang="en-US"/>
+          </a:p>
+        </p:txBody>
+      </p:sp>
+      <p:sp>
+        <p:nvSpPr>
+          <p:cNvPr id="30" name="Multiplication Sign 29">
+            <a:extLst>
+              <a:ext uri="{FF2B5EF4-FFF2-40B4-BE49-F238E27FC236}">
+                <a16:creationId xmlns:a16="http://schemas.microsoft.com/office/drawing/2014/main" id="{85884AE9-289C-4309-B51A-28748A3ECC57}"/>
+              </a:ext>
+            </a:extLst>
+          </p:cNvPr>
+          <p:cNvSpPr/>
+          <p:nvPr/>
+        </p:nvSpPr>
+        <p:spPr>
+          <a:xfrm>
+            <a:off x="7706868" y="4291513"/>
+            <a:ext cx="1526551" cy="1708355"/>
+          </a:xfrm>
+          <a:prstGeom prst="mathMultiply">
+            <a:avLst>
+              <a:gd name="adj1" fmla="val 8197"/>
+            </a:avLst>
+          </a:prstGeom>
+          <a:solidFill>
+            <a:srgbClr val="FF0000"/>
+          </a:solidFill>
+        </p:spPr>
+        <p:style>
+          <a:lnRef idx="2">
+            <a:schemeClr val="accent1">
+              <a:shade val="50000"/>
+            </a:schemeClr>
+          </a:lnRef>
+          <a:fillRef idx="1">
+            <a:schemeClr val="accent1"/>
+          </a:fillRef>
+          <a:effectRef idx="0">
+            <a:schemeClr val="accent1"/>
+          </a:effectRef>
+          <a:fontRef idx="minor">
+            <a:schemeClr val="lt1"/>
+          </a:fontRef>
+        </p:style>
+        <p:txBody>
+          <a:bodyPr rtlCol="0" anchor="ctr"/>
+          <a:lstStyle/>
+          <a:p>
+            <a:pPr algn="ctr"/>
+            <a:endParaRPr lang="en-US"/>
+          </a:p>
+        </p:txBody>
+      </p:sp>
+      <p:sp>
+        <p:nvSpPr>
+          <p:cNvPr id="31" name="TextBox 30">
+            <a:extLst>
+              <a:ext uri="{FF2B5EF4-FFF2-40B4-BE49-F238E27FC236}">
+                <a16:creationId xmlns:a16="http://schemas.microsoft.com/office/drawing/2014/main" id="{BA37ED67-2098-4135-A9A9-4BE005AB882A}"/>
+              </a:ext>
+            </a:extLst>
+          </p:cNvPr>
+          <p:cNvSpPr txBox="1"/>
+          <p:nvPr/>
+        </p:nvSpPr>
+        <p:spPr>
+          <a:xfrm>
+            <a:off x="7642328" y="5705613"/>
+            <a:ext cx="2037289" cy="369332"/>
+          </a:xfrm>
+          <a:prstGeom prst="rect">
+            <a:avLst/>
+          </a:prstGeom>
+          <a:noFill/>
+        </p:spPr>
+        <p:txBody>
+          <a:bodyPr wrap="none" rtlCol="0">
+            <a:spAutoFit/>
+          </a:bodyPr>
+          <a:lstStyle/>
+          <a:p>
+            <a:r>
+              <a:rPr lang="en-US" dirty="0"/>
+              <a:t>Accountability Loop</a:t>
             </a:r>
           </a:p>
         </p:txBody>
@@ -13263,13 +15138,320 @@
     </p:spTree>
     <p:extLst>
       <p:ext uri="{BB962C8B-B14F-4D97-AF65-F5344CB8AC3E}">
-        <p14:creationId xmlns:p14="http://schemas.microsoft.com/office/powerpoint/2010/main" val="3075917672"/>
+        <p14:creationId xmlns:p14="http://schemas.microsoft.com/office/powerpoint/2010/main" val="1899980922"/>
       </p:ext>
     </p:extLst>
   </p:cSld>
   <p:clrMapOvr>
     <a:masterClrMapping/>
   </p:clrMapOvr>
+  <p:timing>
+    <p:tnLst>
+      <p:par>
+        <p:cTn id="1" dur="indefinite" restart="never" nodeType="tmRoot">
+          <p:childTnLst>
+            <p:seq concurrent="1" nextAc="seek">
+              <p:cTn id="2" dur="indefinite" nodeType="mainSeq">
+                <p:childTnLst>
+                  <p:par>
+                    <p:cTn id="3" fill="hold">
+                      <p:stCondLst>
+                        <p:cond delay="indefinite"/>
+                      </p:stCondLst>
+                      <p:childTnLst>
+                        <p:par>
+                          <p:cTn id="4" fill="hold">
+                            <p:stCondLst>
+                              <p:cond delay="0"/>
+                            </p:stCondLst>
+                            <p:childTnLst>
+                              <p:par>
+                                <p:cTn id="5" presetID="1" presetClass="entr" presetSubtype="0" fill="hold" grpId="0" nodeType="clickEffect">
+                                  <p:stCondLst>
+                                    <p:cond delay="0"/>
+                                  </p:stCondLst>
+                                  <p:childTnLst>
+                                    <p:set>
+                                      <p:cBhvr>
+                                        <p:cTn id="6" dur="1" fill="hold">
+                                          <p:stCondLst>
+                                            <p:cond delay="0"/>
+                                          </p:stCondLst>
+                                        </p:cTn>
+                                        <p:tgtEl>
+                                          <p:spTgt spid="8"/>
+                                        </p:tgtEl>
+                                        <p:attrNameLst>
+                                          <p:attrName>style.visibility</p:attrName>
+                                        </p:attrNameLst>
+                                      </p:cBhvr>
+                                      <p:to>
+                                        <p:strVal val="visible"/>
+                                      </p:to>
+                                    </p:set>
+                                  </p:childTnLst>
+                                </p:cTn>
+                              </p:par>
+                              <p:par>
+                                <p:cTn id="7" presetID="1" presetClass="entr" presetSubtype="0" fill="hold" grpId="0" nodeType="withEffect">
+                                  <p:stCondLst>
+                                    <p:cond delay="0"/>
+                                  </p:stCondLst>
+                                  <p:childTnLst>
+                                    <p:set>
+                                      <p:cBhvr>
+                                        <p:cTn id="8" dur="1" fill="hold">
+                                          <p:stCondLst>
+                                            <p:cond delay="0"/>
+                                          </p:stCondLst>
+                                        </p:cTn>
+                                        <p:tgtEl>
+                                          <p:spTgt spid="16"/>
+                                        </p:tgtEl>
+                                        <p:attrNameLst>
+                                          <p:attrName>style.visibility</p:attrName>
+                                        </p:attrNameLst>
+                                      </p:cBhvr>
+                                      <p:to>
+                                        <p:strVal val="visible"/>
+                                      </p:to>
+                                    </p:set>
+                                  </p:childTnLst>
+                                </p:cTn>
+                              </p:par>
+                            </p:childTnLst>
+                          </p:cTn>
+                        </p:par>
+                      </p:childTnLst>
+                    </p:cTn>
+                  </p:par>
+                  <p:par>
+                    <p:cTn id="9" fill="hold">
+                      <p:stCondLst>
+                        <p:cond delay="indefinite"/>
+                      </p:stCondLst>
+                      <p:childTnLst>
+                        <p:par>
+                          <p:cTn id="10" fill="hold">
+                            <p:stCondLst>
+                              <p:cond delay="0"/>
+                            </p:stCondLst>
+                            <p:childTnLst>
+                              <p:par>
+                                <p:cTn id="11" presetID="1" presetClass="entr" presetSubtype="0" fill="hold" grpId="0" nodeType="clickEffect">
+                                  <p:stCondLst>
+                                    <p:cond delay="0"/>
+                                  </p:stCondLst>
+                                  <p:childTnLst>
+                                    <p:set>
+                                      <p:cBhvr>
+                                        <p:cTn id="12" dur="1" fill="hold">
+                                          <p:stCondLst>
+                                            <p:cond delay="0"/>
+                                          </p:stCondLst>
+                                        </p:cTn>
+                                        <p:tgtEl>
+                                          <p:spTgt spid="29"/>
+                                        </p:tgtEl>
+                                        <p:attrNameLst>
+                                          <p:attrName>style.visibility</p:attrName>
+                                        </p:attrNameLst>
+                                      </p:cBhvr>
+                                      <p:to>
+                                        <p:strVal val="visible"/>
+                                      </p:to>
+                                    </p:set>
+                                  </p:childTnLst>
+                                </p:cTn>
+                              </p:par>
+                              <p:par>
+                                <p:cTn id="13" presetID="1" presetClass="entr" presetSubtype="0" fill="hold" nodeType="withEffect">
+                                  <p:stCondLst>
+                                    <p:cond delay="0"/>
+                                  </p:stCondLst>
+                                  <p:childTnLst>
+                                    <p:set>
+                                      <p:cBhvr>
+                                        <p:cTn id="14" dur="1" fill="hold">
+                                          <p:stCondLst>
+                                            <p:cond delay="0"/>
+                                          </p:stCondLst>
+                                        </p:cTn>
+                                        <p:tgtEl>
+                                          <p:spTgt spid="26"/>
+                                        </p:tgtEl>
+                                        <p:attrNameLst>
+                                          <p:attrName>style.visibility</p:attrName>
+                                        </p:attrNameLst>
+                                      </p:cBhvr>
+                                      <p:to>
+                                        <p:strVal val="visible"/>
+                                      </p:to>
+                                    </p:set>
+                                  </p:childTnLst>
+                                </p:cTn>
+                              </p:par>
+                            </p:childTnLst>
+                          </p:cTn>
+                        </p:par>
+                      </p:childTnLst>
+                    </p:cTn>
+                  </p:par>
+                  <p:par>
+                    <p:cTn id="15" fill="hold">
+                      <p:stCondLst>
+                        <p:cond delay="indefinite"/>
+                      </p:stCondLst>
+                      <p:childTnLst>
+                        <p:par>
+                          <p:cTn id="16" fill="hold">
+                            <p:stCondLst>
+                              <p:cond delay="0"/>
+                            </p:stCondLst>
+                            <p:childTnLst>
+                              <p:par>
+                                <p:cTn id="17" presetID="1" presetClass="entr" presetSubtype="0" fill="hold" grpId="0" nodeType="clickEffect">
+                                  <p:stCondLst>
+                                    <p:cond delay="0"/>
+                                  </p:stCondLst>
+                                  <p:childTnLst>
+                                    <p:set>
+                                      <p:cBhvr>
+                                        <p:cTn id="18" dur="1" fill="hold">
+                                          <p:stCondLst>
+                                            <p:cond delay="0"/>
+                                          </p:stCondLst>
+                                        </p:cTn>
+                                        <p:tgtEl>
+                                          <p:spTgt spid="30"/>
+                                        </p:tgtEl>
+                                        <p:attrNameLst>
+                                          <p:attrName>style.visibility</p:attrName>
+                                        </p:attrNameLst>
+                                      </p:cBhvr>
+                                      <p:to>
+                                        <p:strVal val="visible"/>
+                                      </p:to>
+                                    </p:set>
+                                  </p:childTnLst>
+                                </p:cTn>
+                              </p:par>
+                              <p:par>
+                                <p:cTn id="19" presetID="1" presetClass="entr" presetSubtype="0" fill="hold" nodeType="withEffect">
+                                  <p:stCondLst>
+                                    <p:cond delay="0"/>
+                                  </p:stCondLst>
+                                  <p:childTnLst>
+                                    <p:set>
+                                      <p:cBhvr>
+                                        <p:cTn id="20" dur="1" fill="hold">
+                                          <p:stCondLst>
+                                            <p:cond delay="0"/>
+                                          </p:stCondLst>
+                                        </p:cTn>
+                                        <p:tgtEl>
+                                          <p:spTgt spid="23"/>
+                                        </p:tgtEl>
+                                        <p:attrNameLst>
+                                          <p:attrName>style.visibility</p:attrName>
+                                        </p:attrNameLst>
+                                      </p:cBhvr>
+                                      <p:to>
+                                        <p:strVal val="visible"/>
+                                      </p:to>
+                                    </p:set>
+                                  </p:childTnLst>
+                                </p:cTn>
+                              </p:par>
+                              <p:par>
+                                <p:cTn id="21" presetID="1" presetClass="entr" presetSubtype="0" fill="hold" grpId="0" nodeType="withEffect">
+                                  <p:stCondLst>
+                                    <p:cond delay="0"/>
+                                  </p:stCondLst>
+                                  <p:childTnLst>
+                                    <p:set>
+                                      <p:cBhvr>
+                                        <p:cTn id="22" dur="1" fill="hold">
+                                          <p:stCondLst>
+                                            <p:cond delay="0"/>
+                                          </p:stCondLst>
+                                        </p:cTn>
+                                        <p:tgtEl>
+                                          <p:spTgt spid="17"/>
+                                        </p:tgtEl>
+                                        <p:attrNameLst>
+                                          <p:attrName>style.visibility</p:attrName>
+                                        </p:attrNameLst>
+                                      </p:cBhvr>
+                                      <p:to>
+                                        <p:strVal val="visible"/>
+                                      </p:to>
+                                    </p:set>
+                                  </p:childTnLst>
+                                </p:cTn>
+                              </p:par>
+                              <p:par>
+                                <p:cTn id="23" presetID="1" presetClass="entr" presetSubtype="0" fill="hold" nodeType="withEffect">
+                                  <p:stCondLst>
+                                    <p:cond delay="0"/>
+                                  </p:stCondLst>
+                                  <p:childTnLst>
+                                    <p:set>
+                                      <p:cBhvr>
+                                        <p:cTn id="24" dur="1" fill="hold">
+                                          <p:stCondLst>
+                                            <p:cond delay="0"/>
+                                          </p:stCondLst>
+                                        </p:cTn>
+                                        <p:tgtEl>
+                                          <p:spTgt spid="27"/>
+                                        </p:tgtEl>
+                                        <p:attrNameLst>
+                                          <p:attrName>style.visibility</p:attrName>
+                                        </p:attrNameLst>
+                                      </p:cBhvr>
+                                      <p:to>
+                                        <p:strVal val="visible"/>
+                                      </p:to>
+                                    </p:set>
+                                  </p:childTnLst>
+                                </p:cTn>
+                              </p:par>
+                            </p:childTnLst>
+                          </p:cTn>
+                        </p:par>
+                      </p:childTnLst>
+                    </p:cTn>
+                  </p:par>
+                </p:childTnLst>
+              </p:cTn>
+              <p:prevCondLst>
+                <p:cond evt="onPrev" delay="0">
+                  <p:tgtEl>
+                    <p:sldTgt/>
+                  </p:tgtEl>
+                </p:cond>
+              </p:prevCondLst>
+              <p:nextCondLst>
+                <p:cond evt="onNext" delay="0">
+                  <p:tgtEl>
+                    <p:sldTgt/>
+                  </p:tgtEl>
+                </p:cond>
+              </p:nextCondLst>
+            </p:seq>
+          </p:childTnLst>
+        </p:cTn>
+      </p:par>
+    </p:tnLst>
+    <p:bldLst>
+      <p:bldP spid="16" grpId="0" animBg="1"/>
+      <p:bldP spid="17" grpId="0" animBg="1"/>
+      <p:bldP spid="8" grpId="0" animBg="1"/>
+      <p:bldP spid="29" grpId="0" animBg="1"/>
+      <p:bldP spid="30" grpId="0" animBg="1"/>
+    </p:bldLst>
+  </p:timing>
 </p:sld>
 </file>
 
@@ -13292,56 +15474,572 @@
       </p:grpSpPr>
       <p:sp>
         <p:nvSpPr>
-          <p:cNvPr id="2" name="Title 1">
-            <a:extLst>
-              <a:ext uri="{FF2B5EF4-FFF2-40B4-BE49-F238E27FC236}">
-                <a16:creationId xmlns:a16="http://schemas.microsoft.com/office/drawing/2014/main" id="{D5C87E0C-8E96-4544-8B5B-9E819053728E}"/>
-              </a:ext>
-            </a:extLst>
-          </p:cNvPr>
-          <p:cNvSpPr>
-            <a:spLocks noGrp="1"/>
-          </p:cNvSpPr>
-          <p:nvPr>
-            <p:ph type="title"/>
-          </p:nvPr>
-        </p:nvSpPr>
-        <p:spPr/>
-        <p:txBody>
-          <a:bodyPr/>
-          <a:lstStyle/>
-          <a:p>
-            <a:r>
-              <a:rPr lang="en-US" dirty="0"/>
-              <a:t>The Ownership Loop</a:t>
-            </a:r>
-          </a:p>
-        </p:txBody>
-      </p:sp>
-      <p:sp>
-        <p:nvSpPr>
-          <p:cNvPr id="3" name="Content Placeholder 2">
-            <a:extLst>
-              <a:ext uri="{FF2B5EF4-FFF2-40B4-BE49-F238E27FC236}">
-                <a16:creationId xmlns:a16="http://schemas.microsoft.com/office/drawing/2014/main" id="{CC26DAD9-539E-4914-B1FA-58F69B0A6EC5}"/>
-              </a:ext>
-            </a:extLst>
-          </p:cNvPr>
-          <p:cNvSpPr>
-            <a:spLocks noGrp="1"/>
-          </p:cNvSpPr>
-          <p:nvPr>
-            <p:ph idx="1"/>
-          </p:nvPr>
-        </p:nvSpPr>
-        <p:spPr/>
-        <p:txBody>
-          <a:bodyPr/>
-          <a:lstStyle/>
-          <a:p>
-            <a:r>
-              <a:rPr lang="en-US" dirty="0"/>
-              <a:t>Remove the Accountability parts</a:t>
+          <p:cNvPr id="2" name="Oval 1">
+            <a:extLst>
+              <a:ext uri="{FF2B5EF4-FFF2-40B4-BE49-F238E27FC236}">
+                <a16:creationId xmlns:a16="http://schemas.microsoft.com/office/drawing/2014/main" id="{86199DA8-4C1B-4B86-9FC7-808E0206B990}"/>
+              </a:ext>
+            </a:extLst>
+          </p:cNvPr>
+          <p:cNvSpPr/>
+          <p:nvPr/>
+        </p:nvSpPr>
+        <p:spPr>
+          <a:xfrm>
+            <a:off x="5419344" y="4094726"/>
+            <a:ext cx="1645920" cy="731520"/>
+          </a:xfrm>
+          <a:prstGeom prst="ellipse">
+            <a:avLst/>
+          </a:prstGeom>
+          <a:solidFill>
+            <a:schemeClr val="accent1">
+              <a:lumMod val="20000"/>
+              <a:lumOff val="80000"/>
+            </a:schemeClr>
+          </a:solidFill>
+          <a:ln w="28575"/>
+        </p:spPr>
+        <p:style>
+          <a:lnRef idx="2">
+            <a:schemeClr val="accent1">
+              <a:shade val="50000"/>
+            </a:schemeClr>
+          </a:lnRef>
+          <a:fillRef idx="1">
+            <a:schemeClr val="accent1"/>
+          </a:fillRef>
+          <a:effectRef idx="0">
+            <a:schemeClr val="accent1"/>
+          </a:effectRef>
+          <a:fontRef idx="minor">
+            <a:schemeClr val="lt1"/>
+          </a:fontRef>
+        </p:style>
+        <p:txBody>
+          <a:bodyPr rtlCol="0" anchor="ctr"/>
+          <a:lstStyle/>
+          <a:p>
+            <a:pPr algn="ctr"/>
+            <a:r>
+              <a:rPr lang="en-US" dirty="0">
+                <a:solidFill>
+                  <a:schemeClr val="tx1"/>
+                </a:solidFill>
+              </a:rPr>
+              <a:t>Execute</a:t>
+            </a:r>
+          </a:p>
+        </p:txBody>
+      </p:sp>
+      <p:sp>
+        <p:nvSpPr>
+          <p:cNvPr id="10" name="TextBox 9">
+            <a:extLst>
+              <a:ext uri="{FF2B5EF4-FFF2-40B4-BE49-F238E27FC236}">
+                <a16:creationId xmlns:a16="http://schemas.microsoft.com/office/drawing/2014/main" id="{174A2CEC-EB6A-41A1-B458-E3858BC6759F}"/>
+              </a:ext>
+            </a:extLst>
+          </p:cNvPr>
+          <p:cNvSpPr txBox="1"/>
+          <p:nvPr/>
+        </p:nvSpPr>
+        <p:spPr>
+          <a:xfrm>
+            <a:off x="5443566" y="3755295"/>
+            <a:ext cx="686726" cy="369332"/>
+          </a:xfrm>
+          <a:prstGeom prst="rect">
+            <a:avLst/>
+          </a:prstGeom>
+          <a:noFill/>
+        </p:spPr>
+        <p:txBody>
+          <a:bodyPr wrap="none" rtlCol="0">
+            <a:spAutoFit/>
+          </a:bodyPr>
+          <a:lstStyle/>
+          <a:p>
+            <a:r>
+              <a:rPr lang="en-US" dirty="0">
+                <a:solidFill>
+                  <a:schemeClr val="accent1">
+                    <a:lumMod val="75000"/>
+                  </a:schemeClr>
+                </a:solidFill>
+              </a:rPr>
+              <a:t>Team</a:t>
+            </a:r>
+          </a:p>
+        </p:txBody>
+      </p:sp>
+      <p:sp>
+        <p:nvSpPr>
+          <p:cNvPr id="16" name="Oval 15">
+            <a:extLst>
+              <a:ext uri="{FF2B5EF4-FFF2-40B4-BE49-F238E27FC236}">
+                <a16:creationId xmlns:a16="http://schemas.microsoft.com/office/drawing/2014/main" id="{F5467CAE-C6F5-4457-A3F0-44045D635ACB}"/>
+              </a:ext>
+            </a:extLst>
+          </p:cNvPr>
+          <p:cNvSpPr/>
+          <p:nvPr/>
+        </p:nvSpPr>
+        <p:spPr>
+          <a:xfrm>
+            <a:off x="2707998" y="3129012"/>
+            <a:ext cx="1645920" cy="731520"/>
+          </a:xfrm>
+          <a:prstGeom prst="ellipse">
+            <a:avLst/>
+          </a:prstGeom>
+          <a:solidFill>
+            <a:schemeClr val="accent1">
+              <a:lumMod val="20000"/>
+              <a:lumOff val="80000"/>
+            </a:schemeClr>
+          </a:solidFill>
+          <a:ln w="28575"/>
+        </p:spPr>
+        <p:style>
+          <a:lnRef idx="2">
+            <a:schemeClr val="accent1">
+              <a:shade val="50000"/>
+            </a:schemeClr>
+          </a:lnRef>
+          <a:fillRef idx="1">
+            <a:schemeClr val="accent1"/>
+          </a:fillRef>
+          <a:effectRef idx="0">
+            <a:schemeClr val="accent1"/>
+          </a:effectRef>
+          <a:fontRef idx="minor">
+            <a:schemeClr val="lt1"/>
+          </a:fontRef>
+        </p:style>
+        <p:txBody>
+          <a:bodyPr rtlCol="0" anchor="ctr"/>
+          <a:lstStyle/>
+          <a:p>
+            <a:pPr algn="ctr"/>
+            <a:r>
+              <a:rPr lang="en-US" dirty="0">
+                <a:solidFill>
+                  <a:schemeClr val="tx1"/>
+                </a:solidFill>
+              </a:rPr>
+              <a:t>Direction</a:t>
+            </a:r>
+          </a:p>
+        </p:txBody>
+      </p:sp>
+      <p:sp>
+        <p:nvSpPr>
+          <p:cNvPr id="17" name="Oval 16">
+            <a:extLst>
+              <a:ext uri="{FF2B5EF4-FFF2-40B4-BE49-F238E27FC236}">
+                <a16:creationId xmlns:a16="http://schemas.microsoft.com/office/drawing/2014/main" id="{1A03C2EE-4E91-4E16-BC96-047376D7C7D7}"/>
+              </a:ext>
+            </a:extLst>
+          </p:cNvPr>
+          <p:cNvSpPr/>
+          <p:nvPr/>
+        </p:nvSpPr>
+        <p:spPr>
+          <a:xfrm>
+            <a:off x="3908470" y="1845172"/>
+            <a:ext cx="1645920" cy="731520"/>
+          </a:xfrm>
+          <a:prstGeom prst="ellipse">
+            <a:avLst/>
+          </a:prstGeom>
+          <a:solidFill>
+            <a:schemeClr val="accent1">
+              <a:lumMod val="20000"/>
+              <a:lumOff val="80000"/>
+            </a:schemeClr>
+          </a:solidFill>
+          <a:ln w="28575"/>
+        </p:spPr>
+        <p:style>
+          <a:lnRef idx="2">
+            <a:schemeClr val="accent1">
+              <a:shade val="50000"/>
+            </a:schemeClr>
+          </a:lnRef>
+          <a:fillRef idx="1">
+            <a:schemeClr val="accent1"/>
+          </a:fillRef>
+          <a:effectRef idx="0">
+            <a:schemeClr val="accent1"/>
+          </a:effectRef>
+          <a:fontRef idx="minor">
+            <a:schemeClr val="lt1"/>
+          </a:fontRef>
+        </p:style>
+        <p:txBody>
+          <a:bodyPr rtlCol="0" anchor="ctr"/>
+          <a:lstStyle/>
+          <a:p>
+            <a:pPr algn="ctr"/>
+            <a:r>
+              <a:rPr lang="en-US" dirty="0">
+                <a:solidFill>
+                  <a:schemeClr val="tx1"/>
+                </a:solidFill>
+              </a:rPr>
+              <a:t>Assess</a:t>
+            </a:r>
+          </a:p>
+        </p:txBody>
+      </p:sp>
+      <p:sp>
+        <p:nvSpPr>
+          <p:cNvPr id="18" name="Rectangle: Rounded Corners 17">
+            <a:extLst>
+              <a:ext uri="{FF2B5EF4-FFF2-40B4-BE49-F238E27FC236}">
+                <a16:creationId xmlns:a16="http://schemas.microsoft.com/office/drawing/2014/main" id="{70B13BEE-852E-4C1E-A7DC-593751946B9E}"/>
+              </a:ext>
+            </a:extLst>
+          </p:cNvPr>
+          <p:cNvSpPr/>
+          <p:nvPr/>
+        </p:nvSpPr>
+        <p:spPr>
+          <a:xfrm>
+            <a:off x="2477723" y="1414272"/>
+            <a:ext cx="4733844" cy="3627115"/>
+          </a:xfrm>
+          <a:prstGeom prst="roundRect">
+            <a:avLst/>
+          </a:prstGeom>
+          <a:noFill/>
+          <a:ln w="57150">
+            <a:prstDash val="sysDot"/>
+          </a:ln>
+        </p:spPr>
+        <p:style>
+          <a:lnRef idx="2">
+            <a:schemeClr val="accent1">
+              <a:shade val="50000"/>
+            </a:schemeClr>
+          </a:lnRef>
+          <a:fillRef idx="1">
+            <a:schemeClr val="accent1"/>
+          </a:fillRef>
+          <a:effectRef idx="0">
+            <a:schemeClr val="accent1"/>
+          </a:effectRef>
+          <a:fontRef idx="minor">
+            <a:schemeClr val="lt1"/>
+          </a:fontRef>
+        </p:style>
+        <p:txBody>
+          <a:bodyPr rtlCol="0" anchor="ctr"/>
+          <a:lstStyle/>
+          <a:p>
+            <a:pPr algn="ctr"/>
+            <a:endParaRPr lang="en-US"/>
+          </a:p>
+        </p:txBody>
+      </p:sp>
+      <p:cxnSp>
+        <p:nvCxnSpPr>
+          <p:cNvPr id="23" name="Connector: Curved 22">
+            <a:extLst>
+              <a:ext uri="{FF2B5EF4-FFF2-40B4-BE49-F238E27FC236}">
+                <a16:creationId xmlns:a16="http://schemas.microsoft.com/office/drawing/2014/main" id="{94F89EF5-34A3-40FC-B3B1-9CFBBD3299A1}"/>
+              </a:ext>
+            </a:extLst>
+          </p:cNvPr>
+          <p:cNvCxnSpPr>
+            <a:cxnSpLocks/>
+            <a:stCxn id="2" idx="0"/>
+            <a:endCxn id="17" idx="6"/>
+          </p:cNvCxnSpPr>
+          <p:nvPr/>
+        </p:nvCxnSpPr>
+        <p:spPr>
+          <a:xfrm rot="16200000" flipV="1">
+            <a:off x="4956450" y="2808872"/>
+            <a:ext cx="1883794" cy="687914"/>
+          </a:xfrm>
+          <a:prstGeom prst="curvedConnector2">
+            <a:avLst/>
+          </a:prstGeom>
+          <a:ln w="38100">
+            <a:tailEnd type="triangle"/>
+          </a:ln>
+        </p:spPr>
+        <p:style>
+          <a:lnRef idx="1">
+            <a:schemeClr val="accent1"/>
+          </a:lnRef>
+          <a:fillRef idx="0">
+            <a:schemeClr val="accent1"/>
+          </a:fillRef>
+          <a:effectRef idx="0">
+            <a:schemeClr val="accent1"/>
+          </a:effectRef>
+          <a:fontRef idx="minor">
+            <a:schemeClr val="tx1"/>
+          </a:fontRef>
+        </p:style>
+      </p:cxnSp>
+      <p:cxnSp>
+        <p:nvCxnSpPr>
+          <p:cNvPr id="26" name="Connector: Curved 25">
+            <a:extLst>
+              <a:ext uri="{FF2B5EF4-FFF2-40B4-BE49-F238E27FC236}">
+                <a16:creationId xmlns:a16="http://schemas.microsoft.com/office/drawing/2014/main" id="{77123615-CD96-4D7D-B5A7-C53BC52B6ACA}"/>
+              </a:ext>
+            </a:extLst>
+          </p:cNvPr>
+          <p:cNvCxnSpPr>
+            <a:cxnSpLocks/>
+            <a:stCxn id="16" idx="4"/>
+            <a:endCxn id="2" idx="2"/>
+          </p:cNvCxnSpPr>
+          <p:nvPr/>
+        </p:nvCxnSpPr>
+        <p:spPr>
+          <a:xfrm rot="16200000" flipH="1">
+            <a:off x="4175174" y="3216316"/>
+            <a:ext cx="599954" cy="1888386"/>
+          </a:xfrm>
+          <a:prstGeom prst="curvedConnector2">
+            <a:avLst/>
+          </a:prstGeom>
+          <a:ln w="38100">
+            <a:tailEnd type="triangle"/>
+          </a:ln>
+        </p:spPr>
+        <p:style>
+          <a:lnRef idx="1">
+            <a:schemeClr val="accent1"/>
+          </a:lnRef>
+          <a:fillRef idx="0">
+            <a:schemeClr val="accent1"/>
+          </a:fillRef>
+          <a:effectRef idx="0">
+            <a:schemeClr val="accent1"/>
+          </a:effectRef>
+          <a:fontRef idx="minor">
+            <a:schemeClr val="tx1"/>
+          </a:fontRef>
+        </p:style>
+      </p:cxnSp>
+      <p:cxnSp>
+        <p:nvCxnSpPr>
+          <p:cNvPr id="27" name="Connector: Curved 26">
+            <a:extLst>
+              <a:ext uri="{FF2B5EF4-FFF2-40B4-BE49-F238E27FC236}">
+                <a16:creationId xmlns:a16="http://schemas.microsoft.com/office/drawing/2014/main" id="{0CFBBDE4-12D9-42F2-94D7-AC8BE054F727}"/>
+              </a:ext>
+            </a:extLst>
+          </p:cNvPr>
+          <p:cNvCxnSpPr>
+            <a:cxnSpLocks/>
+            <a:stCxn id="17" idx="2"/>
+            <a:endCxn id="16" idx="0"/>
+          </p:cNvCxnSpPr>
+          <p:nvPr/>
+        </p:nvCxnSpPr>
+        <p:spPr>
+          <a:xfrm rot="10800000" flipV="1">
+            <a:off x="3530958" y="2210932"/>
+            <a:ext cx="377512" cy="918080"/>
+          </a:xfrm>
+          <a:prstGeom prst="curvedConnector2">
+            <a:avLst/>
+          </a:prstGeom>
+          <a:ln w="38100">
+            <a:tailEnd type="triangle"/>
+          </a:ln>
+        </p:spPr>
+        <p:style>
+          <a:lnRef idx="1">
+            <a:schemeClr val="accent1"/>
+          </a:lnRef>
+          <a:fillRef idx="0">
+            <a:schemeClr val="accent1"/>
+          </a:fillRef>
+          <a:effectRef idx="0">
+            <a:schemeClr val="accent1"/>
+          </a:effectRef>
+          <a:fontRef idx="minor">
+            <a:schemeClr val="tx1"/>
+          </a:fontRef>
+        </p:style>
+      </p:cxnSp>
+      <p:sp>
+        <p:nvSpPr>
+          <p:cNvPr id="28" name="TextBox 27">
+            <a:extLst>
+              <a:ext uri="{FF2B5EF4-FFF2-40B4-BE49-F238E27FC236}">
+                <a16:creationId xmlns:a16="http://schemas.microsoft.com/office/drawing/2014/main" id="{F188771D-A16E-4BC7-A3F1-39A2DC20921C}"/>
+              </a:ext>
+            </a:extLst>
+          </p:cNvPr>
+          <p:cNvSpPr txBox="1"/>
+          <p:nvPr/>
+        </p:nvSpPr>
+        <p:spPr>
+          <a:xfrm>
+            <a:off x="2757180" y="1030077"/>
+            <a:ext cx="1717971" cy="369332"/>
+          </a:xfrm>
+          <a:prstGeom prst="rect">
+            <a:avLst/>
+          </a:prstGeom>
+          <a:noFill/>
+        </p:spPr>
+        <p:txBody>
+          <a:bodyPr wrap="none" rtlCol="0">
+            <a:spAutoFit/>
+          </a:bodyPr>
+          <a:lstStyle/>
+          <a:p>
+            <a:r>
+              <a:rPr lang="en-US" dirty="0"/>
+              <a:t>Ownership Loop</a:t>
+            </a:r>
+          </a:p>
+        </p:txBody>
+      </p:sp>
+      <p:sp>
+        <p:nvSpPr>
+          <p:cNvPr id="31" name="Left Brace 30">
+            <a:extLst>
+              <a:ext uri="{FF2B5EF4-FFF2-40B4-BE49-F238E27FC236}">
+                <a16:creationId xmlns:a16="http://schemas.microsoft.com/office/drawing/2014/main" id="{B020C7AC-1AFB-4D5F-B9CF-D98D749EF8AF}"/>
+              </a:ext>
+            </a:extLst>
+          </p:cNvPr>
+          <p:cNvSpPr/>
+          <p:nvPr/>
+        </p:nvSpPr>
+        <p:spPr>
+          <a:xfrm flipH="1">
+            <a:off x="7294022" y="1149830"/>
+            <a:ext cx="1255776" cy="4267258"/>
+          </a:xfrm>
+          <a:prstGeom prst="leftBrace">
+            <a:avLst/>
+          </a:prstGeom>
+          <a:ln w="57150">
+            <a:solidFill>
+              <a:schemeClr val="accent2"/>
+            </a:solidFill>
+          </a:ln>
+        </p:spPr>
+        <p:style>
+          <a:lnRef idx="1">
+            <a:schemeClr val="accent1"/>
+          </a:lnRef>
+          <a:fillRef idx="0">
+            <a:schemeClr val="accent1"/>
+          </a:fillRef>
+          <a:effectRef idx="0">
+            <a:schemeClr val="accent1"/>
+          </a:effectRef>
+          <a:fontRef idx="minor">
+            <a:schemeClr val="tx1"/>
+          </a:fontRef>
+        </p:style>
+        <p:txBody>
+          <a:bodyPr rtlCol="0" anchor="ctr"/>
+          <a:lstStyle/>
+          <a:p>
+            <a:pPr algn="ctr"/>
+            <a:endParaRPr lang="en-US"/>
+          </a:p>
+        </p:txBody>
+      </p:sp>
+      <p:sp>
+        <p:nvSpPr>
+          <p:cNvPr id="32" name="TextBox 31">
+            <a:extLst>
+              <a:ext uri="{FF2B5EF4-FFF2-40B4-BE49-F238E27FC236}">
+                <a16:creationId xmlns:a16="http://schemas.microsoft.com/office/drawing/2014/main" id="{4299AF5E-2E2C-4709-A55D-B168B3059B61}"/>
+              </a:ext>
+            </a:extLst>
+          </p:cNvPr>
+          <p:cNvSpPr txBox="1"/>
+          <p:nvPr/>
+        </p:nvSpPr>
+        <p:spPr>
+          <a:xfrm flipH="1">
+            <a:off x="8461321" y="2300640"/>
+            <a:ext cx="825867" cy="369332"/>
+          </a:xfrm>
+          <a:prstGeom prst="rect">
+            <a:avLst/>
+          </a:prstGeom>
+          <a:noFill/>
+        </p:spPr>
+        <p:txBody>
+          <a:bodyPr wrap="none" rtlCol="0">
+            <a:spAutoFit/>
+          </a:bodyPr>
+          <a:lstStyle/>
+          <a:p>
+            <a:r>
+              <a:rPr lang="en-US" dirty="0">
+                <a:solidFill>
+                  <a:srgbClr val="F09456"/>
+                </a:solidFill>
+              </a:rPr>
+              <a:t>Leader</a:t>
+            </a:r>
+          </a:p>
+        </p:txBody>
+      </p:sp>
+      <p:sp>
+        <p:nvSpPr>
+          <p:cNvPr id="33" name="TextBox 32">
+            <a:extLst>
+              <a:ext uri="{FF2B5EF4-FFF2-40B4-BE49-F238E27FC236}">
+                <a16:creationId xmlns:a16="http://schemas.microsoft.com/office/drawing/2014/main" id="{5A1E13BC-3FBB-4305-BC25-67B915B70E55}"/>
+              </a:ext>
+            </a:extLst>
+          </p:cNvPr>
+          <p:cNvSpPr txBox="1"/>
+          <p:nvPr/>
+        </p:nvSpPr>
+        <p:spPr>
+          <a:xfrm flipH="1">
+            <a:off x="8857487" y="2960293"/>
+            <a:ext cx="893643" cy="646331"/>
+          </a:xfrm>
+          <a:prstGeom prst="rect">
+            <a:avLst/>
+          </a:prstGeom>
+          <a:noFill/>
+        </p:spPr>
+        <p:txBody>
+          <a:bodyPr wrap="none" rtlCol="0">
+            <a:spAutoFit/>
+          </a:bodyPr>
+          <a:lstStyle/>
+          <a:p>
+            <a:r>
+              <a:rPr lang="en-US" dirty="0">
+                <a:solidFill>
+                  <a:schemeClr val="accent2"/>
+                </a:solidFill>
+              </a:rPr>
+              <a:t>Mentor</a:t>
+            </a:r>
+          </a:p>
+          <a:p>
+            <a:r>
+              <a:rPr lang="en-US" dirty="0">
+                <a:solidFill>
+                  <a:schemeClr val="accent2"/>
+                </a:solidFill>
+              </a:rPr>
+              <a:t>Coach</a:t>
             </a:r>
           </a:p>
         </p:txBody>
@@ -13349,7 +16047,7 @@
     </p:spTree>
     <p:extLst>
       <p:ext uri="{BB962C8B-B14F-4D97-AF65-F5344CB8AC3E}">
-        <p14:creationId xmlns:p14="http://schemas.microsoft.com/office/powerpoint/2010/main" val="1464780440"/>
+        <p14:creationId xmlns:p14="http://schemas.microsoft.com/office/powerpoint/2010/main" val="1494923518"/>
       </p:ext>
     </p:extLst>
   </p:cSld>

</xml_diff>